<commit_message>
add content for ppt.
</commit_message>
<xml_diff>
--- a/Disruptor源码解析.pptx
+++ b/Disruptor源码解析.pptx
@@ -12,20 +12,22 @@
     <p:sldId id="257" r:id="rId4"/>
     <p:sldId id="258" r:id="rId5"/>
     <p:sldId id="259" r:id="rId7"/>
-    <p:sldId id="260" r:id="rId8"/>
-    <p:sldId id="261" r:id="rId9"/>
-    <p:sldId id="262" r:id="rId10"/>
-    <p:sldId id="263" r:id="rId11"/>
-    <p:sldId id="264" r:id="rId12"/>
-    <p:sldId id="265" r:id="rId13"/>
-    <p:sldId id="266" r:id="rId14"/>
-    <p:sldId id="267" r:id="rId15"/>
-    <p:sldId id="268" r:id="rId16"/>
-    <p:sldId id="270" r:id="rId17"/>
-    <p:sldId id="269" r:id="rId18"/>
-    <p:sldId id="271" r:id="rId19"/>
-    <p:sldId id="272" r:id="rId20"/>
-    <p:sldId id="273" r:id="rId21"/>
+    <p:sldId id="275" r:id="rId8"/>
+    <p:sldId id="276" r:id="rId9"/>
+    <p:sldId id="260" r:id="rId10"/>
+    <p:sldId id="261" r:id="rId11"/>
+    <p:sldId id="262" r:id="rId12"/>
+    <p:sldId id="263" r:id="rId13"/>
+    <p:sldId id="264" r:id="rId14"/>
+    <p:sldId id="265" r:id="rId15"/>
+    <p:sldId id="266" r:id="rId16"/>
+    <p:sldId id="267" r:id="rId17"/>
+    <p:sldId id="268" r:id="rId18"/>
+    <p:sldId id="270" r:id="rId19"/>
+    <p:sldId id="269" r:id="rId20"/>
+    <p:sldId id="271" r:id="rId21"/>
+    <p:sldId id="272" r:id="rId22"/>
+    <p:sldId id="273" r:id="rId23"/>
   </p:sldIdLst>
   <p:sldSz cx="12192000" cy="6858000"/>
   <p:notesSz cx="7103745" cy="10234295"/>
@@ -620,7 +622,21 @@
         <p:txBody>
           <a:bodyPr/>
           <a:p>
-            <a:endParaRPr lang="zh-CN" altLang="en-US"/>
+            <a:r>
+              <a:rPr lang="en-US" altLang="zh-CN"/>
+              <a:t>Store屏障，是x86的”sfence“指令</a:t>
+            </a:r>
+            <a:endParaRPr lang="en-US" altLang="zh-CN"/>
+          </a:p>
+          <a:p>
+            <a:endParaRPr lang="en-US" altLang="zh-CN"/>
+          </a:p>
+          <a:p>
+            <a:r>
+              <a:rPr lang="en-US" altLang="zh-CN"/>
+              <a:t>Load屏障，是x86上的”ifence“指令</a:t>
+            </a:r>
+            <a:endParaRPr lang="en-US" altLang="zh-CN"/>
           </a:p>
         </p:txBody>
       </p:sp>
@@ -752,10 +768,6 @@
         <p:txBody>
           <a:bodyPr/>
           <a:p>
-            <a:r>
-              <a:rPr lang="zh-CN" altLang="en-US"/>
-              <a:t>不进行绑定的情况下，该线程</a:t>
-            </a:r>
             <a:endParaRPr lang="zh-CN" altLang="en-US"/>
           </a:p>
         </p:txBody>
@@ -800,48 +812,6 @@
         <p:txBody>
           <a:bodyPr/>
           <a:p>
-            <a:r>
-              <a:rPr lang="zh-CN" altLang="en-US"/>
-              <a:t>初始态 -&gt; 中间态 -&gt; 终止态</a:t>
-            </a:r>
-            <a:endParaRPr lang="zh-CN" altLang="en-US"/>
-          </a:p>
-          <a:p>
-            <a:r>
-              <a:rPr lang="zh-CN" altLang="en-US"/>
-              <a:t>中间态 = 可运行+运行+阻塞+锁池+等待队列</a:t>
-            </a:r>
-            <a:endParaRPr lang="zh-CN" altLang="en-US"/>
-          </a:p>
-          <a:p>
-            <a:endParaRPr lang="zh-CN" altLang="en-US"/>
-          </a:p>
-          <a:p>
-            <a:r>
-              <a:rPr lang="zh-CN" altLang="en-US"/>
-              <a:t>可运行 = new Thread().start</a:t>
-            </a:r>
-            <a:endParaRPr lang="zh-CN" altLang="en-US"/>
-          </a:p>
-          <a:p>
-            <a:r>
-              <a:rPr lang="zh-CN" altLang="en-US"/>
-              <a:t>阻塞 = Thread.sleep(1000)、otherThread.join()</a:t>
-            </a:r>
-            <a:endParaRPr lang="zh-CN" altLang="en-US"/>
-          </a:p>
-          <a:p>
-            <a:r>
-              <a:rPr lang="zh-CN" altLang="en-US"/>
-              <a:t>锁池 = synchronized、RetreenLock</a:t>
-            </a:r>
-            <a:endParaRPr lang="zh-CN" altLang="en-US"/>
-          </a:p>
-          <a:p>
-            <a:r>
-              <a:rPr lang="zh-CN" altLang="en-US"/>
-              <a:t>等待队列 = object.wait()+object.notify()</a:t>
-            </a:r>
             <a:endParaRPr lang="zh-CN" altLang="en-US"/>
           </a:p>
         </p:txBody>
@@ -888,6 +858,140 @@
           <a:p>
             <a:r>
               <a:rPr lang="zh-CN" altLang="en-US"/>
+              <a:t>不进行绑定的情况下，该线程</a:t>
+            </a:r>
+            <a:endParaRPr lang="zh-CN" altLang="en-US"/>
+          </a:p>
+        </p:txBody>
+      </p:sp>
+    </p:spTree>
+  </p:cSld>
+  <p:clrMapOvr>
+    <a:masterClrMapping/>
+  </p:clrMapOvr>
+</p:notes>
+</file>
+
+<file path=ppt/notesSlides/notesSlide17.xml><?xml version="1.0" encoding="utf-8"?>
+<p:notes xmlns:a="http://schemas.openxmlformats.org/drawingml/2006/main" xmlns:r="http://schemas.openxmlformats.org/officeDocument/2006/relationships" xmlns:p="http://schemas.openxmlformats.org/presentationml/2006/main">
+  <p:cSld>
+    <p:spTree>
+      <p:nvGrpSpPr>
+        <p:cNvPr id="1" name=""/>
+        <p:cNvGrpSpPr/>
+        <p:nvPr/>
+      </p:nvGrpSpPr>
+      <p:grpSpPr/>
+      <p:sp>
+        <p:nvSpPr>
+          <p:cNvPr id="2" name="幻灯片图像占位符 1"/>
+          <p:cNvSpPr/>
+          <p:nvPr>
+            <p:ph type="sldImg" idx="2"/>
+          </p:nvPr>
+        </p:nvSpPr>
+        <p:spPr/>
+      </p:sp>
+      <p:sp>
+        <p:nvSpPr>
+          <p:cNvPr id="3" name="文本占位符 2"/>
+          <p:cNvSpPr/>
+          <p:nvPr>
+            <p:ph type="body" idx="3"/>
+          </p:nvPr>
+        </p:nvSpPr>
+        <p:spPr/>
+        <p:txBody>
+          <a:bodyPr/>
+          <a:p>
+            <a:r>
+              <a:rPr lang="zh-CN" altLang="en-US"/>
+              <a:t>初始态 -&gt; 中间态 -&gt; 终止态</a:t>
+            </a:r>
+            <a:endParaRPr lang="zh-CN" altLang="en-US"/>
+          </a:p>
+          <a:p>
+            <a:r>
+              <a:rPr lang="zh-CN" altLang="en-US"/>
+              <a:t>中间态 = 可运行+运行+阻塞+锁池+等待队列</a:t>
+            </a:r>
+            <a:endParaRPr lang="zh-CN" altLang="en-US"/>
+          </a:p>
+          <a:p>
+            <a:endParaRPr lang="zh-CN" altLang="en-US"/>
+          </a:p>
+          <a:p>
+            <a:r>
+              <a:rPr lang="zh-CN" altLang="en-US"/>
+              <a:t>可运行 = new Thread().start</a:t>
+            </a:r>
+            <a:endParaRPr lang="zh-CN" altLang="en-US"/>
+          </a:p>
+          <a:p>
+            <a:r>
+              <a:rPr lang="zh-CN" altLang="en-US"/>
+              <a:t>阻塞 = Thread.sleep(1000)、otherThread.join()</a:t>
+            </a:r>
+            <a:endParaRPr lang="zh-CN" altLang="en-US"/>
+          </a:p>
+          <a:p>
+            <a:r>
+              <a:rPr lang="zh-CN" altLang="en-US"/>
+              <a:t>锁池 = synchronized、RetreenLock</a:t>
+            </a:r>
+            <a:endParaRPr lang="zh-CN" altLang="en-US"/>
+          </a:p>
+          <a:p>
+            <a:r>
+              <a:rPr lang="zh-CN" altLang="en-US"/>
+              <a:t>等待队列 = object.wait()+object.notify()</a:t>
+            </a:r>
+            <a:endParaRPr lang="zh-CN" altLang="en-US"/>
+          </a:p>
+        </p:txBody>
+      </p:sp>
+    </p:spTree>
+  </p:cSld>
+  <p:clrMapOvr>
+    <a:masterClrMapping/>
+  </p:clrMapOvr>
+</p:notes>
+</file>
+
+<file path=ppt/notesSlides/notesSlide18.xml><?xml version="1.0" encoding="utf-8"?>
+<p:notes xmlns:a="http://schemas.openxmlformats.org/drawingml/2006/main" xmlns:r="http://schemas.openxmlformats.org/officeDocument/2006/relationships" xmlns:p="http://schemas.openxmlformats.org/presentationml/2006/main">
+  <p:cSld>
+    <p:spTree>
+      <p:nvGrpSpPr>
+        <p:cNvPr id="1" name=""/>
+        <p:cNvGrpSpPr/>
+        <p:nvPr/>
+      </p:nvGrpSpPr>
+      <p:grpSpPr/>
+      <p:sp>
+        <p:nvSpPr>
+          <p:cNvPr id="2" name="幻灯片图像占位符 1"/>
+          <p:cNvSpPr/>
+          <p:nvPr>
+            <p:ph type="sldImg" idx="2"/>
+          </p:nvPr>
+        </p:nvSpPr>
+        <p:spPr/>
+      </p:sp>
+      <p:sp>
+        <p:nvSpPr>
+          <p:cNvPr id="3" name="文本占位符 2"/>
+          <p:cNvSpPr/>
+          <p:nvPr>
+            <p:ph type="body" idx="3"/>
+          </p:nvPr>
+        </p:nvSpPr>
+        <p:spPr/>
+        <p:txBody>
+          <a:bodyPr/>
+          <a:p>
+            <a:r>
+              <a:rPr lang="zh-CN" altLang="en-US"/>
               <a:t>一篇对伪共享、缓存行填充和CPU缓存讲的很透彻的文章： https://blog.csdn.net/qq_27680317/article/details/78486220</a:t>
             </a:r>
             <a:endParaRPr lang="zh-CN" altLang="en-US"/>
@@ -1023,6 +1127,20 @@
         <p:txBody>
           <a:bodyPr/>
           <a:p>
+            <a:r>
+              <a:rPr lang="en-US" altLang="zh-CN"/>
+              <a:t>Store屏障，是x86的”sfence“指令</a:t>
+            </a:r>
+            <a:endParaRPr lang="en-US" altLang="zh-CN"/>
+          </a:p>
+          <a:p>
+            <a:endParaRPr lang="en-US" altLang="zh-CN"/>
+          </a:p>
+          <a:p>
+            <a:r>
+              <a:rPr lang="en-US" altLang="zh-CN"/>
+              <a:t>Load屏障，是x86上的”ifence“指令</a:t>
+            </a:r>
             <a:endParaRPr lang="en-US" altLang="zh-CN"/>
           </a:p>
         </p:txBody>
@@ -1067,6 +1185,20 @@
         <p:txBody>
           <a:bodyPr/>
           <a:p>
+            <a:r>
+              <a:rPr lang="en-US" altLang="zh-CN"/>
+              <a:t>Store屏障，是x86的”sfence“指令</a:t>
+            </a:r>
+            <a:endParaRPr lang="en-US" altLang="zh-CN"/>
+          </a:p>
+          <a:p>
+            <a:endParaRPr lang="en-US" altLang="zh-CN"/>
+          </a:p>
+          <a:p>
+            <a:r>
+              <a:rPr lang="en-US" altLang="zh-CN"/>
+              <a:t>Load屏障，是x86上的”ifence“指令</a:t>
+            </a:r>
             <a:endParaRPr lang="en-US" altLang="zh-CN"/>
           </a:p>
         </p:txBody>
@@ -1111,39 +1243,7 @@
         <p:txBody>
           <a:bodyPr/>
           <a:p>
-            <a:r>
-              <a:rPr lang="en-US" altLang="zh-CN"/>
-              <a:t>cpu</a:t>
-            </a:r>
-            <a:r>
-              <a:rPr lang="zh-CN" altLang="en-US"/>
-              <a:t>周期：</a:t>
-            </a:r>
-            <a:r>
-              <a:rPr lang="en-US" altLang="zh-CN"/>
-              <a:t>cpu</a:t>
-            </a:r>
-            <a:r>
-              <a:rPr lang="zh-CN" altLang="en-US"/>
-              <a:t>从寄存器中取值所花的时间叫做一个</a:t>
-            </a:r>
-            <a:r>
-              <a:rPr lang="en-US" altLang="zh-CN"/>
-              <a:t>cpu</a:t>
-            </a:r>
-            <a:r>
-              <a:rPr lang="zh-CN" altLang="en-US"/>
-              <a:t>周期，一个</a:t>
-            </a:r>
-            <a:r>
-              <a:rPr lang="en-US" altLang="zh-CN"/>
-              <a:t>cpu</a:t>
-            </a:r>
-            <a:r>
-              <a:rPr lang="zh-CN" altLang="en-US"/>
-              <a:t>周期包含若干个时钟周期</a:t>
-            </a:r>
-            <a:endParaRPr lang="zh-CN" altLang="en-US"/>
+            <a:endParaRPr lang="en-US" altLang="zh-CN"/>
           </a:p>
         </p:txBody>
       </p:sp>
@@ -1187,11 +1287,7 @@
         <p:txBody>
           <a:bodyPr/>
           <a:p>
-            <a:r>
-              <a:rPr lang="zh-CN" altLang="en-US"/>
-              <a:t>如果CPU访问的内存数据不在Cache中（一级、二级、三级），这就产生了Cache Line miss问题，此时CPU不得不发出新的加载指令，从内存中获取数据。通过前面对Cache存储层次的理解，我们知道一旦CPU要从内存中访问数据就会产生一个较大的时延，程序性能显著降低，所谓远水救不了近火。</a:t>
-            </a:r>
-            <a:endParaRPr lang="zh-CN" altLang="en-US"/>
+            <a:endParaRPr lang="en-US" altLang="zh-CN"/>
           </a:p>
         </p:txBody>
       </p:sp>
@@ -1236,8 +1332,36 @@
           <a:bodyPr/>
           <a:p>
             <a:r>
+              <a:rPr lang="en-US" altLang="zh-CN"/>
+              <a:t>cpu</a:t>
+            </a:r>
+            <a:r>
               <a:rPr lang="zh-CN" altLang="en-US"/>
-              <a:t>MESI协议：https://zh.wikipedia.org/wiki/MESI%E5%8D%8F%E8%AE%AE</a:t>
+              <a:t>周期：</a:t>
+            </a:r>
+            <a:r>
+              <a:rPr lang="en-US" altLang="zh-CN"/>
+              <a:t>cpu</a:t>
+            </a:r>
+            <a:r>
+              <a:rPr lang="zh-CN" altLang="en-US"/>
+              <a:t>从寄存器中取值所花的时间叫做一个</a:t>
+            </a:r>
+            <a:r>
+              <a:rPr lang="en-US" altLang="zh-CN"/>
+              <a:t>cpu</a:t>
+            </a:r>
+            <a:r>
+              <a:rPr lang="zh-CN" altLang="en-US"/>
+              <a:t>周期，一个</a:t>
+            </a:r>
+            <a:r>
+              <a:rPr lang="en-US" altLang="zh-CN"/>
+              <a:t>cpu</a:t>
+            </a:r>
+            <a:r>
+              <a:rPr lang="zh-CN" altLang="en-US"/>
+              <a:t>周期包含若干个时钟周期</a:t>
             </a:r>
             <a:endParaRPr lang="zh-CN" altLang="en-US"/>
           </a:p>
@@ -1283,6 +1407,10 @@
         <p:txBody>
           <a:bodyPr/>
           <a:p>
+            <a:r>
+              <a:rPr lang="zh-CN" altLang="en-US"/>
+              <a:t>如果CPU访问的内存数据不在Cache中（一级、二级、三级），这就产生了Cache Line miss问题，此时CPU不得不发出新的加载指令，从内存中获取数据。通过前面对Cache存储层次的理解，我们知道一旦CPU要从内存中访问数据就会产生一个较大的时延，程序性能显著降低，所谓远水救不了近火。</a:t>
+            </a:r>
             <a:endParaRPr lang="zh-CN" altLang="en-US"/>
           </a:p>
         </p:txBody>
@@ -1328,20 +1456,10 @@
           <a:bodyPr/>
           <a:p>
             <a:r>
-              <a:rPr lang="en-US" altLang="zh-CN"/>
-              <a:t>Store屏障，是x86的”sfence“指令</a:t>
-            </a:r>
-            <a:endParaRPr lang="en-US" altLang="zh-CN"/>
-          </a:p>
-          <a:p>
-            <a:endParaRPr lang="en-US" altLang="zh-CN"/>
-          </a:p>
-          <a:p>
-            <a:r>
-              <a:rPr lang="en-US" altLang="zh-CN"/>
-              <a:t>Load屏障，是x86上的”ifence“指令</a:t>
-            </a:r>
-            <a:endParaRPr lang="en-US" altLang="zh-CN"/>
+              <a:rPr lang="zh-CN" altLang="en-US"/>
+              <a:t>MESI协议：https://zh.wikipedia.org/wiki/MESI%E5%8D%8F%E8%AE%AE</a:t>
+            </a:r>
+            <a:endParaRPr lang="zh-CN" altLang="en-US"/>
           </a:p>
         </p:txBody>
       </p:sp>
@@ -3952,6 +4070,1020 @@
           </a:bodyPr>
           <a:p>
             <a:r>
+              <a:rPr lang="en-US" altLang="zh-CN" sz="2400">
+                <a:latin typeface="PingFang SC Regular" panose="020B0400000000000000" charset="-122"/>
+                <a:ea typeface="PingFang SC Regular" panose="020B0400000000000000" charset="-122"/>
+              </a:rPr>
+              <a:t>CacheLine</a:t>
+            </a:r>
+            <a:r>
+              <a:rPr lang="zh-CN" altLang="en-US" sz="2400">
+                <a:latin typeface="PingFang SC Regular" panose="020B0400000000000000" charset="-122"/>
+                <a:ea typeface="PingFang SC Regular" panose="020B0400000000000000" charset="-122"/>
+              </a:rPr>
+              <a:t>：</a:t>
+            </a:r>
+            <a:endParaRPr lang="zh-CN" altLang="en-US" sz="2400">
+              <a:latin typeface="PingFang SC Regular" panose="020B0400000000000000" charset="-122"/>
+              <a:ea typeface="PingFang SC Regular" panose="020B0400000000000000" charset="-122"/>
+            </a:endParaRPr>
+          </a:p>
+        </p:txBody>
+      </p:sp>
+      <p:pic>
+        <p:nvPicPr>
+          <p:cNvPr id="4" name="图片 3"/>
+          <p:cNvPicPr>
+            <a:picLocks noChangeAspect="1"/>
+          </p:cNvPicPr>
+          <p:nvPr/>
+        </p:nvPicPr>
+        <p:blipFill>
+          <a:blip r:embed="rId1"/>
+          <a:stretch>
+            <a:fillRect/>
+          </a:stretch>
+        </p:blipFill>
+        <p:spPr>
+          <a:xfrm>
+            <a:off x="571500" y="1544955"/>
+            <a:ext cx="4812030" cy="3364865"/>
+          </a:xfrm>
+          <a:prstGeom prst="rect">
+            <a:avLst/>
+          </a:prstGeom>
+        </p:spPr>
+      </p:pic>
+      <p:sp>
+        <p:nvSpPr>
+          <p:cNvPr id="7" name="文本框 6"/>
+          <p:cNvSpPr txBox="1"/>
+          <p:nvPr/>
+        </p:nvSpPr>
+        <p:spPr>
+          <a:xfrm>
+            <a:off x="6136005" y="1101725"/>
+            <a:ext cx="5621020" cy="4523105"/>
+          </a:xfrm>
+          <a:prstGeom prst="rect">
+            <a:avLst/>
+          </a:prstGeom>
+          <a:noFill/>
+        </p:spPr>
+        <p:txBody>
+          <a:bodyPr wrap="square" rtlCol="0">
+            <a:spAutoFit/>
+          </a:bodyPr>
+          <a:p>
+            <a:pPr marL="285750" indent="-285750">
+              <a:buFont typeface="Arial" panose="020B0604020202090204" pitchFamily="34" charset="0"/>
+              <a:buChar char="•"/>
+            </a:pPr>
+            <a:r>
+              <a:rPr lang="en-US" altLang="zh-CN">
+                <a:latin typeface="PingFang SC Regular" panose="020B0400000000000000" charset="-122"/>
+                <a:ea typeface="PingFang SC Regular" panose="020B0400000000000000" charset="-122"/>
+                <a:cs typeface="PingFang SC Regular" panose="020B0400000000000000" charset="-122"/>
+              </a:rPr>
+              <a:t>B</a:t>
+            </a:r>
+            <a:r>
+              <a:rPr lang="zh-CN" altLang="en-US">
+                <a:latin typeface="PingFang SC Regular" panose="020B0400000000000000" charset="-122"/>
+                <a:ea typeface="PingFang SC Regular" panose="020B0400000000000000" charset="-122"/>
+                <a:cs typeface="PingFang SC Regular" panose="020B0400000000000000" charset="-122"/>
+              </a:rPr>
+              <a:t>：一行</a:t>
+            </a:r>
+            <a:r>
+              <a:rPr lang="en-US" altLang="zh-CN">
+                <a:latin typeface="PingFang SC Regular" panose="020B0400000000000000" charset="-122"/>
+                <a:ea typeface="PingFang SC Regular" panose="020B0400000000000000" charset="-122"/>
+                <a:cs typeface="PingFang SC Regular" panose="020B0400000000000000" charset="-122"/>
+              </a:rPr>
+              <a:t>CacheLine</a:t>
+            </a:r>
+            <a:r>
+              <a:rPr lang="zh-CN" altLang="en-US">
+                <a:latin typeface="PingFang SC Regular" panose="020B0400000000000000" charset="-122"/>
+                <a:ea typeface="PingFang SC Regular" panose="020B0400000000000000" charset="-122"/>
+                <a:cs typeface="PingFang SC Regular" panose="020B0400000000000000" charset="-122"/>
+              </a:rPr>
+              <a:t>的数据块大小；</a:t>
+            </a:r>
+            <a:endParaRPr lang="zh-CN" altLang="en-US">
+              <a:latin typeface="PingFang SC Regular" panose="020B0400000000000000" charset="-122"/>
+              <a:ea typeface="PingFang SC Regular" panose="020B0400000000000000" charset="-122"/>
+              <a:cs typeface="PingFang SC Regular" panose="020B0400000000000000" charset="-122"/>
+            </a:endParaRPr>
+          </a:p>
+          <a:p>
+            <a:pPr marL="285750" indent="-285750">
+              <a:buFont typeface="Arial" panose="020B0604020202090204" pitchFamily="34" charset="0"/>
+              <a:buChar char="•"/>
+            </a:pPr>
+            <a:r>
+              <a:rPr lang="en-US" altLang="zh-CN">
+                <a:latin typeface="PingFang SC Regular" panose="020B0400000000000000" charset="-122"/>
+                <a:ea typeface="PingFang SC Regular" panose="020B0400000000000000" charset="-122"/>
+                <a:cs typeface="PingFang SC Regular" panose="020B0400000000000000" charset="-122"/>
+              </a:rPr>
+              <a:t>E</a:t>
+            </a:r>
+            <a:r>
+              <a:rPr lang="zh-CN" altLang="en-US">
+                <a:latin typeface="PingFang SC Regular" panose="020B0400000000000000" charset="-122"/>
+                <a:ea typeface="PingFang SC Regular" panose="020B0400000000000000" charset="-122"/>
+                <a:cs typeface="PingFang SC Regular" panose="020B0400000000000000" charset="-122"/>
+              </a:rPr>
+              <a:t>：每组有多少行</a:t>
+            </a:r>
+            <a:r>
+              <a:rPr lang="en-US" altLang="zh-CN">
+                <a:latin typeface="PingFang SC Regular" panose="020B0400000000000000" charset="-122"/>
+                <a:ea typeface="PingFang SC Regular" panose="020B0400000000000000" charset="-122"/>
+                <a:cs typeface="PingFang SC Regular" panose="020B0400000000000000" charset="-122"/>
+              </a:rPr>
+              <a:t>CacheLine</a:t>
+            </a:r>
+            <a:r>
+              <a:rPr lang="zh-CN" altLang="en-US">
+                <a:latin typeface="PingFang SC Regular" panose="020B0400000000000000" charset="-122"/>
+                <a:ea typeface="PingFang SC Regular" panose="020B0400000000000000" charset="-122"/>
+                <a:cs typeface="PingFang SC Regular" panose="020B0400000000000000" charset="-122"/>
+              </a:rPr>
+              <a:t>；</a:t>
+            </a:r>
+            <a:endParaRPr lang="zh-CN" altLang="en-US">
+              <a:latin typeface="PingFang SC Regular" panose="020B0400000000000000" charset="-122"/>
+              <a:ea typeface="PingFang SC Regular" panose="020B0400000000000000" charset="-122"/>
+              <a:cs typeface="PingFang SC Regular" panose="020B0400000000000000" charset="-122"/>
+            </a:endParaRPr>
+          </a:p>
+          <a:p>
+            <a:pPr marL="285750" indent="-285750">
+              <a:buFont typeface="Arial" panose="020B0604020202090204" pitchFamily="34" charset="0"/>
+              <a:buChar char="•"/>
+            </a:pPr>
+            <a:r>
+              <a:rPr lang="en-US" altLang="zh-CN">
+                <a:latin typeface="PingFang SC Regular" panose="020B0400000000000000" charset="-122"/>
+                <a:ea typeface="PingFang SC Regular" panose="020B0400000000000000" charset="-122"/>
+                <a:cs typeface="PingFang SC Regular" panose="020B0400000000000000" charset="-122"/>
+              </a:rPr>
+              <a:t>S</a:t>
+            </a:r>
+            <a:r>
+              <a:rPr lang="zh-CN" altLang="en-US">
+                <a:latin typeface="PingFang SC Regular" panose="020B0400000000000000" charset="-122"/>
+                <a:ea typeface="PingFang SC Regular" panose="020B0400000000000000" charset="-122"/>
+                <a:cs typeface="PingFang SC Regular" panose="020B0400000000000000" charset="-122"/>
+              </a:rPr>
+              <a:t>：整个</a:t>
+            </a:r>
+            <a:r>
+              <a:rPr lang="en-US" altLang="zh-CN">
+                <a:latin typeface="PingFang SC Regular" panose="020B0400000000000000" charset="-122"/>
+                <a:ea typeface="PingFang SC Regular" panose="020B0400000000000000" charset="-122"/>
+                <a:cs typeface="PingFang SC Regular" panose="020B0400000000000000" charset="-122"/>
+              </a:rPr>
+              <a:t>CPU Cache</a:t>
+            </a:r>
+            <a:r>
+              <a:rPr lang="zh-CN" altLang="en-US">
+                <a:latin typeface="PingFang SC Regular" panose="020B0400000000000000" charset="-122"/>
+                <a:ea typeface="PingFang SC Regular" panose="020B0400000000000000" charset="-122"/>
+                <a:cs typeface="PingFang SC Regular" panose="020B0400000000000000" charset="-122"/>
+              </a:rPr>
+              <a:t>有多少组</a:t>
+            </a:r>
+            <a:r>
+              <a:rPr lang="en-US" altLang="zh-CN">
+                <a:latin typeface="PingFang SC Regular" panose="020B0400000000000000" charset="-122"/>
+                <a:ea typeface="PingFang SC Regular" panose="020B0400000000000000" charset="-122"/>
+                <a:cs typeface="PingFang SC Regular" panose="020B0400000000000000" charset="-122"/>
+              </a:rPr>
+              <a:t>CacheSet</a:t>
+            </a:r>
+            <a:r>
+              <a:rPr lang="zh-CN" altLang="en-US">
+                <a:latin typeface="PingFang SC Regular" panose="020B0400000000000000" charset="-122"/>
+                <a:ea typeface="PingFang SC Regular" panose="020B0400000000000000" charset="-122"/>
+                <a:cs typeface="PingFang SC Regular" panose="020B0400000000000000" charset="-122"/>
+              </a:rPr>
+              <a:t>。</a:t>
+            </a:r>
+            <a:endParaRPr lang="en-US" altLang="zh-CN">
+              <a:latin typeface="PingFang SC Regular" panose="020B0400000000000000" charset="-122"/>
+              <a:ea typeface="PingFang SC Regular" panose="020B0400000000000000" charset="-122"/>
+              <a:cs typeface="PingFang SC Regular" panose="020B0400000000000000" charset="-122"/>
+            </a:endParaRPr>
+          </a:p>
+          <a:p>
+            <a:pPr marL="342900" indent="-342900">
+              <a:buFont typeface="Arial" panose="020B0604020202090204" pitchFamily="34" charset="0"/>
+              <a:buAutoNum type="arabicPeriod"/>
+            </a:pPr>
+            <a:endParaRPr lang="zh-CN" altLang="en-US">
+              <a:latin typeface="PingFang SC Regular" panose="020B0400000000000000" charset="-122"/>
+              <a:ea typeface="PingFang SC Regular" panose="020B0400000000000000" charset="-122"/>
+              <a:cs typeface="PingFang SC Regular" panose="020B0400000000000000" charset="-122"/>
+            </a:endParaRPr>
+          </a:p>
+          <a:p>
+            <a:pPr marL="342900" indent="-342900">
+              <a:buFont typeface="Arial" panose="020B0604020202090204" pitchFamily="34" charset="0"/>
+              <a:buAutoNum type="arabicPeriod"/>
+            </a:pPr>
+            <a:endParaRPr lang="en-US" altLang="zh-CN">
+              <a:latin typeface="PingFang SC Regular" panose="020B0400000000000000" charset="-122"/>
+              <a:ea typeface="PingFang SC Regular" panose="020B0400000000000000" charset="-122"/>
+              <a:cs typeface="PingFang SC Regular" panose="020B0400000000000000" charset="-122"/>
+            </a:endParaRPr>
+          </a:p>
+          <a:p>
+            <a:pPr indent="0">
+              <a:buFont typeface="Arial" panose="020B0604020202090204" pitchFamily="34" charset="0"/>
+              <a:buNone/>
+            </a:pPr>
+            <a:r>
+              <a:rPr lang="en-US" altLang="zh-CN">
+                <a:latin typeface="PingFang SC Regular" panose="020B0400000000000000" charset="-122"/>
+                <a:ea typeface="PingFang SC Regular" panose="020B0400000000000000" charset="-122"/>
+                <a:cs typeface="PingFang SC Regular" panose="020B0400000000000000" charset="-122"/>
+              </a:rPr>
+              <a:t>Cache Size = B * E * S</a:t>
+            </a:r>
+            <a:endParaRPr lang="en-US" altLang="zh-CN">
+              <a:latin typeface="PingFang SC Regular" panose="020B0400000000000000" charset="-122"/>
+              <a:ea typeface="PingFang SC Regular" panose="020B0400000000000000" charset="-122"/>
+              <a:cs typeface="PingFang SC Regular" panose="020B0400000000000000" charset="-122"/>
+            </a:endParaRPr>
+          </a:p>
+          <a:p>
+            <a:pPr indent="0">
+              <a:buFont typeface="Arial" panose="020B0604020202090204" pitchFamily="34" charset="0"/>
+              <a:buNone/>
+            </a:pPr>
+            <a:endParaRPr lang="en-US" altLang="zh-CN">
+              <a:latin typeface="PingFang SC Regular" panose="020B0400000000000000" charset="-122"/>
+              <a:ea typeface="PingFang SC Regular" panose="020B0400000000000000" charset="-122"/>
+              <a:cs typeface="PingFang SC Regular" panose="020B0400000000000000" charset="-122"/>
+            </a:endParaRPr>
+          </a:p>
+          <a:p>
+            <a:pPr indent="0">
+              <a:buFont typeface="Arial" panose="020B0604020202090204" pitchFamily="34" charset="0"/>
+              <a:buNone/>
+            </a:pPr>
+            <a:r>
+              <a:rPr lang="zh-CN" altLang="en-US">
+                <a:latin typeface="PingFang SC Regular" panose="020B0400000000000000" charset="-122"/>
+                <a:ea typeface="PingFang SC Regular" panose="020B0400000000000000" charset="-122"/>
+                <a:cs typeface="PingFang SC Regular" panose="020B0400000000000000" charset="-122"/>
+              </a:rPr>
+              <a:t>局部性原理：</a:t>
+            </a:r>
+            <a:endParaRPr lang="zh-CN" altLang="en-US">
+              <a:latin typeface="PingFang SC Regular" panose="020B0400000000000000" charset="-122"/>
+              <a:ea typeface="PingFang SC Regular" panose="020B0400000000000000" charset="-122"/>
+              <a:cs typeface="PingFang SC Regular" panose="020B0400000000000000" charset="-122"/>
+            </a:endParaRPr>
+          </a:p>
+          <a:p>
+            <a:pPr marL="285750" indent="-285750">
+              <a:buFont typeface="Arial" panose="020B0604020202090204" pitchFamily="34" charset="0"/>
+              <a:buChar char="•"/>
+            </a:pPr>
+            <a:r>
+              <a:rPr lang="zh-CN" altLang="en-US">
+                <a:latin typeface="PingFang SC Regular" panose="020B0400000000000000" charset="-122"/>
+                <a:ea typeface="PingFang SC Regular" panose="020B0400000000000000" charset="-122"/>
+                <a:cs typeface="PingFang SC Regular" panose="020B0400000000000000" charset="-122"/>
+              </a:rPr>
+              <a:t>时间局部性：对于同一个数据可能被多次使用，自第一次加载到</a:t>
+            </a:r>
+            <a:r>
+              <a:rPr lang="en-US" altLang="zh-CN">
+                <a:latin typeface="PingFang SC Regular" panose="020B0400000000000000" charset="-122"/>
+                <a:ea typeface="PingFang SC Regular" panose="020B0400000000000000" charset="-122"/>
+                <a:cs typeface="PingFang SC Regular" panose="020B0400000000000000" charset="-122"/>
+              </a:rPr>
+              <a:t>CacheLine</a:t>
+            </a:r>
+            <a:r>
+              <a:rPr lang="zh-CN" altLang="en-US">
+                <a:latin typeface="PingFang SC Regular" panose="020B0400000000000000" charset="-122"/>
+                <a:ea typeface="PingFang SC Regular" panose="020B0400000000000000" charset="-122"/>
+                <a:cs typeface="PingFang SC Regular" panose="020B0400000000000000" charset="-122"/>
+              </a:rPr>
+              <a:t>后，后面的访问就可以多次从</a:t>
+            </a:r>
+            <a:r>
+              <a:rPr lang="en-US" altLang="zh-CN">
+                <a:latin typeface="PingFang SC Regular" panose="020B0400000000000000" charset="-122"/>
+                <a:ea typeface="PingFang SC Regular" panose="020B0400000000000000" charset="-122"/>
+                <a:cs typeface="PingFang SC Regular" panose="020B0400000000000000" charset="-122"/>
+              </a:rPr>
+              <a:t>CacheLine</a:t>
+            </a:r>
+            <a:r>
+              <a:rPr lang="zh-CN" altLang="en-US">
+                <a:latin typeface="PingFang SC Regular" panose="020B0400000000000000" charset="-122"/>
+                <a:ea typeface="PingFang SC Regular" panose="020B0400000000000000" charset="-122"/>
+                <a:cs typeface="PingFang SC Regular" panose="020B0400000000000000" charset="-122"/>
+              </a:rPr>
+              <a:t>中命中，从而提高读取速度（而不是从下层缓存读取）。</a:t>
+            </a:r>
+            <a:endParaRPr lang="zh-CN" altLang="en-US">
+              <a:latin typeface="PingFang SC Regular" panose="020B0400000000000000" charset="-122"/>
+              <a:ea typeface="PingFang SC Regular" panose="020B0400000000000000" charset="-122"/>
+              <a:cs typeface="PingFang SC Regular" panose="020B0400000000000000" charset="-122"/>
+            </a:endParaRPr>
+          </a:p>
+          <a:p>
+            <a:pPr marL="285750" indent="-285750">
+              <a:buFont typeface="Arial" panose="020B0604020202090204" pitchFamily="34" charset="0"/>
+              <a:buChar char="•"/>
+            </a:pPr>
+            <a:r>
+              <a:rPr lang="zh-CN" altLang="en-US">
+                <a:latin typeface="PingFang SC Regular" panose="020B0400000000000000" charset="-122"/>
+                <a:ea typeface="PingFang SC Regular" panose="020B0400000000000000" charset="-122"/>
+                <a:cs typeface="PingFang SC Regular" panose="020B0400000000000000" charset="-122"/>
+              </a:rPr>
+              <a:t>空间局部性：一个</a:t>
+            </a:r>
+            <a:r>
+              <a:rPr lang="en-US" altLang="zh-CN">
+                <a:latin typeface="PingFang SC Regular" panose="020B0400000000000000" charset="-122"/>
+                <a:ea typeface="PingFang SC Regular" panose="020B0400000000000000" charset="-122"/>
+                <a:cs typeface="PingFang SC Regular" panose="020B0400000000000000" charset="-122"/>
+              </a:rPr>
+              <a:t>CacheLine</a:t>
+            </a:r>
+            <a:r>
+              <a:rPr lang="zh-CN" altLang="en-US">
+                <a:latin typeface="PingFang SC Regular" panose="020B0400000000000000" charset="-122"/>
+                <a:ea typeface="PingFang SC Regular" panose="020B0400000000000000" charset="-122"/>
+                <a:cs typeface="PingFang SC Regular" panose="020B0400000000000000" charset="-122"/>
+              </a:rPr>
+              <a:t>一般有</a:t>
+            </a:r>
+            <a:r>
+              <a:rPr lang="en-US" altLang="zh-CN">
+                <a:latin typeface="PingFang SC Regular" panose="020B0400000000000000" charset="-122"/>
+                <a:ea typeface="PingFang SC Regular" panose="020B0400000000000000" charset="-122"/>
+                <a:cs typeface="PingFang SC Regular" panose="020B0400000000000000" charset="-122"/>
+              </a:rPr>
+              <a:t>64Bytes</a:t>
+            </a:r>
+            <a:r>
+              <a:rPr lang="zh-CN" altLang="en-US">
+                <a:latin typeface="PingFang SC Regular" panose="020B0400000000000000" charset="-122"/>
+                <a:ea typeface="PingFang SC Regular" panose="020B0400000000000000" charset="-122"/>
+                <a:cs typeface="PingFang SC Regular" panose="020B0400000000000000" charset="-122"/>
+              </a:rPr>
+              <a:t>，我们可以充分利用一次加载64字节的空间，把程序后续会访问的数据，一次性全部加载进来，从而提高Cache Line命中率。</a:t>
+            </a:r>
+            <a:endParaRPr lang="zh-CN" altLang="en-US">
+              <a:latin typeface="PingFang SC Regular" panose="020B0400000000000000" charset="-122"/>
+              <a:ea typeface="PingFang SC Regular" panose="020B0400000000000000" charset="-122"/>
+              <a:cs typeface="PingFang SC Regular" panose="020B0400000000000000" charset="-122"/>
+            </a:endParaRPr>
+          </a:p>
+        </p:txBody>
+      </p:sp>
+    </p:spTree>
+  </p:cSld>
+  <p:clrMapOvr>
+    <a:masterClrMapping/>
+  </p:clrMapOvr>
+</p:sld>
+</file>
+
+<file path=ppt/slides/slide11.xml><?xml version="1.0" encoding="utf-8"?>
+<p:sld xmlns:a="http://schemas.openxmlformats.org/drawingml/2006/main" xmlns:r="http://schemas.openxmlformats.org/officeDocument/2006/relationships" xmlns:p="http://schemas.openxmlformats.org/presentationml/2006/main">
+  <p:cSld>
+    <p:spTree>
+      <p:nvGrpSpPr>
+        <p:cNvPr id="1" name=""/>
+        <p:cNvGrpSpPr/>
+        <p:nvPr/>
+      </p:nvGrpSpPr>
+      <p:grpSpPr/>
+      <p:sp>
+        <p:nvSpPr>
+          <p:cNvPr id="2" name="文本框 1"/>
+          <p:cNvSpPr txBox="1"/>
+          <p:nvPr/>
+        </p:nvSpPr>
+        <p:spPr>
+          <a:xfrm>
+            <a:off x="356235" y="195580"/>
+            <a:ext cx="7103745" cy="460375"/>
+          </a:xfrm>
+          <a:prstGeom prst="rect">
+            <a:avLst/>
+          </a:prstGeom>
+          <a:noFill/>
+        </p:spPr>
+        <p:txBody>
+          <a:bodyPr wrap="square" rtlCol="0">
+            <a:spAutoFit/>
+          </a:bodyPr>
+          <a:p>
+            <a:r>
+              <a:rPr lang="zh-CN" altLang="en-US" sz="2400">
+                <a:latin typeface="PingFang SC Regular" panose="020B0400000000000000" charset="-122"/>
+                <a:ea typeface="PingFang SC Regular" panose="020B0400000000000000" charset="-122"/>
+              </a:rPr>
+              <a:t>伪共享：</a:t>
+            </a:r>
+            <a:endParaRPr lang="zh-CN" altLang="en-US" sz="2400">
+              <a:latin typeface="PingFang SC Regular" panose="020B0400000000000000" charset="-122"/>
+              <a:ea typeface="PingFang SC Regular" panose="020B0400000000000000" charset="-122"/>
+            </a:endParaRPr>
+          </a:p>
+        </p:txBody>
+      </p:sp>
+      <p:sp>
+        <p:nvSpPr>
+          <p:cNvPr id="7" name="文本框 6"/>
+          <p:cNvSpPr txBox="1"/>
+          <p:nvPr/>
+        </p:nvSpPr>
+        <p:spPr>
+          <a:xfrm>
+            <a:off x="6301105" y="1085850"/>
+            <a:ext cx="5621020" cy="4246245"/>
+          </a:xfrm>
+          <a:prstGeom prst="rect">
+            <a:avLst/>
+          </a:prstGeom>
+          <a:noFill/>
+        </p:spPr>
+        <p:txBody>
+          <a:bodyPr wrap="square" rtlCol="0">
+            <a:spAutoFit/>
+          </a:bodyPr>
+          <a:p>
+            <a:pPr marL="342900" indent="-342900">
+              <a:buFont typeface="Arial" panose="020B0604020202090204" pitchFamily="34" charset="0"/>
+              <a:buAutoNum type="arabicPeriod"/>
+            </a:pPr>
+            <a:r>
+              <a:rPr lang="en-US" altLang="zh-CN">
+                <a:latin typeface="PingFang SC Regular" panose="020B0400000000000000" charset="-122"/>
+                <a:ea typeface="PingFang SC Regular" panose="020B0400000000000000" charset="-122"/>
+                <a:cs typeface="PingFang SC Regular" panose="020B0400000000000000" charset="-122"/>
+              </a:rPr>
+              <a:t>Core1</a:t>
+            </a:r>
+            <a:r>
+              <a:rPr lang="zh-CN" altLang="en-US">
+                <a:latin typeface="PingFang SC Regular" panose="020B0400000000000000" charset="-122"/>
+                <a:ea typeface="PingFang SC Regular" panose="020B0400000000000000" charset="-122"/>
+                <a:cs typeface="PingFang SC Regular" panose="020B0400000000000000" charset="-122"/>
+              </a:rPr>
+              <a:t>修改</a:t>
+            </a:r>
+            <a:r>
+              <a:rPr lang="en-US" altLang="zh-CN">
+                <a:latin typeface="PingFang SC Regular" panose="020B0400000000000000" charset="-122"/>
+                <a:ea typeface="PingFang SC Regular" panose="020B0400000000000000" charset="-122"/>
+                <a:cs typeface="PingFang SC Regular" panose="020B0400000000000000" charset="-122"/>
+              </a:rPr>
+              <a:t>X</a:t>
+            </a:r>
+            <a:r>
+              <a:rPr lang="zh-CN" altLang="en-US">
+                <a:latin typeface="PingFang SC Regular" panose="020B0400000000000000" charset="-122"/>
+                <a:ea typeface="PingFang SC Regular" panose="020B0400000000000000" charset="-122"/>
+                <a:cs typeface="PingFang SC Regular" panose="020B0400000000000000" charset="-122"/>
+              </a:rPr>
+              <a:t>，然后告知其他</a:t>
+            </a:r>
+            <a:r>
+              <a:rPr lang="en-US" altLang="zh-CN">
+                <a:latin typeface="PingFang SC Regular" panose="020B0400000000000000" charset="-122"/>
+                <a:ea typeface="PingFang SC Regular" panose="020B0400000000000000" charset="-122"/>
+                <a:cs typeface="PingFang SC Regular" panose="020B0400000000000000" charset="-122"/>
+              </a:rPr>
+              <a:t>Core</a:t>
+            </a:r>
+            <a:r>
+              <a:rPr lang="zh-CN" altLang="en-US">
+                <a:latin typeface="PingFang SC Regular" panose="020B0400000000000000" charset="-122"/>
+                <a:ea typeface="PingFang SC Regular" panose="020B0400000000000000" charset="-122"/>
+                <a:cs typeface="PingFang SC Regular" panose="020B0400000000000000" charset="-122"/>
+              </a:rPr>
+              <a:t>，</a:t>
+            </a:r>
+            <a:r>
+              <a:rPr lang="en-US" altLang="zh-CN">
+                <a:latin typeface="PingFang SC Regular" panose="020B0400000000000000" charset="-122"/>
+                <a:ea typeface="PingFang SC Regular" panose="020B0400000000000000" charset="-122"/>
+                <a:cs typeface="PingFang SC Regular" panose="020B0400000000000000" charset="-122"/>
+              </a:rPr>
+              <a:t>CacheLine</a:t>
+            </a:r>
+            <a:r>
+              <a:rPr lang="zh-CN" altLang="en-US">
+                <a:latin typeface="PingFang SC Regular" panose="020B0400000000000000" charset="-122"/>
+                <a:ea typeface="PingFang SC Regular" panose="020B0400000000000000" charset="-122"/>
+                <a:cs typeface="PingFang SC Regular" panose="020B0400000000000000" charset="-122"/>
+              </a:rPr>
+              <a:t>状态为</a:t>
+            </a:r>
+            <a:r>
+              <a:rPr lang="en-US" altLang="zh-CN">
+                <a:latin typeface="PingFang SC Regular" panose="020B0400000000000000" charset="-122"/>
+                <a:ea typeface="PingFang SC Regular" panose="020B0400000000000000" charset="-122"/>
+                <a:cs typeface="PingFang SC Regular" panose="020B0400000000000000" charset="-122"/>
+              </a:rPr>
+              <a:t>S(Shared) -&gt; M(Modified)</a:t>
+            </a:r>
+            <a:r>
+              <a:rPr lang="zh-CN" altLang="en-US">
+                <a:latin typeface="PingFang SC Regular" panose="020B0400000000000000" charset="-122"/>
+                <a:ea typeface="PingFang SC Regular" panose="020B0400000000000000" charset="-122"/>
+                <a:cs typeface="PingFang SC Regular" panose="020B0400000000000000" charset="-122"/>
+              </a:rPr>
+              <a:t>；</a:t>
+            </a:r>
+            <a:endParaRPr lang="zh-CN" altLang="en-US">
+              <a:latin typeface="PingFang SC Regular" panose="020B0400000000000000" charset="-122"/>
+              <a:ea typeface="PingFang SC Regular" panose="020B0400000000000000" charset="-122"/>
+              <a:cs typeface="PingFang SC Regular" panose="020B0400000000000000" charset="-122"/>
+            </a:endParaRPr>
+          </a:p>
+          <a:p>
+            <a:pPr marL="342900" indent="-342900">
+              <a:buFont typeface="Arial" panose="020B0604020202090204" pitchFamily="34" charset="0"/>
+              <a:buAutoNum type="arabicPeriod"/>
+            </a:pPr>
+            <a:r>
+              <a:rPr lang="zh-CN" altLang="en-US">
+                <a:latin typeface="PingFang SC Regular" panose="020B0400000000000000" charset="-122"/>
+                <a:ea typeface="PingFang SC Regular" panose="020B0400000000000000" charset="-122"/>
+                <a:cs typeface="PingFang SC Regular" panose="020B0400000000000000" charset="-122"/>
+              </a:rPr>
+              <a:t>随后</a:t>
+            </a:r>
+            <a:r>
+              <a:rPr lang="en-US" altLang="zh-CN">
+                <a:latin typeface="PingFang SC Regular" panose="020B0400000000000000" charset="-122"/>
+                <a:ea typeface="PingFang SC Regular" panose="020B0400000000000000" charset="-122"/>
+                <a:cs typeface="PingFang SC Regular" panose="020B0400000000000000" charset="-122"/>
+              </a:rPr>
+              <a:t>Core2</a:t>
+            </a:r>
+            <a:r>
+              <a:rPr lang="zh-CN" altLang="en-US">
+                <a:latin typeface="PingFang SC Regular" panose="020B0400000000000000" charset="-122"/>
+                <a:ea typeface="PingFang SC Regular" panose="020B0400000000000000" charset="-122"/>
+                <a:cs typeface="PingFang SC Regular" panose="020B0400000000000000" charset="-122"/>
+              </a:rPr>
+              <a:t>发起修改</a:t>
+            </a:r>
+            <a:r>
+              <a:rPr lang="en-US" altLang="zh-CN">
+                <a:latin typeface="PingFang SC Regular" panose="020B0400000000000000" charset="-122"/>
+                <a:ea typeface="PingFang SC Regular" panose="020B0400000000000000" charset="-122"/>
+                <a:cs typeface="PingFang SC Regular" panose="020B0400000000000000" charset="-122"/>
+              </a:rPr>
+              <a:t>Y</a:t>
+            </a:r>
+            <a:r>
+              <a:rPr lang="zh-CN" altLang="en-US">
+                <a:latin typeface="PingFang SC Regular" panose="020B0400000000000000" charset="-122"/>
+                <a:ea typeface="PingFang SC Regular" panose="020B0400000000000000" charset="-122"/>
+                <a:cs typeface="PingFang SC Regular" panose="020B0400000000000000" charset="-122"/>
+              </a:rPr>
+              <a:t>操作，发现</a:t>
+            </a:r>
+            <a:r>
+              <a:rPr lang="en-US" altLang="zh-CN">
+                <a:latin typeface="PingFang SC Regular" panose="020B0400000000000000" charset="-122"/>
+                <a:ea typeface="PingFang SC Regular" panose="020B0400000000000000" charset="-122"/>
+                <a:cs typeface="PingFang SC Regular" panose="020B0400000000000000" charset="-122"/>
+              </a:rPr>
+              <a:t>CacheLine</a:t>
+            </a:r>
+            <a:r>
+              <a:rPr lang="zh-CN" altLang="en-US">
+                <a:latin typeface="PingFang SC Regular" panose="020B0400000000000000" charset="-122"/>
+                <a:ea typeface="PingFang SC Regular" panose="020B0400000000000000" charset="-122"/>
+                <a:cs typeface="PingFang SC Regular" panose="020B0400000000000000" charset="-122"/>
+              </a:rPr>
+              <a:t>状态为</a:t>
+            </a:r>
+            <a:r>
+              <a:rPr lang="en-US" altLang="zh-CN">
+                <a:latin typeface="PingFang SC Regular" panose="020B0400000000000000" charset="-122"/>
+                <a:ea typeface="PingFang SC Regular" panose="020B0400000000000000" charset="-122"/>
+                <a:cs typeface="PingFang SC Regular" panose="020B0400000000000000" charset="-122"/>
+              </a:rPr>
+              <a:t>M</a:t>
+            </a:r>
+            <a:r>
+              <a:rPr lang="zh-CN" altLang="en-US">
+                <a:latin typeface="PingFang SC Regular" panose="020B0400000000000000" charset="-122"/>
+                <a:ea typeface="PingFang SC Regular" panose="020B0400000000000000" charset="-122"/>
+                <a:cs typeface="PingFang SC Regular" panose="020B0400000000000000" charset="-122"/>
+              </a:rPr>
+              <a:t>，先让</a:t>
+            </a:r>
+            <a:r>
+              <a:rPr lang="en-US" altLang="zh-CN">
+                <a:latin typeface="PingFang SC Regular" panose="020B0400000000000000" charset="-122"/>
+                <a:ea typeface="PingFang SC Regular" panose="020B0400000000000000" charset="-122"/>
+                <a:cs typeface="PingFang SC Regular" panose="020B0400000000000000" charset="-122"/>
+              </a:rPr>
+              <a:t>Core1</a:t>
+            </a:r>
+            <a:r>
+              <a:rPr lang="zh-CN" altLang="en-US">
+                <a:latin typeface="PingFang SC Regular" panose="020B0400000000000000" charset="-122"/>
+                <a:ea typeface="PingFang SC Regular" panose="020B0400000000000000" charset="-122"/>
+                <a:cs typeface="PingFang SC Regular" panose="020B0400000000000000" charset="-122"/>
+              </a:rPr>
+              <a:t>将</a:t>
+            </a:r>
+            <a:r>
+              <a:rPr lang="en-US" altLang="zh-CN">
+                <a:latin typeface="PingFang SC Regular" panose="020B0400000000000000" charset="-122"/>
+                <a:ea typeface="PingFang SC Regular" panose="020B0400000000000000" charset="-122"/>
+                <a:cs typeface="PingFang SC Regular" panose="020B0400000000000000" charset="-122"/>
+              </a:rPr>
+              <a:t>X</a:t>
+            </a:r>
+            <a:r>
+              <a:rPr lang="zh-CN" altLang="en-US">
+                <a:latin typeface="PingFang SC Regular" panose="020B0400000000000000" charset="-122"/>
+                <a:ea typeface="PingFang SC Regular" panose="020B0400000000000000" charset="-122"/>
+                <a:cs typeface="PingFang SC Regular" panose="020B0400000000000000" charset="-122"/>
+              </a:rPr>
+              <a:t>写回主存，</a:t>
+            </a:r>
+            <a:r>
+              <a:rPr lang="en-US" altLang="zh-CN">
+                <a:latin typeface="PingFang SC Regular" panose="020B0400000000000000" charset="-122"/>
+                <a:ea typeface="PingFang SC Regular" panose="020B0400000000000000" charset="-122"/>
+                <a:cs typeface="PingFang SC Regular" panose="020B0400000000000000" charset="-122"/>
+              </a:rPr>
+              <a:t>CacheLine</a:t>
+            </a:r>
+            <a:r>
+              <a:rPr lang="zh-CN" altLang="en-US">
+                <a:latin typeface="PingFang SC Regular" panose="020B0400000000000000" charset="-122"/>
+                <a:ea typeface="PingFang SC Regular" panose="020B0400000000000000" charset="-122"/>
+                <a:cs typeface="PingFang SC Regular" panose="020B0400000000000000" charset="-122"/>
+              </a:rPr>
+              <a:t>状态为</a:t>
+            </a:r>
+            <a:r>
+              <a:rPr lang="en-US" altLang="zh-CN">
+                <a:latin typeface="PingFang SC Regular" panose="020B0400000000000000" charset="-122"/>
+                <a:ea typeface="PingFang SC Regular" panose="020B0400000000000000" charset="-122"/>
+                <a:cs typeface="PingFang SC Regular" panose="020B0400000000000000" charset="-122"/>
+              </a:rPr>
+              <a:t>M(Modified) -&gt; I(Invalid)</a:t>
+            </a:r>
+            <a:r>
+              <a:rPr lang="zh-CN" altLang="en-US">
+                <a:latin typeface="PingFang SC Regular" panose="020B0400000000000000" charset="-122"/>
+                <a:ea typeface="PingFang SC Regular" panose="020B0400000000000000" charset="-122"/>
+                <a:cs typeface="PingFang SC Regular" panose="020B0400000000000000" charset="-122"/>
+              </a:rPr>
+              <a:t>；</a:t>
+            </a:r>
+            <a:endParaRPr lang="zh-CN" altLang="en-US">
+              <a:latin typeface="PingFang SC Regular" panose="020B0400000000000000" charset="-122"/>
+              <a:ea typeface="PingFang SC Regular" panose="020B0400000000000000" charset="-122"/>
+              <a:cs typeface="PingFang SC Regular" panose="020B0400000000000000" charset="-122"/>
+            </a:endParaRPr>
+          </a:p>
+          <a:p>
+            <a:pPr marL="342900" indent="-342900">
+              <a:buFont typeface="Arial" panose="020B0604020202090204" pitchFamily="34" charset="0"/>
+              <a:buAutoNum type="arabicPeriod"/>
+            </a:pPr>
+            <a:r>
+              <a:rPr lang="en-US" altLang="zh-CN">
+                <a:latin typeface="PingFang SC Regular" panose="020B0400000000000000" charset="-122"/>
+                <a:ea typeface="PingFang SC Regular" panose="020B0400000000000000" charset="-122"/>
+                <a:cs typeface="PingFang SC Regular" panose="020B0400000000000000" charset="-122"/>
+              </a:rPr>
+              <a:t>Core2</a:t>
+            </a:r>
+            <a:r>
+              <a:rPr lang="zh-CN" altLang="en-US">
+                <a:latin typeface="PingFang SC Regular" panose="020B0400000000000000" charset="-122"/>
+                <a:ea typeface="PingFang SC Regular" panose="020B0400000000000000" charset="-122"/>
+                <a:cs typeface="PingFang SC Regular" panose="020B0400000000000000" charset="-122"/>
+              </a:rPr>
+              <a:t>重新从主存读取该数据，</a:t>
+            </a:r>
+            <a:r>
+              <a:rPr lang="en-US" altLang="zh-CN">
+                <a:latin typeface="PingFang SC Regular" panose="020B0400000000000000" charset="-122"/>
+                <a:ea typeface="PingFang SC Regular" panose="020B0400000000000000" charset="-122"/>
+                <a:cs typeface="PingFang SC Regular" panose="020B0400000000000000" charset="-122"/>
+              </a:rPr>
+              <a:t>CacheLine</a:t>
+            </a:r>
+            <a:r>
+              <a:rPr lang="zh-CN" altLang="en-US">
+                <a:latin typeface="PingFang SC Regular" panose="020B0400000000000000" charset="-122"/>
+                <a:ea typeface="PingFang SC Regular" panose="020B0400000000000000" charset="-122"/>
+                <a:cs typeface="PingFang SC Regular" panose="020B0400000000000000" charset="-122"/>
+              </a:rPr>
+              <a:t>状态为</a:t>
+            </a:r>
+            <a:r>
+              <a:rPr lang="en-US" altLang="zh-CN">
+                <a:latin typeface="PingFang SC Regular" panose="020B0400000000000000" charset="-122"/>
+                <a:ea typeface="PingFang SC Regular" panose="020B0400000000000000" charset="-122"/>
+                <a:cs typeface="PingFang SC Regular" panose="020B0400000000000000" charset="-122"/>
+              </a:rPr>
+              <a:t>I(Invalid) -&gt; E(Exclusive)</a:t>
+            </a:r>
+            <a:r>
+              <a:rPr lang="zh-CN" altLang="en-US">
+                <a:latin typeface="PingFang SC Regular" panose="020B0400000000000000" charset="-122"/>
+                <a:ea typeface="PingFang SC Regular" panose="020B0400000000000000" charset="-122"/>
+                <a:cs typeface="PingFang SC Regular" panose="020B0400000000000000" charset="-122"/>
+              </a:rPr>
+              <a:t>；</a:t>
+            </a:r>
+            <a:endParaRPr lang="zh-CN" altLang="en-US">
+              <a:latin typeface="PingFang SC Regular" panose="020B0400000000000000" charset="-122"/>
+              <a:ea typeface="PingFang SC Regular" panose="020B0400000000000000" charset="-122"/>
+              <a:cs typeface="PingFang SC Regular" panose="020B0400000000000000" charset="-122"/>
+            </a:endParaRPr>
+          </a:p>
+          <a:p>
+            <a:pPr marL="342900" indent="-342900">
+              <a:buFont typeface="Arial" panose="020B0604020202090204" pitchFamily="34" charset="0"/>
+              <a:buAutoNum type="arabicPeriod"/>
+            </a:pPr>
+            <a:r>
+              <a:rPr lang="zh-CN" altLang="en-US">
+                <a:latin typeface="PingFang SC Regular" panose="020B0400000000000000" charset="-122"/>
+                <a:ea typeface="PingFang SC Regular" panose="020B0400000000000000" charset="-122"/>
+                <a:cs typeface="PingFang SC Regular" panose="020B0400000000000000" charset="-122"/>
+              </a:rPr>
+              <a:t>最后</a:t>
+            </a:r>
+            <a:r>
+              <a:rPr lang="en-US" altLang="zh-CN">
+                <a:latin typeface="PingFang SC Regular" panose="020B0400000000000000" charset="-122"/>
+                <a:ea typeface="PingFang SC Regular" panose="020B0400000000000000" charset="-122"/>
+                <a:cs typeface="PingFang SC Regular" panose="020B0400000000000000" charset="-122"/>
+              </a:rPr>
+              <a:t>Core2</a:t>
+            </a:r>
+            <a:r>
+              <a:rPr lang="zh-CN" altLang="en-US">
+                <a:latin typeface="PingFang SC Regular" panose="020B0400000000000000" charset="-122"/>
+                <a:ea typeface="PingFang SC Regular" panose="020B0400000000000000" charset="-122"/>
+                <a:cs typeface="PingFang SC Regular" panose="020B0400000000000000" charset="-122"/>
+              </a:rPr>
+              <a:t>进行修改</a:t>
+            </a:r>
+            <a:r>
+              <a:rPr lang="en-US" altLang="zh-CN">
+                <a:latin typeface="PingFang SC Regular" panose="020B0400000000000000" charset="-122"/>
+                <a:ea typeface="PingFang SC Regular" panose="020B0400000000000000" charset="-122"/>
+                <a:cs typeface="PingFang SC Regular" panose="020B0400000000000000" charset="-122"/>
+              </a:rPr>
+              <a:t>Y</a:t>
+            </a:r>
+            <a:r>
+              <a:rPr lang="zh-CN" altLang="en-US">
+                <a:latin typeface="PingFang SC Regular" panose="020B0400000000000000" charset="-122"/>
+                <a:ea typeface="PingFang SC Regular" panose="020B0400000000000000" charset="-122"/>
+                <a:cs typeface="PingFang SC Regular" panose="020B0400000000000000" charset="-122"/>
+              </a:rPr>
+              <a:t>的操作，</a:t>
+            </a:r>
+            <a:r>
+              <a:rPr lang="en-US" altLang="zh-CN">
+                <a:latin typeface="PingFang SC Regular" panose="020B0400000000000000" charset="-122"/>
+                <a:ea typeface="PingFang SC Regular" panose="020B0400000000000000" charset="-122"/>
+                <a:cs typeface="PingFang SC Regular" panose="020B0400000000000000" charset="-122"/>
+              </a:rPr>
+              <a:t>CacheLine</a:t>
+            </a:r>
+            <a:r>
+              <a:rPr lang="zh-CN" altLang="en-US">
+                <a:latin typeface="PingFang SC Regular" panose="020B0400000000000000" charset="-122"/>
+                <a:ea typeface="PingFang SC Regular" panose="020B0400000000000000" charset="-122"/>
+                <a:cs typeface="PingFang SC Regular" panose="020B0400000000000000" charset="-122"/>
+              </a:rPr>
+              <a:t>状态为</a:t>
+            </a:r>
+            <a:r>
+              <a:rPr lang="en-US" altLang="zh-CN">
+                <a:latin typeface="PingFang SC Regular" panose="020B0400000000000000" charset="-122"/>
+                <a:ea typeface="PingFang SC Regular" panose="020B0400000000000000" charset="-122"/>
+                <a:cs typeface="PingFang SC Regular" panose="020B0400000000000000" charset="-122"/>
+              </a:rPr>
+              <a:t>E(Exclusive) -&gt; M(Modified)</a:t>
+            </a:r>
+            <a:r>
+              <a:rPr lang="zh-CN" altLang="en-US">
+                <a:latin typeface="PingFang SC Regular" panose="020B0400000000000000" charset="-122"/>
+                <a:ea typeface="PingFang SC Regular" panose="020B0400000000000000" charset="-122"/>
+                <a:cs typeface="PingFang SC Regular" panose="020B0400000000000000" charset="-122"/>
+              </a:rPr>
+              <a:t>。</a:t>
+            </a:r>
+            <a:endParaRPr lang="zh-CN" altLang="en-US">
+              <a:latin typeface="PingFang SC Regular" panose="020B0400000000000000" charset="-122"/>
+              <a:ea typeface="PingFang SC Regular" panose="020B0400000000000000" charset="-122"/>
+              <a:cs typeface="PingFang SC Regular" panose="020B0400000000000000" charset="-122"/>
+            </a:endParaRPr>
+          </a:p>
+          <a:p>
+            <a:pPr marL="342900" indent="-342900">
+              <a:buFont typeface="Arial" panose="020B0604020202090204" pitchFamily="34" charset="0"/>
+              <a:buAutoNum type="arabicPeriod"/>
+            </a:pPr>
+            <a:endParaRPr lang="zh-CN" altLang="en-US">
+              <a:latin typeface="PingFang SC Regular" panose="020B0400000000000000" charset="-122"/>
+              <a:ea typeface="PingFang SC Regular" panose="020B0400000000000000" charset="-122"/>
+              <a:cs typeface="PingFang SC Regular" panose="020B0400000000000000" charset="-122"/>
+            </a:endParaRPr>
+          </a:p>
+          <a:p>
+            <a:pPr indent="0">
+              <a:buFont typeface="Arial" panose="020B0604020202090204" pitchFamily="34" charset="0"/>
+              <a:buNone/>
+            </a:pPr>
+            <a:endParaRPr lang="zh-CN" altLang="en-US">
+              <a:latin typeface="PingFang SC Regular" panose="020B0400000000000000" charset="-122"/>
+              <a:ea typeface="PingFang SC Regular" panose="020B0400000000000000" charset="-122"/>
+              <a:cs typeface="PingFang SC Regular" panose="020B0400000000000000" charset="-122"/>
+            </a:endParaRPr>
+          </a:p>
+          <a:p>
+            <a:pPr indent="0">
+              <a:buFont typeface="Arial" panose="020B0604020202090204" pitchFamily="34" charset="0"/>
+              <a:buNone/>
+            </a:pPr>
+            <a:r>
+              <a:rPr lang="zh-CN" altLang="en-US">
+                <a:latin typeface="PingFang SC Regular" panose="020B0400000000000000" charset="-122"/>
+                <a:ea typeface="PingFang SC Regular" panose="020B0400000000000000" charset="-122"/>
+                <a:cs typeface="PingFang SC Regular" panose="020B0400000000000000" charset="-122"/>
+              </a:rPr>
+              <a:t>解决方案：</a:t>
+            </a:r>
+            <a:endParaRPr lang="zh-CN" altLang="en-US">
+              <a:latin typeface="PingFang SC Regular" panose="020B0400000000000000" charset="-122"/>
+              <a:ea typeface="PingFang SC Regular" panose="020B0400000000000000" charset="-122"/>
+              <a:cs typeface="PingFang SC Regular" panose="020B0400000000000000" charset="-122"/>
+            </a:endParaRPr>
+          </a:p>
+          <a:p>
+            <a:pPr marL="342900" indent="-342900">
+              <a:buFont typeface="Arial" panose="020B0604020202090204" pitchFamily="34" charset="0"/>
+              <a:buAutoNum type="arabicPeriod"/>
+            </a:pPr>
+            <a:r>
+              <a:rPr lang="en-US" altLang="zh-CN">
+                <a:latin typeface="PingFang SC Regular" panose="020B0400000000000000" charset="-122"/>
+                <a:ea typeface="PingFang SC Regular" panose="020B0400000000000000" charset="-122"/>
+                <a:cs typeface="PingFang SC Regular" panose="020B0400000000000000" charset="-122"/>
+              </a:rPr>
+              <a:t>padding</a:t>
+            </a:r>
+            <a:r>
+              <a:rPr lang="zh-CN" altLang="en-US">
+                <a:latin typeface="PingFang SC Regular" panose="020B0400000000000000" charset="-122"/>
+                <a:ea typeface="PingFang SC Regular" panose="020B0400000000000000" charset="-122"/>
+                <a:cs typeface="PingFang SC Regular" panose="020B0400000000000000" charset="-122"/>
+              </a:rPr>
+              <a:t>；</a:t>
+            </a:r>
+            <a:endParaRPr lang="zh-CN" altLang="en-US">
+              <a:latin typeface="PingFang SC Regular" panose="020B0400000000000000" charset="-122"/>
+              <a:ea typeface="PingFang SC Regular" panose="020B0400000000000000" charset="-122"/>
+              <a:cs typeface="PingFang SC Regular" panose="020B0400000000000000" charset="-122"/>
+            </a:endParaRPr>
+          </a:p>
+          <a:p>
+            <a:pPr marL="342900" indent="-342900">
+              <a:buFont typeface="Arial" panose="020B0604020202090204" pitchFamily="34" charset="0"/>
+              <a:buAutoNum type="arabicPeriod"/>
+            </a:pPr>
+            <a:r>
+              <a:rPr lang="zh-CN" altLang="en-US">
+                <a:latin typeface="PingFang SC Regular" panose="020B0400000000000000" charset="-122"/>
+                <a:ea typeface="PingFang SC Regular" panose="020B0400000000000000" charset="-122"/>
+                <a:cs typeface="PingFang SC Regular" panose="020B0400000000000000" charset="-122"/>
+              </a:rPr>
+              <a:t>在每个线程中创建全局数组各个元素的本地拷贝，然后结束后再写回全局数组。</a:t>
+            </a:r>
+            <a:endParaRPr lang="zh-CN" altLang="en-US">
+              <a:latin typeface="PingFang SC Regular" panose="020B0400000000000000" charset="-122"/>
+              <a:ea typeface="PingFang SC Regular" panose="020B0400000000000000" charset="-122"/>
+              <a:cs typeface="PingFang SC Regular" panose="020B0400000000000000" charset="-122"/>
+            </a:endParaRPr>
+          </a:p>
+        </p:txBody>
+      </p:sp>
+      <p:pic>
+        <p:nvPicPr>
+          <p:cNvPr id="5" name="图片 4"/>
+          <p:cNvPicPr>
+            <a:picLocks noChangeAspect="1"/>
+          </p:cNvPicPr>
+          <p:nvPr/>
+        </p:nvPicPr>
+        <p:blipFill>
+          <a:blip r:embed="rId1"/>
+          <a:stretch>
+            <a:fillRect/>
+          </a:stretch>
+        </p:blipFill>
+        <p:spPr>
+          <a:xfrm>
+            <a:off x="458470" y="655955"/>
+            <a:ext cx="4291965" cy="3195955"/>
+          </a:xfrm>
+          <a:prstGeom prst="rect">
+            <a:avLst/>
+          </a:prstGeom>
+        </p:spPr>
+      </p:pic>
+      <p:pic>
+        <p:nvPicPr>
+          <p:cNvPr id="8" name="图片 7"/>
+          <p:cNvPicPr>
+            <a:picLocks noChangeAspect="1"/>
+          </p:cNvPicPr>
+          <p:nvPr/>
+        </p:nvPicPr>
+        <p:blipFill>
+          <a:blip r:embed="rId2"/>
+          <a:stretch>
+            <a:fillRect/>
+          </a:stretch>
+        </p:blipFill>
+        <p:spPr>
+          <a:xfrm>
+            <a:off x="458470" y="3908425"/>
+            <a:ext cx="5023485" cy="2740025"/>
+          </a:xfrm>
+          <a:prstGeom prst="rect">
+            <a:avLst/>
+          </a:prstGeom>
+        </p:spPr>
+      </p:pic>
+    </p:spTree>
+  </p:cSld>
+  <p:clrMapOvr>
+    <a:masterClrMapping/>
+  </p:clrMapOvr>
+</p:sld>
+</file>
+
+<file path=ppt/slides/slide12.xml><?xml version="1.0" encoding="utf-8"?>
+<p:sld xmlns:a="http://schemas.openxmlformats.org/drawingml/2006/main" xmlns:r="http://schemas.openxmlformats.org/officeDocument/2006/relationships" xmlns:p="http://schemas.openxmlformats.org/presentationml/2006/main">
+  <p:cSld>
+    <p:spTree>
+      <p:nvGrpSpPr>
+        <p:cNvPr id="1" name=""/>
+        <p:cNvGrpSpPr/>
+        <p:nvPr/>
+      </p:nvGrpSpPr>
+      <p:grpSpPr/>
+      <p:sp>
+        <p:nvSpPr>
+          <p:cNvPr id="2" name="文本框 1"/>
+          <p:cNvSpPr txBox="1"/>
+          <p:nvPr/>
+        </p:nvSpPr>
+        <p:spPr>
+          <a:xfrm>
+            <a:off x="356235" y="195580"/>
+            <a:ext cx="7103745" cy="460375"/>
+          </a:xfrm>
+          <a:prstGeom prst="rect">
+            <a:avLst/>
+          </a:prstGeom>
+          <a:noFill/>
+        </p:spPr>
+        <p:txBody>
+          <a:bodyPr wrap="square" rtlCol="0">
+            <a:spAutoFit/>
+          </a:bodyPr>
+          <a:p>
+            <a:r>
               <a:rPr lang="zh-CN" altLang="en-US" sz="2400">
                 <a:latin typeface="PingFang SC Regular" panose="020B0400000000000000" charset="-122"/>
                 <a:ea typeface="PingFang SC Regular" panose="020B0400000000000000" charset="-122"/>
@@ -3997,7 +5129,7 @@
 </p:sld>
 </file>
 
-<file path=ppt/slides/slide11.xml><?xml version="1.0" encoding="utf-8"?>
+<file path=ppt/slides/slide13.xml><?xml version="1.0" encoding="utf-8"?>
 <p:sld xmlns:a="http://schemas.openxmlformats.org/drawingml/2006/main" xmlns:r="http://schemas.openxmlformats.org/officeDocument/2006/relationships" xmlns:p="http://schemas.openxmlformats.org/presentationml/2006/main">
   <p:cSld>
     <p:spTree>
@@ -4463,7 +5595,7 @@
 </p:sld>
 </file>
 
-<file path=ppt/slides/slide12.xml><?xml version="1.0" encoding="utf-8"?>
+<file path=ppt/slides/slide14.xml><?xml version="1.0" encoding="utf-8"?>
 <p:sld xmlns:a="http://schemas.openxmlformats.org/drawingml/2006/main" xmlns:r="http://schemas.openxmlformats.org/officeDocument/2006/relationships" xmlns:p="http://schemas.openxmlformats.org/presentationml/2006/main">
   <p:cSld>
     <p:spTree>
@@ -4713,7 +5845,7 @@
 </p:sld>
 </file>
 
-<file path=ppt/slides/slide13.xml><?xml version="1.0" encoding="utf-8"?>
+<file path=ppt/slides/slide15.xml><?xml version="1.0" encoding="utf-8"?>
 <p:sld xmlns:a="http://schemas.openxmlformats.org/drawingml/2006/main" xmlns:r="http://schemas.openxmlformats.org/officeDocument/2006/relationships" xmlns:p="http://schemas.openxmlformats.org/presentationml/2006/main">
   <p:cSld>
     <p:spTree>
@@ -4954,7 +6086,7 @@
 </p:sld>
 </file>
 
-<file path=ppt/slides/slide14.xml><?xml version="1.0" encoding="utf-8"?>
+<file path=ppt/slides/slide16.xml><?xml version="1.0" encoding="utf-8"?>
 <p:sld xmlns:a="http://schemas.openxmlformats.org/drawingml/2006/main" xmlns:r="http://schemas.openxmlformats.org/officeDocument/2006/relationships" xmlns:p="http://schemas.openxmlformats.org/presentationml/2006/main">
   <p:cSld>
     <p:spTree>
@@ -5148,7 +6280,7 @@
 </p:sld>
 </file>
 
-<file path=ppt/slides/slide15.xml><?xml version="1.0" encoding="utf-8"?>
+<file path=ppt/slides/slide17.xml><?xml version="1.0" encoding="utf-8"?>
 <p:sld xmlns:a="http://schemas.openxmlformats.org/drawingml/2006/main" xmlns:r="http://schemas.openxmlformats.org/officeDocument/2006/relationships" xmlns:p="http://schemas.openxmlformats.org/presentationml/2006/main">
   <p:cSld>
     <p:spTree>
@@ -5334,7 +6466,7 @@
 </p:sld>
 </file>
 
-<file path=ppt/slides/slide16.xml><?xml version="1.0" encoding="utf-8"?>
+<file path=ppt/slides/slide18.xml><?xml version="1.0" encoding="utf-8"?>
 <p:sld xmlns:a="http://schemas.openxmlformats.org/drawingml/2006/main" xmlns:r="http://schemas.openxmlformats.org/officeDocument/2006/relationships" xmlns:p="http://schemas.openxmlformats.org/presentationml/2006/main">
   <p:cSld>
     <p:spTree>
@@ -6108,7 +7240,7 @@
 </p:sld>
 </file>
 
-<file path=ppt/slides/slide17.xml><?xml version="1.0" encoding="utf-8"?>
+<file path=ppt/slides/slide19.xml><?xml version="1.0" encoding="utf-8"?>
 <p:sld xmlns:a="http://schemas.openxmlformats.org/drawingml/2006/main" xmlns:r="http://schemas.openxmlformats.org/officeDocument/2006/relationships" xmlns:p="http://schemas.openxmlformats.org/presentationml/2006/main">
   <p:cSld>
     <p:spTree>
@@ -6185,578 +7317,6 @@
 </p:sld>
 </file>
 
-<file path=ppt/slides/slide18.xml><?xml version="1.0" encoding="utf-8"?>
-<p:sld xmlns:a="http://schemas.openxmlformats.org/drawingml/2006/main" xmlns:r="http://schemas.openxmlformats.org/officeDocument/2006/relationships" xmlns:p="http://schemas.openxmlformats.org/presentationml/2006/main">
-  <p:cSld>
-    <p:spTree>
-      <p:nvGrpSpPr>
-        <p:cNvPr id="1" name=""/>
-        <p:cNvGrpSpPr/>
-        <p:nvPr/>
-      </p:nvGrpSpPr>
-      <p:grpSpPr/>
-      <p:sp>
-        <p:nvSpPr>
-          <p:cNvPr id="2" name="文本框 1"/>
-          <p:cNvSpPr txBox="1"/>
-          <p:nvPr/>
-        </p:nvSpPr>
-        <p:spPr>
-          <a:xfrm>
-            <a:off x="356235" y="195580"/>
-            <a:ext cx="9283065" cy="460375"/>
-          </a:xfrm>
-          <a:prstGeom prst="rect">
-            <a:avLst/>
-          </a:prstGeom>
-          <a:noFill/>
-        </p:spPr>
-        <p:txBody>
-          <a:bodyPr wrap="square" rtlCol="0">
-            <a:spAutoFit/>
-          </a:bodyPr>
-          <a:p>
-            <a:r>
-              <a:rPr lang="en-US" altLang="zh-CN" sz="2400">
-                <a:latin typeface="PingFang SC Regular" panose="020B0400000000000000" charset="-122"/>
-                <a:ea typeface="PingFang SC Regular" panose="020B0400000000000000" charset="-122"/>
-              </a:rPr>
-              <a:t>EventProcessor</a:t>
-            </a:r>
-            <a:r>
-              <a:rPr lang="zh-CN" altLang="en-US" sz="2400">
-                <a:latin typeface="PingFang SC Regular" panose="020B0400000000000000" charset="-122"/>
-                <a:ea typeface="PingFang SC Regular" panose="020B0400000000000000" charset="-122"/>
-              </a:rPr>
-              <a:t>——消费者</a:t>
-            </a:r>
-            <a:endParaRPr lang="zh-CN" altLang="en-US" sz="2400">
-              <a:latin typeface="PingFang SC Regular" panose="020B0400000000000000" charset="-122"/>
-              <a:ea typeface="PingFang SC Regular" panose="020B0400000000000000" charset="-122"/>
-            </a:endParaRPr>
-          </a:p>
-        </p:txBody>
-      </p:sp>
-      <p:sp>
-        <p:nvSpPr>
-          <p:cNvPr id="3" name="文本框 2"/>
-          <p:cNvSpPr txBox="1"/>
-          <p:nvPr/>
-        </p:nvSpPr>
-        <p:spPr>
-          <a:xfrm>
-            <a:off x="356235" y="943610"/>
-            <a:ext cx="9514205" cy="368300"/>
-          </a:xfrm>
-          <a:prstGeom prst="rect">
-            <a:avLst/>
-          </a:prstGeom>
-          <a:noFill/>
-        </p:spPr>
-        <p:txBody>
-          <a:bodyPr wrap="square" rtlCol="0">
-            <a:spAutoFit/>
-          </a:bodyPr>
-          <a:p>
-            <a:r>
-              <a:rPr lang="zh-CN" altLang="en-US">
-                <a:latin typeface="PingFang SC Regular" panose="020B0400000000000000" charset="-122"/>
-                <a:ea typeface="PingFang SC Regular" panose="020B0400000000000000" charset="-122"/>
-              </a:rPr>
-              <a:t>分单线程消费者</a:t>
-            </a:r>
-            <a:r>
-              <a:rPr lang="en-US" altLang="zh-CN">
-                <a:latin typeface="PingFang SC Regular" panose="020B0400000000000000" charset="-122"/>
-                <a:ea typeface="PingFang SC Regular" panose="020B0400000000000000" charset="-122"/>
-              </a:rPr>
-              <a:t>(BatchEventProcessor)</a:t>
-            </a:r>
-            <a:r>
-              <a:rPr lang="zh-CN" altLang="en-US">
-                <a:latin typeface="PingFang SC Regular" panose="020B0400000000000000" charset="-122"/>
-                <a:ea typeface="PingFang SC Regular" panose="020B0400000000000000" charset="-122"/>
-              </a:rPr>
-              <a:t>和线程池模式消费者</a:t>
-            </a:r>
-            <a:r>
-              <a:rPr lang="en-US" altLang="zh-CN">
-                <a:latin typeface="PingFang SC Regular" panose="020B0400000000000000" charset="-122"/>
-                <a:ea typeface="PingFang SC Regular" panose="020B0400000000000000" charset="-122"/>
-              </a:rPr>
-              <a:t>(WorkProcessor)</a:t>
-            </a:r>
-            <a:endParaRPr lang="en-US" altLang="zh-CN">
-              <a:latin typeface="PingFang SC Regular" panose="020B0400000000000000" charset="-122"/>
-              <a:ea typeface="PingFang SC Regular" panose="020B0400000000000000" charset="-122"/>
-            </a:endParaRPr>
-          </a:p>
-        </p:txBody>
-      </p:sp>
-      <p:sp>
-        <p:nvSpPr>
-          <p:cNvPr id="5" name="文本框 4"/>
-          <p:cNvSpPr txBox="1"/>
-          <p:nvPr/>
-        </p:nvSpPr>
-        <p:spPr>
-          <a:xfrm>
-            <a:off x="356235" y="1599565"/>
-            <a:ext cx="11367135" cy="2214880"/>
-          </a:xfrm>
-          <a:prstGeom prst="rect">
-            <a:avLst/>
-          </a:prstGeom>
-          <a:noFill/>
-        </p:spPr>
-        <p:txBody>
-          <a:bodyPr wrap="square" rtlCol="0" anchor="t">
-            <a:spAutoFit/>
-          </a:bodyPr>
-          <a:p>
-            <a:r>
-              <a:rPr lang="en-US" altLang="zh-CN" sz="2400">
-                <a:latin typeface="PingFang SC Regular" panose="020B0400000000000000" charset="-122"/>
-                <a:ea typeface="PingFang SC Regular" panose="020B0400000000000000" charset="-122"/>
-                <a:sym typeface="+mn-ea"/>
-              </a:rPr>
-              <a:t>disruptor VS golang channel</a:t>
-            </a:r>
-            <a:endParaRPr lang="en-US" altLang="zh-CN" sz="2400">
-              <a:latin typeface="PingFang SC Regular" panose="020B0400000000000000" charset="-122"/>
-              <a:ea typeface="PingFang SC Regular" panose="020B0400000000000000" charset="-122"/>
-              <a:sym typeface="+mn-ea"/>
-            </a:endParaRPr>
-          </a:p>
-          <a:p>
-            <a:endParaRPr lang="en-US" altLang="zh-CN" sz="2400">
-              <a:latin typeface="PingFang SC Regular" panose="020B0400000000000000" charset="-122"/>
-              <a:ea typeface="PingFang SC Regular" panose="020B0400000000000000" charset="-122"/>
-              <a:sym typeface="+mn-ea"/>
-            </a:endParaRPr>
-          </a:p>
-          <a:p>
-            <a:pPr marL="342900" indent="-342900">
-              <a:buFont typeface="Arial" panose="020B0604020202090204" pitchFamily="34" charset="0"/>
-              <a:buChar char="•"/>
-            </a:pPr>
-            <a:r>
-              <a:rPr lang="en-US" altLang="zh-CN">
-                <a:latin typeface="PingFang SC Regular" panose="020B0400000000000000" charset="-122"/>
-                <a:ea typeface="PingFang SC Regular" panose="020B0400000000000000" charset="-122"/>
-                <a:sym typeface="+mn-ea"/>
-              </a:rPr>
-              <a:t>disruptor</a:t>
-            </a:r>
-            <a:r>
-              <a:rPr lang="zh-CN" altLang="en-US">
-                <a:latin typeface="PingFang SC Regular" panose="020B0400000000000000" charset="-122"/>
-                <a:ea typeface="PingFang SC Regular" panose="020B0400000000000000" charset="-122"/>
-                <a:sym typeface="+mn-ea"/>
-              </a:rPr>
-              <a:t>具备复杂多样的等待策略，</a:t>
-            </a:r>
-            <a:r>
-              <a:rPr lang="en-US" altLang="zh-CN">
-                <a:latin typeface="PingFang SC Regular" panose="020B0400000000000000" charset="-122"/>
-                <a:ea typeface="PingFang SC Regular" panose="020B0400000000000000" charset="-122"/>
-                <a:sym typeface="+mn-ea"/>
-              </a:rPr>
-              <a:t>golang channel</a:t>
-            </a:r>
-            <a:r>
-              <a:rPr lang="zh-CN" altLang="en-US">
-                <a:latin typeface="PingFang SC Regular" panose="020B0400000000000000" charset="-122"/>
-                <a:ea typeface="PingFang SC Regular" panose="020B0400000000000000" charset="-122"/>
-                <a:sym typeface="+mn-ea"/>
-              </a:rPr>
-              <a:t>只有</a:t>
-            </a:r>
-            <a:r>
-              <a:rPr lang="en-US" altLang="zh-CN">
-                <a:latin typeface="PingFang SC Regular" panose="020B0400000000000000" charset="-122"/>
-                <a:ea typeface="PingFang SC Regular" panose="020B0400000000000000" charset="-122"/>
-                <a:sym typeface="+mn-ea"/>
-              </a:rPr>
-              <a:t>yield</a:t>
-            </a:r>
-            <a:r>
-              <a:rPr lang="zh-CN" altLang="en-US">
-                <a:latin typeface="PingFang SC Regular" panose="020B0400000000000000" charset="-122"/>
-                <a:ea typeface="PingFang SC Regular" panose="020B0400000000000000" charset="-122"/>
-                <a:sym typeface="+mn-ea"/>
-              </a:rPr>
-              <a:t>一种；</a:t>
-            </a:r>
-            <a:endParaRPr lang="zh-CN" altLang="en-US">
-              <a:latin typeface="PingFang SC Regular" panose="020B0400000000000000" charset="-122"/>
-              <a:ea typeface="PingFang SC Regular" panose="020B0400000000000000" charset="-122"/>
-              <a:sym typeface="+mn-ea"/>
-            </a:endParaRPr>
-          </a:p>
-          <a:p>
-            <a:pPr marL="342900" indent="-342900">
-              <a:buFont typeface="Arial" panose="020B0604020202090204" pitchFamily="34" charset="0"/>
-              <a:buChar char="•"/>
-            </a:pPr>
-            <a:r>
-              <a:rPr lang="en-US" altLang="zh-CN">
-                <a:latin typeface="PingFang SC Regular" panose="020B0400000000000000" charset="-122"/>
-                <a:ea typeface="PingFang SC Regular" panose="020B0400000000000000" charset="-122"/>
-                <a:sym typeface="+mn-ea"/>
-              </a:rPr>
-              <a:t>golang channel</a:t>
-            </a:r>
-            <a:r>
-              <a:rPr lang="zh-CN" altLang="en-US">
-                <a:latin typeface="PingFang SC Regular" panose="020B0400000000000000" charset="-122"/>
-                <a:ea typeface="PingFang SC Regular" panose="020B0400000000000000" charset="-122"/>
-                <a:sym typeface="+mn-ea"/>
-              </a:rPr>
-              <a:t>并未考虑</a:t>
-            </a:r>
-            <a:r>
-              <a:rPr lang="en-US" altLang="zh-CN">
-                <a:latin typeface="PingFang SC Regular" panose="020B0400000000000000" charset="-122"/>
-                <a:ea typeface="PingFang SC Regular" panose="020B0400000000000000" charset="-122"/>
-                <a:sym typeface="+mn-ea"/>
-              </a:rPr>
-              <a:t>cpu</a:t>
-            </a:r>
-            <a:r>
-              <a:rPr lang="zh-CN" altLang="en-US">
-                <a:latin typeface="PingFang SC Regular" panose="020B0400000000000000" charset="-122"/>
-                <a:ea typeface="PingFang SC Regular" panose="020B0400000000000000" charset="-122"/>
-                <a:sym typeface="+mn-ea"/>
-              </a:rPr>
-              <a:t>的伪共享问题；</a:t>
-            </a:r>
-            <a:endParaRPr lang="zh-CN" altLang="en-US">
-              <a:latin typeface="PingFang SC Regular" panose="020B0400000000000000" charset="-122"/>
-              <a:ea typeface="PingFang SC Regular" panose="020B0400000000000000" charset="-122"/>
-              <a:sym typeface="+mn-ea"/>
-            </a:endParaRPr>
-          </a:p>
-          <a:p>
-            <a:pPr marL="342900" indent="-342900">
-              <a:buFont typeface="Arial" panose="020B0604020202090204" pitchFamily="34" charset="0"/>
-              <a:buChar char="•"/>
-            </a:pPr>
-            <a:r>
-              <a:rPr lang="en-US" altLang="zh-CN">
-                <a:latin typeface="PingFang SC Regular" panose="020B0400000000000000" charset="-122"/>
-                <a:ea typeface="PingFang SC Regular" panose="020B0400000000000000" charset="-122"/>
-                <a:sym typeface="+mn-ea"/>
-              </a:rPr>
-              <a:t>golang channel</a:t>
-            </a:r>
-            <a:r>
-              <a:rPr lang="zh-CN" altLang="en-US">
-                <a:latin typeface="PingFang SC Regular" panose="020B0400000000000000" charset="-122"/>
-                <a:ea typeface="PingFang SC Regular" panose="020B0400000000000000" charset="-122"/>
-                <a:sym typeface="+mn-ea"/>
-              </a:rPr>
-              <a:t>真正存储数据，</a:t>
-            </a:r>
-            <a:r>
-              <a:rPr lang="en-US" altLang="zh-CN">
-                <a:latin typeface="PingFang SC Regular" panose="020B0400000000000000" charset="-122"/>
-                <a:ea typeface="PingFang SC Regular" panose="020B0400000000000000" charset="-122"/>
-                <a:sym typeface="+mn-ea"/>
-              </a:rPr>
-              <a:t>disruptor</a:t>
-            </a:r>
-            <a:r>
-              <a:rPr lang="zh-CN" altLang="en-US">
-                <a:latin typeface="PingFang SC Regular" panose="020B0400000000000000" charset="-122"/>
-                <a:ea typeface="PingFang SC Regular" panose="020B0400000000000000" charset="-122"/>
-                <a:sym typeface="+mn-ea"/>
-              </a:rPr>
-              <a:t>依赖外部的工具类</a:t>
-            </a:r>
-            <a:r>
-              <a:rPr lang="en-US" altLang="zh-CN">
-                <a:latin typeface="PingFang SC Regular" panose="020B0400000000000000" charset="-122"/>
-                <a:ea typeface="PingFang SC Regular" panose="020B0400000000000000" charset="-122"/>
-                <a:sym typeface="+mn-ea"/>
-              </a:rPr>
-              <a:t>dataProvider</a:t>
-            </a:r>
-            <a:r>
-              <a:rPr lang="zh-CN" altLang="en-US">
-                <a:latin typeface="PingFang SC Regular" panose="020B0400000000000000" charset="-122"/>
-                <a:ea typeface="PingFang SC Regular" panose="020B0400000000000000" charset="-122"/>
-                <a:sym typeface="+mn-ea"/>
-              </a:rPr>
-              <a:t>来获取真正的对象，带来代码耦合；</a:t>
-            </a:r>
-            <a:endParaRPr lang="zh-CN" altLang="en-US">
-              <a:latin typeface="PingFang SC Regular" panose="020B0400000000000000" charset="-122"/>
-              <a:ea typeface="PingFang SC Regular" panose="020B0400000000000000" charset="-122"/>
-              <a:sym typeface="+mn-ea"/>
-            </a:endParaRPr>
-          </a:p>
-          <a:p>
-            <a:pPr marL="342900" indent="-342900">
-              <a:buFont typeface="Arial" panose="020B0604020202090204" pitchFamily="34" charset="0"/>
-              <a:buChar char="•"/>
-            </a:pPr>
-            <a:r>
-              <a:rPr lang="en-US" altLang="zh-CN">
-                <a:latin typeface="PingFang SC Regular" panose="020B0400000000000000" charset="-122"/>
-                <a:ea typeface="PingFang SC Regular" panose="020B0400000000000000" charset="-122"/>
-                <a:sym typeface="+mn-ea"/>
-              </a:rPr>
-              <a:t>disruptor benchmark</a:t>
-            </a:r>
-            <a:r>
-              <a:rPr lang="zh-CN" altLang="en-US">
-                <a:latin typeface="PingFang SC Regular" panose="020B0400000000000000" charset="-122"/>
-                <a:ea typeface="PingFang SC Regular" panose="020B0400000000000000" charset="-122"/>
-                <a:sym typeface="+mn-ea"/>
-              </a:rPr>
-              <a:t>的性能要比</a:t>
-            </a:r>
-            <a:r>
-              <a:rPr lang="en-US" altLang="zh-CN">
-                <a:latin typeface="PingFang SC Regular" panose="020B0400000000000000" charset="-122"/>
-                <a:ea typeface="PingFang SC Regular" panose="020B0400000000000000" charset="-122"/>
-                <a:sym typeface="+mn-ea"/>
-              </a:rPr>
-              <a:t>golang channel</a:t>
-            </a:r>
-            <a:r>
-              <a:rPr lang="zh-CN" altLang="en-US">
-                <a:latin typeface="PingFang SC Regular" panose="020B0400000000000000" charset="-122"/>
-                <a:ea typeface="PingFang SC Regular" panose="020B0400000000000000" charset="-122"/>
-                <a:sym typeface="+mn-ea"/>
-              </a:rPr>
-              <a:t>要高；</a:t>
-            </a:r>
-            <a:endParaRPr lang="zh-CN" altLang="en-US">
-              <a:latin typeface="PingFang SC Regular" panose="020B0400000000000000" charset="-122"/>
-              <a:ea typeface="PingFang SC Regular" panose="020B0400000000000000" charset="-122"/>
-              <a:sym typeface="+mn-ea"/>
-            </a:endParaRPr>
-          </a:p>
-          <a:p>
-            <a:pPr marL="342900" indent="-342900">
-              <a:buFont typeface="Arial" panose="020B0604020202090204" pitchFamily="34" charset="0"/>
-              <a:buChar char="•"/>
-            </a:pPr>
-            <a:r>
-              <a:rPr lang="en-US" altLang="zh-CN">
-                <a:latin typeface="PingFang SC Regular" panose="020B0400000000000000" charset="-122"/>
-                <a:ea typeface="PingFang SC Regular" panose="020B0400000000000000" charset="-122"/>
-                <a:sym typeface="+mn-ea"/>
-              </a:rPr>
-              <a:t>golang channel</a:t>
-            </a:r>
-            <a:r>
-              <a:rPr lang="zh-CN" altLang="en-US">
-                <a:latin typeface="PingFang SC Regular" panose="020B0400000000000000" charset="-122"/>
-                <a:ea typeface="PingFang SC Regular" panose="020B0400000000000000" charset="-122"/>
-                <a:sym typeface="+mn-ea"/>
-              </a:rPr>
-              <a:t>使用起来方便快捷</a:t>
-            </a:r>
-            <a:r>
-              <a:rPr lang="en-US" altLang="zh-CN">
-                <a:latin typeface="PingFang SC Regular" panose="020B0400000000000000" charset="-122"/>
-                <a:ea typeface="PingFang SC Regular" panose="020B0400000000000000" charset="-122"/>
-                <a:sym typeface="+mn-ea"/>
-              </a:rPr>
-              <a:t>(WaitGroup+channel)</a:t>
-            </a:r>
-            <a:r>
-              <a:rPr lang="zh-CN" altLang="en-US">
-                <a:latin typeface="PingFang SC Regular" panose="020B0400000000000000" charset="-122"/>
-                <a:ea typeface="PingFang SC Regular" panose="020B0400000000000000" charset="-122"/>
-                <a:sym typeface="+mn-ea"/>
-              </a:rPr>
-              <a:t>，而</a:t>
-            </a:r>
-            <a:r>
-              <a:rPr lang="en-US" altLang="zh-CN">
-                <a:latin typeface="PingFang SC Regular" panose="020B0400000000000000" charset="-122"/>
-                <a:ea typeface="PingFang SC Regular" panose="020B0400000000000000" charset="-122"/>
-                <a:sym typeface="+mn-ea"/>
-              </a:rPr>
-              <a:t>disruptor</a:t>
-            </a:r>
-            <a:r>
-              <a:rPr lang="zh-CN" altLang="en-US">
-                <a:latin typeface="PingFang SC Regular" panose="020B0400000000000000" charset="-122"/>
-                <a:ea typeface="PingFang SC Regular" panose="020B0400000000000000" charset="-122"/>
-                <a:sym typeface="+mn-ea"/>
-              </a:rPr>
-              <a:t>使用起来比较麻烦。</a:t>
-            </a:r>
-            <a:endParaRPr lang="zh-CN" altLang="en-US">
-              <a:latin typeface="PingFang SC Regular" panose="020B0400000000000000" charset="-122"/>
-              <a:ea typeface="PingFang SC Regular" panose="020B0400000000000000" charset="-122"/>
-              <a:sym typeface="+mn-ea"/>
-            </a:endParaRPr>
-          </a:p>
-        </p:txBody>
-      </p:sp>
-      <p:sp>
-        <p:nvSpPr>
-          <p:cNvPr id="6" name="文本框 5"/>
-          <p:cNvSpPr txBox="1"/>
-          <p:nvPr/>
-        </p:nvSpPr>
-        <p:spPr>
-          <a:xfrm>
-            <a:off x="356235" y="4084955"/>
-            <a:ext cx="9283065" cy="460375"/>
-          </a:xfrm>
-          <a:prstGeom prst="rect">
-            <a:avLst/>
-          </a:prstGeom>
-          <a:noFill/>
-        </p:spPr>
-        <p:txBody>
-          <a:bodyPr wrap="square" rtlCol="0">
-            <a:spAutoFit/>
-          </a:bodyPr>
-          <a:p>
-            <a:r>
-              <a:rPr lang="en-US" altLang="zh-CN" sz="2400">
-                <a:latin typeface="PingFang SC Regular" panose="020B0400000000000000" charset="-122"/>
-                <a:ea typeface="PingFang SC Regular" panose="020B0400000000000000" charset="-122"/>
-              </a:rPr>
-              <a:t>Disruptor</a:t>
-            </a:r>
-            <a:r>
-              <a:rPr lang="zh-CN" altLang="en-US" sz="2400">
-                <a:latin typeface="PingFang SC Regular" panose="020B0400000000000000" charset="-122"/>
-                <a:ea typeface="PingFang SC Regular" panose="020B0400000000000000" charset="-122"/>
-              </a:rPr>
-              <a:t>的应用场景</a:t>
-            </a:r>
-            <a:endParaRPr lang="zh-CN" altLang="en-US" sz="2400">
-              <a:latin typeface="PingFang SC Regular" panose="020B0400000000000000" charset="-122"/>
-              <a:ea typeface="PingFang SC Regular" panose="020B0400000000000000" charset="-122"/>
-            </a:endParaRPr>
-          </a:p>
-        </p:txBody>
-      </p:sp>
-      <p:sp>
-        <p:nvSpPr>
-          <p:cNvPr id="7" name="文本框 6"/>
-          <p:cNvSpPr txBox="1"/>
-          <p:nvPr/>
-        </p:nvSpPr>
-        <p:spPr>
-          <a:xfrm>
-            <a:off x="356235" y="4801235"/>
-            <a:ext cx="9514205" cy="1198880"/>
-          </a:xfrm>
-          <a:prstGeom prst="rect">
-            <a:avLst/>
-          </a:prstGeom>
-          <a:noFill/>
-        </p:spPr>
-        <p:txBody>
-          <a:bodyPr wrap="square" rtlCol="0">
-            <a:spAutoFit/>
-          </a:bodyPr>
-          <a:p>
-            <a:r>
-              <a:rPr lang="zh-CN" altLang="en-US">
-                <a:latin typeface="PingFang SC Regular" panose="020B0400000000000000" charset="-122"/>
-                <a:ea typeface="PingFang SC Regular" panose="020B0400000000000000" charset="-122"/>
-              </a:rPr>
-              <a:t>各种高并发场景：</a:t>
-            </a:r>
-            <a:endParaRPr lang="zh-CN" altLang="en-US">
-              <a:latin typeface="PingFang SC Regular" panose="020B0400000000000000" charset="-122"/>
-              <a:ea typeface="PingFang SC Regular" panose="020B0400000000000000" charset="-122"/>
-            </a:endParaRPr>
-          </a:p>
-          <a:p>
-            <a:pPr marL="285750" indent="-285750">
-              <a:buFont typeface="Arial" panose="020B0604020202090204" pitchFamily="34" charset="0"/>
-              <a:buChar char="•"/>
-            </a:pPr>
-            <a:r>
-              <a:rPr lang="en-US" altLang="zh-CN">
-                <a:latin typeface="PingFang SC Regular" panose="020B0400000000000000" charset="-122"/>
-                <a:ea typeface="PingFang SC Regular" panose="020B0400000000000000" charset="-122"/>
-              </a:rPr>
-              <a:t>Apache Log4j</a:t>
-            </a:r>
-            <a:r>
-              <a:rPr lang="zh-CN" altLang="en-US">
-                <a:latin typeface="PingFang SC Regular" panose="020B0400000000000000" charset="-122"/>
-                <a:ea typeface="PingFang SC Regular" panose="020B0400000000000000" charset="-122"/>
-              </a:rPr>
-              <a:t>：日志框架</a:t>
-            </a:r>
-            <a:endParaRPr lang="zh-CN" altLang="en-US">
-              <a:latin typeface="PingFang SC Regular" panose="020B0400000000000000" charset="-122"/>
-              <a:ea typeface="PingFang SC Regular" panose="020B0400000000000000" charset="-122"/>
-            </a:endParaRPr>
-          </a:p>
-          <a:p>
-            <a:pPr marL="285750" indent="-285750">
-              <a:buFont typeface="Arial" panose="020B0604020202090204" pitchFamily="34" charset="0"/>
-              <a:buChar char="•"/>
-            </a:pPr>
-            <a:r>
-              <a:rPr lang="zh-CN" altLang="en-US">
-                <a:latin typeface="PingFang SC Regular" panose="020B0400000000000000" charset="-122"/>
-                <a:ea typeface="PingFang SC Regular" panose="020B0400000000000000" charset="-122"/>
-              </a:rPr>
-              <a:t>uid-generator：百度开源的分布式</a:t>
-            </a:r>
-            <a:r>
-              <a:rPr lang="en-US" altLang="zh-CN">
-                <a:latin typeface="PingFang SC Regular" panose="020B0400000000000000" charset="-122"/>
-                <a:ea typeface="PingFang SC Regular" panose="020B0400000000000000" charset="-122"/>
-              </a:rPr>
-              <a:t>id</a:t>
-            </a:r>
-            <a:r>
-              <a:rPr lang="zh-CN" altLang="en-US">
-                <a:latin typeface="PingFang SC Regular" panose="020B0400000000000000" charset="-122"/>
-                <a:ea typeface="PingFang SC Regular" panose="020B0400000000000000" charset="-122"/>
-              </a:rPr>
-              <a:t>生成器；</a:t>
-            </a:r>
-            <a:endParaRPr lang="zh-CN" altLang="en-US">
-              <a:latin typeface="PingFang SC Regular" panose="020B0400000000000000" charset="-122"/>
-              <a:ea typeface="PingFang SC Regular" panose="020B0400000000000000" charset="-122"/>
-            </a:endParaRPr>
-          </a:p>
-          <a:p>
-            <a:pPr marL="285750" indent="-285750">
-              <a:buFont typeface="Arial" panose="020B0604020202090204" pitchFamily="34" charset="0"/>
-              <a:buChar char="•"/>
-            </a:pPr>
-            <a:r>
-              <a:rPr lang="zh-CN" altLang="en-US">
-                <a:latin typeface="PingFang SC Regular" panose="020B0400000000000000" charset="-122"/>
-                <a:ea typeface="PingFang SC Regular" panose="020B0400000000000000" charset="-122"/>
-              </a:rPr>
-              <a:t>业务场景：直播的弹幕系统，高性能定时器。</a:t>
-            </a:r>
-            <a:endParaRPr lang="zh-CN" altLang="en-US">
-              <a:latin typeface="PingFang SC Regular" panose="020B0400000000000000" charset="-122"/>
-              <a:ea typeface="PingFang SC Regular" panose="020B0400000000000000" charset="-122"/>
-            </a:endParaRPr>
-          </a:p>
-        </p:txBody>
-      </p:sp>
-    </p:spTree>
-  </p:cSld>
-  <p:clrMapOvr>
-    <a:masterClrMapping/>
-  </p:clrMapOvr>
-</p:sld>
-</file>
-
 <file path=ppt/slides/slide2.xml><?xml version="1.0" encoding="utf-8"?>
 <p:sld xmlns:a="http://schemas.openxmlformats.org/drawingml/2006/main" xmlns:r="http://schemas.openxmlformats.org/officeDocument/2006/relationships" xmlns:p="http://schemas.openxmlformats.org/presentationml/2006/main">
   <p:cSld>
@@ -6909,6 +7469,578 @@
               <a:latin typeface="PingFang SC Regular" panose="020B0400000000000000" charset="-122"/>
               <a:ea typeface="PingFang SC Regular" panose="020B0400000000000000" charset="-122"/>
               <a:cs typeface="PingFang SC Regular" panose="020B0400000000000000" charset="-122"/>
+            </a:endParaRPr>
+          </a:p>
+        </p:txBody>
+      </p:sp>
+    </p:spTree>
+  </p:cSld>
+  <p:clrMapOvr>
+    <a:masterClrMapping/>
+  </p:clrMapOvr>
+</p:sld>
+</file>
+
+<file path=ppt/slides/slide20.xml><?xml version="1.0" encoding="utf-8"?>
+<p:sld xmlns:a="http://schemas.openxmlformats.org/drawingml/2006/main" xmlns:r="http://schemas.openxmlformats.org/officeDocument/2006/relationships" xmlns:p="http://schemas.openxmlformats.org/presentationml/2006/main">
+  <p:cSld>
+    <p:spTree>
+      <p:nvGrpSpPr>
+        <p:cNvPr id="1" name=""/>
+        <p:cNvGrpSpPr/>
+        <p:nvPr/>
+      </p:nvGrpSpPr>
+      <p:grpSpPr/>
+      <p:sp>
+        <p:nvSpPr>
+          <p:cNvPr id="2" name="文本框 1"/>
+          <p:cNvSpPr txBox="1"/>
+          <p:nvPr/>
+        </p:nvSpPr>
+        <p:spPr>
+          <a:xfrm>
+            <a:off x="356235" y="195580"/>
+            <a:ext cx="9283065" cy="460375"/>
+          </a:xfrm>
+          <a:prstGeom prst="rect">
+            <a:avLst/>
+          </a:prstGeom>
+          <a:noFill/>
+        </p:spPr>
+        <p:txBody>
+          <a:bodyPr wrap="square" rtlCol="0">
+            <a:spAutoFit/>
+          </a:bodyPr>
+          <a:p>
+            <a:r>
+              <a:rPr lang="en-US" altLang="zh-CN" sz="2400">
+                <a:latin typeface="PingFang SC Regular" panose="020B0400000000000000" charset="-122"/>
+                <a:ea typeface="PingFang SC Regular" panose="020B0400000000000000" charset="-122"/>
+              </a:rPr>
+              <a:t>EventProcessor</a:t>
+            </a:r>
+            <a:r>
+              <a:rPr lang="zh-CN" altLang="en-US" sz="2400">
+                <a:latin typeface="PingFang SC Regular" panose="020B0400000000000000" charset="-122"/>
+                <a:ea typeface="PingFang SC Regular" panose="020B0400000000000000" charset="-122"/>
+              </a:rPr>
+              <a:t>——消费者</a:t>
+            </a:r>
+            <a:endParaRPr lang="zh-CN" altLang="en-US" sz="2400">
+              <a:latin typeface="PingFang SC Regular" panose="020B0400000000000000" charset="-122"/>
+              <a:ea typeface="PingFang SC Regular" panose="020B0400000000000000" charset="-122"/>
+            </a:endParaRPr>
+          </a:p>
+        </p:txBody>
+      </p:sp>
+      <p:sp>
+        <p:nvSpPr>
+          <p:cNvPr id="3" name="文本框 2"/>
+          <p:cNvSpPr txBox="1"/>
+          <p:nvPr/>
+        </p:nvSpPr>
+        <p:spPr>
+          <a:xfrm>
+            <a:off x="356235" y="943610"/>
+            <a:ext cx="9514205" cy="368300"/>
+          </a:xfrm>
+          <a:prstGeom prst="rect">
+            <a:avLst/>
+          </a:prstGeom>
+          <a:noFill/>
+        </p:spPr>
+        <p:txBody>
+          <a:bodyPr wrap="square" rtlCol="0">
+            <a:spAutoFit/>
+          </a:bodyPr>
+          <a:p>
+            <a:r>
+              <a:rPr lang="zh-CN" altLang="en-US">
+                <a:latin typeface="PingFang SC Regular" panose="020B0400000000000000" charset="-122"/>
+                <a:ea typeface="PingFang SC Regular" panose="020B0400000000000000" charset="-122"/>
+              </a:rPr>
+              <a:t>分单线程消费者</a:t>
+            </a:r>
+            <a:r>
+              <a:rPr lang="en-US" altLang="zh-CN">
+                <a:latin typeface="PingFang SC Regular" panose="020B0400000000000000" charset="-122"/>
+                <a:ea typeface="PingFang SC Regular" panose="020B0400000000000000" charset="-122"/>
+              </a:rPr>
+              <a:t>(BatchEventProcessor)</a:t>
+            </a:r>
+            <a:r>
+              <a:rPr lang="zh-CN" altLang="en-US">
+                <a:latin typeface="PingFang SC Regular" panose="020B0400000000000000" charset="-122"/>
+                <a:ea typeface="PingFang SC Regular" panose="020B0400000000000000" charset="-122"/>
+              </a:rPr>
+              <a:t>和线程池模式消费者</a:t>
+            </a:r>
+            <a:r>
+              <a:rPr lang="en-US" altLang="zh-CN">
+                <a:latin typeface="PingFang SC Regular" panose="020B0400000000000000" charset="-122"/>
+                <a:ea typeface="PingFang SC Regular" panose="020B0400000000000000" charset="-122"/>
+              </a:rPr>
+              <a:t>(WorkProcessor)</a:t>
+            </a:r>
+            <a:endParaRPr lang="en-US" altLang="zh-CN">
+              <a:latin typeface="PingFang SC Regular" panose="020B0400000000000000" charset="-122"/>
+              <a:ea typeface="PingFang SC Regular" panose="020B0400000000000000" charset="-122"/>
+            </a:endParaRPr>
+          </a:p>
+        </p:txBody>
+      </p:sp>
+      <p:sp>
+        <p:nvSpPr>
+          <p:cNvPr id="5" name="文本框 4"/>
+          <p:cNvSpPr txBox="1"/>
+          <p:nvPr/>
+        </p:nvSpPr>
+        <p:spPr>
+          <a:xfrm>
+            <a:off x="356235" y="1599565"/>
+            <a:ext cx="11367135" cy="2214880"/>
+          </a:xfrm>
+          <a:prstGeom prst="rect">
+            <a:avLst/>
+          </a:prstGeom>
+          <a:noFill/>
+        </p:spPr>
+        <p:txBody>
+          <a:bodyPr wrap="square" rtlCol="0" anchor="t">
+            <a:spAutoFit/>
+          </a:bodyPr>
+          <a:p>
+            <a:r>
+              <a:rPr lang="en-US" altLang="zh-CN" sz="2400">
+                <a:latin typeface="PingFang SC Regular" panose="020B0400000000000000" charset="-122"/>
+                <a:ea typeface="PingFang SC Regular" panose="020B0400000000000000" charset="-122"/>
+                <a:sym typeface="+mn-ea"/>
+              </a:rPr>
+              <a:t>disruptor VS golang channel</a:t>
+            </a:r>
+            <a:endParaRPr lang="en-US" altLang="zh-CN" sz="2400">
+              <a:latin typeface="PingFang SC Regular" panose="020B0400000000000000" charset="-122"/>
+              <a:ea typeface="PingFang SC Regular" panose="020B0400000000000000" charset="-122"/>
+              <a:sym typeface="+mn-ea"/>
+            </a:endParaRPr>
+          </a:p>
+          <a:p>
+            <a:endParaRPr lang="en-US" altLang="zh-CN" sz="2400">
+              <a:latin typeface="PingFang SC Regular" panose="020B0400000000000000" charset="-122"/>
+              <a:ea typeface="PingFang SC Regular" panose="020B0400000000000000" charset="-122"/>
+              <a:sym typeface="+mn-ea"/>
+            </a:endParaRPr>
+          </a:p>
+          <a:p>
+            <a:pPr marL="342900" indent="-342900">
+              <a:buFont typeface="Arial" panose="020B0604020202090204" pitchFamily="34" charset="0"/>
+              <a:buChar char="•"/>
+            </a:pPr>
+            <a:r>
+              <a:rPr lang="en-US" altLang="zh-CN">
+                <a:latin typeface="PingFang SC Regular" panose="020B0400000000000000" charset="-122"/>
+                <a:ea typeface="PingFang SC Regular" panose="020B0400000000000000" charset="-122"/>
+                <a:sym typeface="+mn-ea"/>
+              </a:rPr>
+              <a:t>disruptor</a:t>
+            </a:r>
+            <a:r>
+              <a:rPr lang="zh-CN" altLang="en-US">
+                <a:latin typeface="PingFang SC Regular" panose="020B0400000000000000" charset="-122"/>
+                <a:ea typeface="PingFang SC Regular" panose="020B0400000000000000" charset="-122"/>
+                <a:sym typeface="+mn-ea"/>
+              </a:rPr>
+              <a:t>具备复杂多样的等待策略，</a:t>
+            </a:r>
+            <a:r>
+              <a:rPr lang="en-US" altLang="zh-CN">
+                <a:latin typeface="PingFang SC Regular" panose="020B0400000000000000" charset="-122"/>
+                <a:ea typeface="PingFang SC Regular" panose="020B0400000000000000" charset="-122"/>
+                <a:sym typeface="+mn-ea"/>
+              </a:rPr>
+              <a:t>golang channel</a:t>
+            </a:r>
+            <a:r>
+              <a:rPr lang="zh-CN" altLang="en-US">
+                <a:latin typeface="PingFang SC Regular" panose="020B0400000000000000" charset="-122"/>
+                <a:ea typeface="PingFang SC Regular" panose="020B0400000000000000" charset="-122"/>
+                <a:sym typeface="+mn-ea"/>
+              </a:rPr>
+              <a:t>只有</a:t>
+            </a:r>
+            <a:r>
+              <a:rPr lang="en-US" altLang="zh-CN">
+                <a:latin typeface="PingFang SC Regular" panose="020B0400000000000000" charset="-122"/>
+                <a:ea typeface="PingFang SC Regular" panose="020B0400000000000000" charset="-122"/>
+                <a:sym typeface="+mn-ea"/>
+              </a:rPr>
+              <a:t>yield</a:t>
+            </a:r>
+            <a:r>
+              <a:rPr lang="zh-CN" altLang="en-US">
+                <a:latin typeface="PingFang SC Regular" panose="020B0400000000000000" charset="-122"/>
+                <a:ea typeface="PingFang SC Regular" panose="020B0400000000000000" charset="-122"/>
+                <a:sym typeface="+mn-ea"/>
+              </a:rPr>
+              <a:t>一种；</a:t>
+            </a:r>
+            <a:endParaRPr lang="zh-CN" altLang="en-US">
+              <a:latin typeface="PingFang SC Regular" panose="020B0400000000000000" charset="-122"/>
+              <a:ea typeface="PingFang SC Regular" panose="020B0400000000000000" charset="-122"/>
+              <a:sym typeface="+mn-ea"/>
+            </a:endParaRPr>
+          </a:p>
+          <a:p>
+            <a:pPr marL="342900" indent="-342900">
+              <a:buFont typeface="Arial" panose="020B0604020202090204" pitchFamily="34" charset="0"/>
+              <a:buChar char="•"/>
+            </a:pPr>
+            <a:r>
+              <a:rPr lang="en-US" altLang="zh-CN">
+                <a:latin typeface="PingFang SC Regular" panose="020B0400000000000000" charset="-122"/>
+                <a:ea typeface="PingFang SC Regular" panose="020B0400000000000000" charset="-122"/>
+                <a:sym typeface="+mn-ea"/>
+              </a:rPr>
+              <a:t>golang channel</a:t>
+            </a:r>
+            <a:r>
+              <a:rPr lang="zh-CN" altLang="en-US">
+                <a:latin typeface="PingFang SC Regular" panose="020B0400000000000000" charset="-122"/>
+                <a:ea typeface="PingFang SC Regular" panose="020B0400000000000000" charset="-122"/>
+                <a:sym typeface="+mn-ea"/>
+              </a:rPr>
+              <a:t>并未考虑</a:t>
+            </a:r>
+            <a:r>
+              <a:rPr lang="en-US" altLang="zh-CN">
+                <a:latin typeface="PingFang SC Regular" panose="020B0400000000000000" charset="-122"/>
+                <a:ea typeface="PingFang SC Regular" panose="020B0400000000000000" charset="-122"/>
+                <a:sym typeface="+mn-ea"/>
+              </a:rPr>
+              <a:t>cpu</a:t>
+            </a:r>
+            <a:r>
+              <a:rPr lang="zh-CN" altLang="en-US">
+                <a:latin typeface="PingFang SC Regular" panose="020B0400000000000000" charset="-122"/>
+                <a:ea typeface="PingFang SC Regular" panose="020B0400000000000000" charset="-122"/>
+                <a:sym typeface="+mn-ea"/>
+              </a:rPr>
+              <a:t>的伪共享问题；</a:t>
+            </a:r>
+            <a:endParaRPr lang="zh-CN" altLang="en-US">
+              <a:latin typeface="PingFang SC Regular" panose="020B0400000000000000" charset="-122"/>
+              <a:ea typeface="PingFang SC Regular" panose="020B0400000000000000" charset="-122"/>
+              <a:sym typeface="+mn-ea"/>
+            </a:endParaRPr>
+          </a:p>
+          <a:p>
+            <a:pPr marL="342900" indent="-342900">
+              <a:buFont typeface="Arial" panose="020B0604020202090204" pitchFamily="34" charset="0"/>
+              <a:buChar char="•"/>
+            </a:pPr>
+            <a:r>
+              <a:rPr lang="en-US" altLang="zh-CN">
+                <a:latin typeface="PingFang SC Regular" panose="020B0400000000000000" charset="-122"/>
+                <a:ea typeface="PingFang SC Regular" panose="020B0400000000000000" charset="-122"/>
+                <a:sym typeface="+mn-ea"/>
+              </a:rPr>
+              <a:t>golang channel</a:t>
+            </a:r>
+            <a:r>
+              <a:rPr lang="zh-CN" altLang="en-US">
+                <a:latin typeface="PingFang SC Regular" panose="020B0400000000000000" charset="-122"/>
+                <a:ea typeface="PingFang SC Regular" panose="020B0400000000000000" charset="-122"/>
+                <a:sym typeface="+mn-ea"/>
+              </a:rPr>
+              <a:t>真正存储数据，</a:t>
+            </a:r>
+            <a:r>
+              <a:rPr lang="en-US" altLang="zh-CN">
+                <a:latin typeface="PingFang SC Regular" panose="020B0400000000000000" charset="-122"/>
+                <a:ea typeface="PingFang SC Regular" panose="020B0400000000000000" charset="-122"/>
+                <a:sym typeface="+mn-ea"/>
+              </a:rPr>
+              <a:t>disruptor</a:t>
+            </a:r>
+            <a:r>
+              <a:rPr lang="zh-CN" altLang="en-US">
+                <a:latin typeface="PingFang SC Regular" panose="020B0400000000000000" charset="-122"/>
+                <a:ea typeface="PingFang SC Regular" panose="020B0400000000000000" charset="-122"/>
+                <a:sym typeface="+mn-ea"/>
+              </a:rPr>
+              <a:t>依赖外部的工具类</a:t>
+            </a:r>
+            <a:r>
+              <a:rPr lang="en-US" altLang="zh-CN">
+                <a:latin typeface="PingFang SC Regular" panose="020B0400000000000000" charset="-122"/>
+                <a:ea typeface="PingFang SC Regular" panose="020B0400000000000000" charset="-122"/>
+                <a:sym typeface="+mn-ea"/>
+              </a:rPr>
+              <a:t>dataProvider</a:t>
+            </a:r>
+            <a:r>
+              <a:rPr lang="zh-CN" altLang="en-US">
+                <a:latin typeface="PingFang SC Regular" panose="020B0400000000000000" charset="-122"/>
+                <a:ea typeface="PingFang SC Regular" panose="020B0400000000000000" charset="-122"/>
+                <a:sym typeface="+mn-ea"/>
+              </a:rPr>
+              <a:t>来获取真正的对象，带来代码耦合；</a:t>
+            </a:r>
+            <a:endParaRPr lang="zh-CN" altLang="en-US">
+              <a:latin typeface="PingFang SC Regular" panose="020B0400000000000000" charset="-122"/>
+              <a:ea typeface="PingFang SC Regular" panose="020B0400000000000000" charset="-122"/>
+              <a:sym typeface="+mn-ea"/>
+            </a:endParaRPr>
+          </a:p>
+          <a:p>
+            <a:pPr marL="342900" indent="-342900">
+              <a:buFont typeface="Arial" panose="020B0604020202090204" pitchFamily="34" charset="0"/>
+              <a:buChar char="•"/>
+            </a:pPr>
+            <a:r>
+              <a:rPr lang="en-US" altLang="zh-CN">
+                <a:latin typeface="PingFang SC Regular" panose="020B0400000000000000" charset="-122"/>
+                <a:ea typeface="PingFang SC Regular" panose="020B0400000000000000" charset="-122"/>
+                <a:sym typeface="+mn-ea"/>
+              </a:rPr>
+              <a:t>disruptor benchmark</a:t>
+            </a:r>
+            <a:r>
+              <a:rPr lang="zh-CN" altLang="en-US">
+                <a:latin typeface="PingFang SC Regular" panose="020B0400000000000000" charset="-122"/>
+                <a:ea typeface="PingFang SC Regular" panose="020B0400000000000000" charset="-122"/>
+                <a:sym typeface="+mn-ea"/>
+              </a:rPr>
+              <a:t>的性能要比</a:t>
+            </a:r>
+            <a:r>
+              <a:rPr lang="en-US" altLang="zh-CN">
+                <a:latin typeface="PingFang SC Regular" panose="020B0400000000000000" charset="-122"/>
+                <a:ea typeface="PingFang SC Regular" panose="020B0400000000000000" charset="-122"/>
+                <a:sym typeface="+mn-ea"/>
+              </a:rPr>
+              <a:t>golang channel</a:t>
+            </a:r>
+            <a:r>
+              <a:rPr lang="zh-CN" altLang="en-US">
+                <a:latin typeface="PingFang SC Regular" panose="020B0400000000000000" charset="-122"/>
+                <a:ea typeface="PingFang SC Regular" panose="020B0400000000000000" charset="-122"/>
+                <a:sym typeface="+mn-ea"/>
+              </a:rPr>
+              <a:t>要高；</a:t>
+            </a:r>
+            <a:endParaRPr lang="zh-CN" altLang="en-US">
+              <a:latin typeface="PingFang SC Regular" panose="020B0400000000000000" charset="-122"/>
+              <a:ea typeface="PingFang SC Regular" panose="020B0400000000000000" charset="-122"/>
+              <a:sym typeface="+mn-ea"/>
+            </a:endParaRPr>
+          </a:p>
+          <a:p>
+            <a:pPr marL="342900" indent="-342900">
+              <a:buFont typeface="Arial" panose="020B0604020202090204" pitchFamily="34" charset="0"/>
+              <a:buChar char="•"/>
+            </a:pPr>
+            <a:r>
+              <a:rPr lang="en-US" altLang="zh-CN">
+                <a:latin typeface="PingFang SC Regular" panose="020B0400000000000000" charset="-122"/>
+                <a:ea typeface="PingFang SC Regular" panose="020B0400000000000000" charset="-122"/>
+                <a:sym typeface="+mn-ea"/>
+              </a:rPr>
+              <a:t>golang channel</a:t>
+            </a:r>
+            <a:r>
+              <a:rPr lang="zh-CN" altLang="en-US">
+                <a:latin typeface="PingFang SC Regular" panose="020B0400000000000000" charset="-122"/>
+                <a:ea typeface="PingFang SC Regular" panose="020B0400000000000000" charset="-122"/>
+                <a:sym typeface="+mn-ea"/>
+              </a:rPr>
+              <a:t>使用起来方便快捷</a:t>
+            </a:r>
+            <a:r>
+              <a:rPr lang="en-US" altLang="zh-CN">
+                <a:latin typeface="PingFang SC Regular" panose="020B0400000000000000" charset="-122"/>
+                <a:ea typeface="PingFang SC Regular" panose="020B0400000000000000" charset="-122"/>
+                <a:sym typeface="+mn-ea"/>
+              </a:rPr>
+              <a:t>(WaitGroup+channel)</a:t>
+            </a:r>
+            <a:r>
+              <a:rPr lang="zh-CN" altLang="en-US">
+                <a:latin typeface="PingFang SC Regular" panose="020B0400000000000000" charset="-122"/>
+                <a:ea typeface="PingFang SC Regular" panose="020B0400000000000000" charset="-122"/>
+                <a:sym typeface="+mn-ea"/>
+              </a:rPr>
+              <a:t>，而</a:t>
+            </a:r>
+            <a:r>
+              <a:rPr lang="en-US" altLang="zh-CN">
+                <a:latin typeface="PingFang SC Regular" panose="020B0400000000000000" charset="-122"/>
+                <a:ea typeface="PingFang SC Regular" panose="020B0400000000000000" charset="-122"/>
+                <a:sym typeface="+mn-ea"/>
+              </a:rPr>
+              <a:t>disruptor</a:t>
+            </a:r>
+            <a:r>
+              <a:rPr lang="zh-CN" altLang="en-US">
+                <a:latin typeface="PingFang SC Regular" panose="020B0400000000000000" charset="-122"/>
+                <a:ea typeface="PingFang SC Regular" panose="020B0400000000000000" charset="-122"/>
+                <a:sym typeface="+mn-ea"/>
+              </a:rPr>
+              <a:t>使用起来比较麻烦。</a:t>
+            </a:r>
+            <a:endParaRPr lang="zh-CN" altLang="en-US">
+              <a:latin typeface="PingFang SC Regular" panose="020B0400000000000000" charset="-122"/>
+              <a:ea typeface="PingFang SC Regular" panose="020B0400000000000000" charset="-122"/>
+              <a:sym typeface="+mn-ea"/>
+            </a:endParaRPr>
+          </a:p>
+        </p:txBody>
+      </p:sp>
+      <p:sp>
+        <p:nvSpPr>
+          <p:cNvPr id="6" name="文本框 5"/>
+          <p:cNvSpPr txBox="1"/>
+          <p:nvPr/>
+        </p:nvSpPr>
+        <p:spPr>
+          <a:xfrm>
+            <a:off x="356235" y="4084955"/>
+            <a:ext cx="9283065" cy="460375"/>
+          </a:xfrm>
+          <a:prstGeom prst="rect">
+            <a:avLst/>
+          </a:prstGeom>
+          <a:noFill/>
+        </p:spPr>
+        <p:txBody>
+          <a:bodyPr wrap="square" rtlCol="0">
+            <a:spAutoFit/>
+          </a:bodyPr>
+          <a:p>
+            <a:r>
+              <a:rPr lang="en-US" altLang="zh-CN" sz="2400">
+                <a:latin typeface="PingFang SC Regular" panose="020B0400000000000000" charset="-122"/>
+                <a:ea typeface="PingFang SC Regular" panose="020B0400000000000000" charset="-122"/>
+              </a:rPr>
+              <a:t>Disruptor</a:t>
+            </a:r>
+            <a:r>
+              <a:rPr lang="zh-CN" altLang="en-US" sz="2400">
+                <a:latin typeface="PingFang SC Regular" panose="020B0400000000000000" charset="-122"/>
+                <a:ea typeface="PingFang SC Regular" panose="020B0400000000000000" charset="-122"/>
+              </a:rPr>
+              <a:t>的应用场景</a:t>
+            </a:r>
+            <a:endParaRPr lang="zh-CN" altLang="en-US" sz="2400">
+              <a:latin typeface="PingFang SC Regular" panose="020B0400000000000000" charset="-122"/>
+              <a:ea typeface="PingFang SC Regular" panose="020B0400000000000000" charset="-122"/>
+            </a:endParaRPr>
+          </a:p>
+        </p:txBody>
+      </p:sp>
+      <p:sp>
+        <p:nvSpPr>
+          <p:cNvPr id="7" name="文本框 6"/>
+          <p:cNvSpPr txBox="1"/>
+          <p:nvPr/>
+        </p:nvSpPr>
+        <p:spPr>
+          <a:xfrm>
+            <a:off x="356235" y="4801235"/>
+            <a:ext cx="9514205" cy="1198880"/>
+          </a:xfrm>
+          <a:prstGeom prst="rect">
+            <a:avLst/>
+          </a:prstGeom>
+          <a:noFill/>
+        </p:spPr>
+        <p:txBody>
+          <a:bodyPr wrap="square" rtlCol="0">
+            <a:spAutoFit/>
+          </a:bodyPr>
+          <a:p>
+            <a:r>
+              <a:rPr lang="zh-CN" altLang="en-US">
+                <a:latin typeface="PingFang SC Regular" panose="020B0400000000000000" charset="-122"/>
+                <a:ea typeface="PingFang SC Regular" panose="020B0400000000000000" charset="-122"/>
+              </a:rPr>
+              <a:t>各种高并发场景：</a:t>
+            </a:r>
+            <a:endParaRPr lang="zh-CN" altLang="en-US">
+              <a:latin typeface="PingFang SC Regular" panose="020B0400000000000000" charset="-122"/>
+              <a:ea typeface="PingFang SC Regular" panose="020B0400000000000000" charset="-122"/>
+            </a:endParaRPr>
+          </a:p>
+          <a:p>
+            <a:pPr marL="285750" indent="-285750">
+              <a:buFont typeface="Arial" panose="020B0604020202090204" pitchFamily="34" charset="0"/>
+              <a:buChar char="•"/>
+            </a:pPr>
+            <a:r>
+              <a:rPr lang="en-US" altLang="zh-CN">
+                <a:latin typeface="PingFang SC Regular" panose="020B0400000000000000" charset="-122"/>
+                <a:ea typeface="PingFang SC Regular" panose="020B0400000000000000" charset="-122"/>
+              </a:rPr>
+              <a:t>Apache Log4j</a:t>
+            </a:r>
+            <a:r>
+              <a:rPr lang="zh-CN" altLang="en-US">
+                <a:latin typeface="PingFang SC Regular" panose="020B0400000000000000" charset="-122"/>
+                <a:ea typeface="PingFang SC Regular" panose="020B0400000000000000" charset="-122"/>
+              </a:rPr>
+              <a:t>：日志框架</a:t>
+            </a:r>
+            <a:endParaRPr lang="zh-CN" altLang="en-US">
+              <a:latin typeface="PingFang SC Regular" panose="020B0400000000000000" charset="-122"/>
+              <a:ea typeface="PingFang SC Regular" panose="020B0400000000000000" charset="-122"/>
+            </a:endParaRPr>
+          </a:p>
+          <a:p>
+            <a:pPr marL="285750" indent="-285750">
+              <a:buFont typeface="Arial" panose="020B0604020202090204" pitchFamily="34" charset="0"/>
+              <a:buChar char="•"/>
+            </a:pPr>
+            <a:r>
+              <a:rPr lang="zh-CN" altLang="en-US">
+                <a:latin typeface="PingFang SC Regular" panose="020B0400000000000000" charset="-122"/>
+                <a:ea typeface="PingFang SC Regular" panose="020B0400000000000000" charset="-122"/>
+              </a:rPr>
+              <a:t>uid-generator：百度开源的分布式</a:t>
+            </a:r>
+            <a:r>
+              <a:rPr lang="en-US" altLang="zh-CN">
+                <a:latin typeface="PingFang SC Regular" panose="020B0400000000000000" charset="-122"/>
+                <a:ea typeface="PingFang SC Regular" panose="020B0400000000000000" charset="-122"/>
+              </a:rPr>
+              <a:t>id</a:t>
+            </a:r>
+            <a:r>
+              <a:rPr lang="zh-CN" altLang="en-US">
+                <a:latin typeface="PingFang SC Regular" panose="020B0400000000000000" charset="-122"/>
+                <a:ea typeface="PingFang SC Regular" panose="020B0400000000000000" charset="-122"/>
+              </a:rPr>
+              <a:t>生成器；</a:t>
+            </a:r>
+            <a:endParaRPr lang="zh-CN" altLang="en-US">
+              <a:latin typeface="PingFang SC Regular" panose="020B0400000000000000" charset="-122"/>
+              <a:ea typeface="PingFang SC Regular" panose="020B0400000000000000" charset="-122"/>
+            </a:endParaRPr>
+          </a:p>
+          <a:p>
+            <a:pPr marL="285750" indent="-285750">
+              <a:buFont typeface="Arial" panose="020B0604020202090204" pitchFamily="34" charset="0"/>
+              <a:buChar char="•"/>
+            </a:pPr>
+            <a:r>
+              <a:rPr lang="zh-CN" altLang="en-US">
+                <a:latin typeface="PingFang SC Regular" panose="020B0400000000000000" charset="-122"/>
+                <a:ea typeface="PingFang SC Regular" panose="020B0400000000000000" charset="-122"/>
+              </a:rPr>
+              <a:t>业务场景：直播的弹幕系统，高性能定时器。</a:t>
+            </a:r>
+            <a:endParaRPr lang="zh-CN" altLang="en-US">
+              <a:latin typeface="PingFang SC Regular" panose="020B0400000000000000" charset="-122"/>
+              <a:ea typeface="PingFang SC Regular" panose="020B0400000000000000" charset="-122"/>
             </a:endParaRPr>
           </a:p>
         </p:txBody>
@@ -8516,6 +9648,904 @@
           </a:bodyPr>
           <a:p>
             <a:r>
+              <a:rPr lang="zh-CN" altLang="en-US" sz="2400">
+                <a:latin typeface="PingFang SC Regular" panose="020B0400000000000000" charset="-122"/>
+                <a:ea typeface="PingFang SC Regular" panose="020B0400000000000000" charset="-122"/>
+              </a:rPr>
+              <a:t>谈谈</a:t>
+            </a:r>
+            <a:r>
+              <a:rPr lang="en-US" altLang="zh-CN" sz="2400">
+                <a:latin typeface="PingFang SC Regular" panose="020B0400000000000000" charset="-122"/>
+                <a:ea typeface="PingFang SC Regular" panose="020B0400000000000000" charset="-122"/>
+              </a:rPr>
+              <a:t>lock</a:t>
+            </a:r>
+            <a:r>
+              <a:rPr lang="zh-CN" altLang="en-US" sz="2400">
+                <a:latin typeface="PingFang SC Regular" panose="020B0400000000000000" charset="-122"/>
+                <a:ea typeface="PingFang SC Regular" panose="020B0400000000000000" charset="-122"/>
+              </a:rPr>
+              <a:t>指令：</a:t>
+            </a:r>
+            <a:endParaRPr lang="zh-CN" altLang="en-US" sz="2400">
+              <a:latin typeface="PingFang SC Regular" panose="020B0400000000000000" charset="-122"/>
+              <a:ea typeface="PingFang SC Regular" panose="020B0400000000000000" charset="-122"/>
+            </a:endParaRPr>
+          </a:p>
+        </p:txBody>
+      </p:sp>
+      <p:sp>
+        <p:nvSpPr>
+          <p:cNvPr id="7" name="文本框 6"/>
+          <p:cNvSpPr txBox="1"/>
+          <p:nvPr/>
+        </p:nvSpPr>
+        <p:spPr>
+          <a:xfrm>
+            <a:off x="475615" y="647700"/>
+            <a:ext cx="11240770" cy="5354320"/>
+          </a:xfrm>
+          <a:prstGeom prst="rect">
+            <a:avLst/>
+          </a:prstGeom>
+          <a:noFill/>
+        </p:spPr>
+        <p:txBody>
+          <a:bodyPr wrap="square" rtlCol="0">
+            <a:spAutoFit/>
+          </a:bodyPr>
+          <a:p>
+            <a:pPr indent="0">
+              <a:buFont typeface="Arial" panose="020B0604020202090204" pitchFamily="34" charset="0"/>
+              <a:buNone/>
+            </a:pPr>
+            <a:r>
+              <a:rPr lang="zh-CN" altLang="en-US" b="1">
+                <a:latin typeface="PingFang SC Semibold" panose="020B0400000000000000" charset="-122"/>
+                <a:ea typeface="PingFang SC Semibold" panose="020B0400000000000000" charset="-122"/>
+                <a:cs typeface="PingFang SC Regular" panose="020B0400000000000000" charset="-122"/>
+              </a:rPr>
+              <a:t>处理器如何实现原子操作？</a:t>
+            </a:r>
+            <a:endParaRPr lang="zh-CN" altLang="en-US">
+              <a:latin typeface="PingFang SC Regular" panose="020B0400000000000000" charset="-122"/>
+              <a:ea typeface="PingFang SC Regular" panose="020B0400000000000000" charset="-122"/>
+              <a:cs typeface="PingFang SC Regular" panose="020B0400000000000000" charset="-122"/>
+            </a:endParaRPr>
+          </a:p>
+          <a:p>
+            <a:pPr indent="0">
+              <a:buFont typeface="Arial" panose="020B0604020202090204" pitchFamily="34" charset="0"/>
+              <a:buNone/>
+            </a:pPr>
+            <a:endParaRPr lang="zh-CN" altLang="en-US">
+              <a:latin typeface="PingFang SC Regular" panose="020B0400000000000000" charset="-122"/>
+              <a:ea typeface="PingFang SC Regular" panose="020B0400000000000000" charset="-122"/>
+              <a:cs typeface="PingFang SC Regular" panose="020B0400000000000000" charset="-122"/>
+            </a:endParaRPr>
+          </a:p>
+          <a:p>
+            <a:pPr indent="0">
+              <a:buFont typeface="Arial" panose="020B0604020202090204" pitchFamily="34" charset="0"/>
+              <a:buNone/>
+            </a:pPr>
+            <a:r>
+              <a:rPr lang="zh-CN" altLang="en-US">
+                <a:latin typeface="PingFang SC Regular" panose="020B0400000000000000" charset="-122"/>
+                <a:ea typeface="PingFang SC Regular" panose="020B0400000000000000" charset="-122"/>
+                <a:cs typeface="PingFang SC Regular" panose="020B0400000000000000" charset="-122"/>
+              </a:rPr>
+              <a:t>首先处理器会保证基本的内存操作的原子性，比如从内存读取或者写入一个字节是原子的，但对于</a:t>
+            </a:r>
+            <a:r>
+              <a:rPr lang="zh-CN" altLang="en-US" b="1">
+                <a:latin typeface="PingFang SC Semibold" panose="020B0400000000000000" charset="-122"/>
+                <a:ea typeface="PingFang SC Semibold" panose="020B0400000000000000" charset="-122"/>
+                <a:cs typeface="PingFang SC Semibold" panose="020B0400000000000000" charset="-122"/>
+              </a:rPr>
+              <a:t>读</a:t>
+            </a:r>
+            <a:r>
+              <a:rPr lang="en-US" altLang="zh-CN" b="1">
+                <a:latin typeface="PingFang SC Semibold" panose="020B0400000000000000" charset="-122"/>
+                <a:ea typeface="PingFang SC Semibold" panose="020B0400000000000000" charset="-122"/>
+                <a:cs typeface="PingFang SC Semibold" panose="020B0400000000000000" charset="-122"/>
+              </a:rPr>
+              <a:t>-</a:t>
+            </a:r>
+            <a:r>
+              <a:rPr lang="zh-CN" altLang="en-US" b="1">
+                <a:latin typeface="PingFang SC Semibold" panose="020B0400000000000000" charset="-122"/>
+                <a:ea typeface="PingFang SC Semibold" panose="020B0400000000000000" charset="-122"/>
+                <a:cs typeface="PingFang SC Semibold" panose="020B0400000000000000" charset="-122"/>
+              </a:rPr>
+              <a:t>改</a:t>
+            </a:r>
+            <a:r>
+              <a:rPr lang="en-US" altLang="zh-CN" b="1">
+                <a:latin typeface="PingFang SC Semibold" panose="020B0400000000000000" charset="-122"/>
+                <a:ea typeface="PingFang SC Semibold" panose="020B0400000000000000" charset="-122"/>
+                <a:cs typeface="PingFang SC Semibold" panose="020B0400000000000000" charset="-122"/>
+              </a:rPr>
+              <a:t>-</a:t>
+            </a:r>
+            <a:r>
+              <a:rPr lang="zh-CN" altLang="en-US" b="1">
+                <a:latin typeface="PingFang SC Semibold" panose="020B0400000000000000" charset="-122"/>
+                <a:ea typeface="PingFang SC Semibold" panose="020B0400000000000000" charset="-122"/>
+                <a:cs typeface="PingFang SC Semibold" panose="020B0400000000000000" charset="-122"/>
+              </a:rPr>
+              <a:t>写</a:t>
+            </a:r>
+            <a:r>
+              <a:rPr lang="zh-CN" altLang="en-US">
+                <a:latin typeface="PingFang SC Regular" panose="020B0400000000000000" charset="-122"/>
+                <a:ea typeface="PingFang SC Regular" panose="020B0400000000000000" charset="-122"/>
+                <a:cs typeface="PingFang SC Regular" panose="020B0400000000000000" charset="-122"/>
+              </a:rPr>
+              <a:t>，或者是其它复杂的内存操作是不能保证其原子性的，又比如</a:t>
+            </a:r>
+            <a:r>
+              <a:rPr lang="zh-CN" altLang="en-US" b="1">
+                <a:latin typeface="PingFang SC Semibold" panose="020B0400000000000000" charset="-122"/>
+                <a:ea typeface="PingFang SC Semibold" panose="020B0400000000000000" charset="-122"/>
+                <a:cs typeface="PingFang SC Regular" panose="020B0400000000000000" charset="-122"/>
+              </a:rPr>
+              <a:t>跨总线宽度</a:t>
+            </a:r>
+            <a:r>
+              <a:rPr lang="zh-CN" altLang="en-US">
+                <a:latin typeface="PingFang SC Regular" panose="020B0400000000000000" charset="-122"/>
+                <a:ea typeface="PingFang SC Regular" panose="020B0400000000000000" charset="-122"/>
+                <a:cs typeface="PingFang SC Regular" panose="020B0400000000000000" charset="-122"/>
+              </a:rPr>
+              <a:t>，</a:t>
+            </a:r>
+            <a:r>
+              <a:rPr lang="zh-CN" altLang="en-US" b="1">
+                <a:latin typeface="PingFang SC Semibold" panose="020B0400000000000000" charset="-122"/>
+                <a:ea typeface="PingFang SC Semibold" panose="020B0400000000000000" charset="-122"/>
+                <a:cs typeface="PingFang SC Regular" panose="020B0400000000000000" charset="-122"/>
+              </a:rPr>
+              <a:t>跨多个缓存行</a:t>
+            </a:r>
+            <a:r>
+              <a:rPr lang="zh-CN" altLang="en-US">
+                <a:latin typeface="PingFang SC Regular" panose="020B0400000000000000" charset="-122"/>
+                <a:ea typeface="PingFang SC Regular" panose="020B0400000000000000" charset="-122"/>
+                <a:cs typeface="PingFang SC Regular" panose="020B0400000000000000" charset="-122"/>
+              </a:rPr>
+              <a:t>和</a:t>
+            </a:r>
+            <a:r>
+              <a:rPr lang="zh-CN" altLang="en-US" b="1">
+                <a:latin typeface="PingFang SC Semibold" panose="020B0400000000000000" charset="-122"/>
+                <a:ea typeface="PingFang SC Semibold" panose="020B0400000000000000" charset="-122"/>
+                <a:cs typeface="PingFang SC Regular" panose="020B0400000000000000" charset="-122"/>
+              </a:rPr>
+              <a:t>跨页表的访问</a:t>
+            </a:r>
+            <a:r>
+              <a:rPr lang="zh-CN" altLang="en-US">
+                <a:latin typeface="PingFang SC Regular" panose="020B0400000000000000" charset="-122"/>
+                <a:ea typeface="PingFang SC Regular" panose="020B0400000000000000" charset="-122"/>
+                <a:cs typeface="PingFang SC Regular" panose="020B0400000000000000" charset="-122"/>
+              </a:rPr>
+              <a:t>，这时候需要处理器提供</a:t>
+            </a:r>
+            <a:r>
+              <a:rPr lang="zh-CN" altLang="en-US" b="1">
+                <a:solidFill>
+                  <a:srgbClr val="FF0000"/>
+                </a:solidFill>
+                <a:latin typeface="PingFang SC Semibold" panose="020B0400000000000000" charset="-122"/>
+                <a:ea typeface="PingFang SC Semibold" panose="020B0400000000000000" charset="-122"/>
+                <a:cs typeface="PingFang SC Regular" panose="020B0400000000000000" charset="-122"/>
+              </a:rPr>
+              <a:t>总线锁</a:t>
+            </a:r>
+            <a:r>
+              <a:rPr lang="zh-CN" altLang="en-US">
+                <a:latin typeface="PingFang SC Regular" panose="020B0400000000000000" charset="-122"/>
+                <a:ea typeface="PingFang SC Regular" panose="020B0400000000000000" charset="-122"/>
+                <a:cs typeface="PingFang SC Regular" panose="020B0400000000000000" charset="-122"/>
+              </a:rPr>
+              <a:t>和</a:t>
+            </a:r>
+            <a:r>
+              <a:rPr lang="zh-CN" altLang="en-US" b="1">
+                <a:solidFill>
+                  <a:srgbClr val="FF0000"/>
+                </a:solidFill>
+                <a:latin typeface="PingFang SC Semibold" panose="020B0400000000000000" charset="-122"/>
+                <a:ea typeface="PingFang SC Semibold" panose="020B0400000000000000" charset="-122"/>
+                <a:cs typeface="PingFang SC Regular" panose="020B0400000000000000" charset="-122"/>
+              </a:rPr>
+              <a:t>缓存锁</a:t>
+            </a:r>
+            <a:r>
+              <a:rPr lang="zh-CN" altLang="en-US">
+                <a:latin typeface="PingFang SC Regular" panose="020B0400000000000000" charset="-122"/>
+                <a:ea typeface="PingFang SC Regular" panose="020B0400000000000000" charset="-122"/>
+                <a:cs typeface="PingFang SC Regular" panose="020B0400000000000000" charset="-122"/>
+              </a:rPr>
+              <a:t>两个机制来保证复杂的内存操作原子性。</a:t>
+            </a:r>
+            <a:endParaRPr lang="zh-CN" altLang="en-US">
+              <a:latin typeface="PingFang SC Regular" panose="020B0400000000000000" charset="-122"/>
+              <a:ea typeface="PingFang SC Regular" panose="020B0400000000000000" charset="-122"/>
+              <a:cs typeface="PingFang SC Regular" panose="020B0400000000000000" charset="-122"/>
+            </a:endParaRPr>
+          </a:p>
+          <a:p>
+            <a:pPr indent="0">
+              <a:buFont typeface="Arial" panose="020B0604020202090204" pitchFamily="34" charset="0"/>
+              <a:buNone/>
+            </a:pPr>
+            <a:endParaRPr lang="zh-CN" altLang="en-US">
+              <a:latin typeface="PingFang SC Regular" panose="020B0400000000000000" charset="-122"/>
+              <a:ea typeface="PingFang SC Regular" panose="020B0400000000000000" charset="-122"/>
+              <a:cs typeface="PingFang SC Regular" panose="020B0400000000000000" charset="-122"/>
+            </a:endParaRPr>
+          </a:p>
+          <a:p>
+            <a:pPr indent="0">
+              <a:buFont typeface="Arial" panose="020B0604020202090204" pitchFamily="34" charset="0"/>
+              <a:buNone/>
+            </a:pPr>
+            <a:r>
+              <a:rPr lang="zh-CN" altLang="en-US" b="1">
+                <a:latin typeface="PingFang SC Semibold" panose="020B0400000000000000" charset="-122"/>
+                <a:ea typeface="PingFang SC Semibold" panose="020B0400000000000000" charset="-122"/>
+                <a:cs typeface="PingFang SC Regular" panose="020B0400000000000000" charset="-122"/>
+              </a:rPr>
+              <a:t>总线锁</a:t>
+            </a:r>
+            <a:endParaRPr lang="zh-CN" altLang="en-US">
+              <a:latin typeface="PingFang SC Regular" panose="020B0400000000000000" charset="-122"/>
+              <a:ea typeface="PingFang SC Regular" panose="020B0400000000000000" charset="-122"/>
+              <a:cs typeface="PingFang SC Regular" panose="020B0400000000000000" charset="-122"/>
+            </a:endParaRPr>
+          </a:p>
+          <a:p>
+            <a:pPr indent="0">
+              <a:buFont typeface="Arial" panose="020B0604020202090204" pitchFamily="34" charset="0"/>
+              <a:buNone/>
+            </a:pPr>
+            <a:endParaRPr lang="zh-CN" altLang="en-US">
+              <a:latin typeface="PingFang SC Regular" panose="020B0400000000000000" charset="-122"/>
+              <a:ea typeface="PingFang SC Regular" panose="020B0400000000000000" charset="-122"/>
+              <a:cs typeface="PingFang SC Regular" panose="020B0400000000000000" charset="-122"/>
+            </a:endParaRPr>
+          </a:p>
+          <a:p>
+            <a:pPr indent="0">
+              <a:buFont typeface="Arial" panose="020B0604020202090204" pitchFamily="34" charset="0"/>
+              <a:buNone/>
+            </a:pPr>
+            <a:r>
+              <a:rPr lang="en-US" altLang="zh-CN">
+                <a:latin typeface="PingFang SC Regular" panose="020B0400000000000000" charset="-122"/>
+                <a:ea typeface="PingFang SC Regular" panose="020B0400000000000000" charset="-122"/>
+                <a:cs typeface="PingFang SC Regular" panose="020B0400000000000000" charset="-122"/>
+              </a:rPr>
+              <a:t>LOCK#</a:t>
+            </a:r>
+            <a:r>
+              <a:rPr lang="zh-CN" altLang="en-US">
+                <a:latin typeface="PingFang SC Regular" panose="020B0400000000000000" charset="-122"/>
+                <a:ea typeface="PingFang SC Regular" panose="020B0400000000000000" charset="-122"/>
+                <a:cs typeface="PingFang SC Regular" panose="020B0400000000000000" charset="-122"/>
+              </a:rPr>
+              <a:t>信号就是我们经常说到的总线锁，处理器使用</a:t>
+            </a:r>
+            <a:r>
+              <a:rPr lang="en-US" altLang="zh-CN">
+                <a:latin typeface="PingFang SC Regular" panose="020B0400000000000000" charset="-122"/>
+                <a:ea typeface="PingFang SC Regular" panose="020B0400000000000000" charset="-122"/>
+                <a:cs typeface="PingFang SC Regular" panose="020B0400000000000000" charset="-122"/>
+              </a:rPr>
+              <a:t>LOCK#</a:t>
+            </a:r>
+            <a:r>
+              <a:rPr lang="zh-CN" altLang="en-US">
+                <a:latin typeface="PingFang SC Regular" panose="020B0400000000000000" charset="-122"/>
+                <a:ea typeface="PingFang SC Regular" panose="020B0400000000000000" charset="-122"/>
+                <a:cs typeface="PingFang SC Regular" panose="020B0400000000000000" charset="-122"/>
+              </a:rPr>
+              <a:t>信号达到锁定总线，来解决原子性问题，当一个处理器往总线上输出</a:t>
+            </a:r>
+            <a:r>
+              <a:rPr lang="en-US" altLang="zh-CN">
+                <a:latin typeface="PingFang SC Regular" panose="020B0400000000000000" charset="-122"/>
+                <a:ea typeface="PingFang SC Regular" panose="020B0400000000000000" charset="-122"/>
+                <a:cs typeface="PingFang SC Regular" panose="020B0400000000000000" charset="-122"/>
+              </a:rPr>
+              <a:t>LOCK#</a:t>
+            </a:r>
+            <a:r>
+              <a:rPr lang="zh-CN" altLang="en-US">
+                <a:latin typeface="PingFang SC Regular" panose="020B0400000000000000" charset="-122"/>
+                <a:ea typeface="PingFang SC Regular" panose="020B0400000000000000" charset="-122"/>
+                <a:cs typeface="PingFang SC Regular" panose="020B0400000000000000" charset="-122"/>
+              </a:rPr>
+              <a:t>信号时，其他处理器的请求将被阻塞，此时该处理器独占内存。</a:t>
+            </a:r>
+            <a:endParaRPr lang="zh-CN" altLang="en-US">
+              <a:latin typeface="PingFang SC Regular" panose="020B0400000000000000" charset="-122"/>
+              <a:ea typeface="PingFang SC Regular" panose="020B0400000000000000" charset="-122"/>
+              <a:cs typeface="PingFang SC Regular" panose="020B0400000000000000" charset="-122"/>
+            </a:endParaRPr>
+          </a:p>
+          <a:p>
+            <a:pPr indent="0">
+              <a:buFont typeface="Arial" panose="020B0604020202090204" pitchFamily="34" charset="0"/>
+              <a:buNone/>
+            </a:pPr>
+            <a:r>
+              <a:rPr lang="zh-CN" altLang="en-US">
+                <a:latin typeface="PingFang SC Regular" panose="020B0400000000000000" charset="-122"/>
+                <a:ea typeface="PingFang SC Regular" panose="020B0400000000000000" charset="-122"/>
+                <a:cs typeface="PingFang SC Regular" panose="020B0400000000000000" charset="-122"/>
+              </a:rPr>
+              <a:t>总线锁这种做法锁定的范围太大了，导致</a:t>
+            </a:r>
+            <a:r>
+              <a:rPr lang="en-US" altLang="zh-CN">
+                <a:latin typeface="PingFang SC Regular" panose="020B0400000000000000" charset="-122"/>
+                <a:ea typeface="PingFang SC Regular" panose="020B0400000000000000" charset="-122"/>
+                <a:cs typeface="PingFang SC Regular" panose="020B0400000000000000" charset="-122"/>
+              </a:rPr>
+              <a:t>CPU</a:t>
+            </a:r>
+            <a:r>
+              <a:rPr lang="zh-CN" altLang="en-US">
+                <a:latin typeface="PingFang SC Regular" panose="020B0400000000000000" charset="-122"/>
+                <a:ea typeface="PingFang SC Regular" panose="020B0400000000000000" charset="-122"/>
+                <a:cs typeface="PingFang SC Regular" panose="020B0400000000000000" charset="-122"/>
+              </a:rPr>
+              <a:t>利用率急剧下降；因为使用</a:t>
+            </a:r>
+            <a:r>
+              <a:rPr lang="en-US" altLang="zh-CN">
+                <a:latin typeface="PingFang SC Regular" panose="020B0400000000000000" charset="-122"/>
+                <a:ea typeface="PingFang SC Regular" panose="020B0400000000000000" charset="-122"/>
+                <a:cs typeface="PingFang SC Regular" panose="020B0400000000000000" charset="-122"/>
+              </a:rPr>
+              <a:t>LOCK#</a:t>
+            </a:r>
+            <a:r>
+              <a:rPr lang="zh-CN" altLang="en-US">
+                <a:latin typeface="PingFang SC Regular" panose="020B0400000000000000" charset="-122"/>
+                <a:ea typeface="PingFang SC Regular" panose="020B0400000000000000" charset="-122"/>
+                <a:cs typeface="PingFang SC Regular" panose="020B0400000000000000" charset="-122"/>
+              </a:rPr>
+              <a:t>是把</a:t>
+            </a:r>
+            <a:r>
+              <a:rPr lang="en-US" altLang="zh-CN">
+                <a:latin typeface="PingFang SC Regular" panose="020B0400000000000000" charset="-122"/>
+                <a:ea typeface="PingFang SC Regular" panose="020B0400000000000000" charset="-122"/>
+                <a:cs typeface="PingFang SC Regular" panose="020B0400000000000000" charset="-122"/>
+              </a:rPr>
+              <a:t>CPU</a:t>
+            </a:r>
+            <a:r>
+              <a:rPr lang="zh-CN" altLang="en-US">
+                <a:latin typeface="PingFang SC Regular" panose="020B0400000000000000" charset="-122"/>
+                <a:ea typeface="PingFang SC Regular" panose="020B0400000000000000" charset="-122"/>
+                <a:cs typeface="PingFang SC Regular" panose="020B0400000000000000" charset="-122"/>
+              </a:rPr>
+              <a:t>和内存之间的通信锁住了，这使得锁定时期间，其他处理器不能操作其内存地址的数据，所以总线锁的开销比较大。</a:t>
+            </a:r>
+            <a:endParaRPr lang="zh-CN" altLang="en-US">
+              <a:latin typeface="PingFang SC Regular" panose="020B0400000000000000" charset="-122"/>
+              <a:ea typeface="PingFang SC Regular" panose="020B0400000000000000" charset="-122"/>
+              <a:cs typeface="PingFang SC Regular" panose="020B0400000000000000" charset="-122"/>
+            </a:endParaRPr>
+          </a:p>
+          <a:p>
+            <a:pPr indent="0">
+              <a:buFont typeface="Arial" panose="020B0604020202090204" pitchFamily="34" charset="0"/>
+              <a:buNone/>
+            </a:pPr>
+            <a:endParaRPr lang="zh-CN" altLang="en-US">
+              <a:latin typeface="PingFang SC Regular" panose="020B0400000000000000" charset="-122"/>
+              <a:ea typeface="PingFang SC Regular" panose="020B0400000000000000" charset="-122"/>
+              <a:cs typeface="PingFang SC Regular" panose="020B0400000000000000" charset="-122"/>
+            </a:endParaRPr>
+          </a:p>
+          <a:p>
+            <a:pPr indent="0">
+              <a:buFont typeface="Arial" panose="020B0604020202090204" pitchFamily="34" charset="0"/>
+              <a:buNone/>
+            </a:pPr>
+            <a:r>
+              <a:rPr lang="zh-CN" altLang="en-US" b="1">
+                <a:latin typeface="PingFang SC Semibold" panose="020B0400000000000000" charset="-122"/>
+                <a:ea typeface="PingFang SC Semibold" panose="020B0400000000000000" charset="-122"/>
+                <a:cs typeface="PingFang SC Regular" panose="020B0400000000000000" charset="-122"/>
+              </a:rPr>
+              <a:t>缓存锁</a:t>
+            </a:r>
+            <a:endParaRPr lang="zh-CN" altLang="en-US">
+              <a:latin typeface="PingFang SC Regular" panose="020B0400000000000000" charset="-122"/>
+              <a:ea typeface="PingFang SC Regular" panose="020B0400000000000000" charset="-122"/>
+              <a:cs typeface="PingFang SC Regular" panose="020B0400000000000000" charset="-122"/>
+            </a:endParaRPr>
+          </a:p>
+          <a:p>
+            <a:pPr indent="0">
+              <a:buFont typeface="Arial" panose="020B0604020202090204" pitchFamily="34" charset="0"/>
+              <a:buNone/>
+            </a:pPr>
+            <a:endParaRPr lang="zh-CN" altLang="en-US">
+              <a:latin typeface="PingFang SC Regular" panose="020B0400000000000000" charset="-122"/>
+              <a:ea typeface="PingFang SC Regular" panose="020B0400000000000000" charset="-122"/>
+              <a:cs typeface="PingFang SC Regular" panose="020B0400000000000000" charset="-122"/>
+            </a:endParaRPr>
+          </a:p>
+          <a:p>
+            <a:pPr indent="0">
+              <a:buFont typeface="Arial" panose="020B0604020202090204" pitchFamily="34" charset="0"/>
+              <a:buNone/>
+            </a:pPr>
+            <a:r>
+              <a:rPr lang="zh-CN" altLang="en-US">
+                <a:latin typeface="PingFang SC Regular" panose="020B0400000000000000" charset="-122"/>
+                <a:ea typeface="PingFang SC Regular" panose="020B0400000000000000" charset="-122"/>
+                <a:cs typeface="PingFang SC Regular" panose="020B0400000000000000" charset="-122"/>
+              </a:rPr>
+              <a:t>如果访问的内存区域已经缓存在处理器的</a:t>
+            </a:r>
+            <a:r>
+              <a:rPr lang="en-US" altLang="zh-CN">
+                <a:latin typeface="PingFang SC Regular" panose="020B0400000000000000" charset="-122"/>
+                <a:ea typeface="PingFang SC Regular" panose="020B0400000000000000" charset="-122"/>
+                <a:cs typeface="PingFang SC Regular" panose="020B0400000000000000" charset="-122"/>
+              </a:rPr>
+              <a:t>CacheLine</a:t>
+            </a:r>
+            <a:r>
+              <a:rPr lang="zh-CN" altLang="en-US">
+                <a:latin typeface="PingFang SC Regular" panose="020B0400000000000000" charset="-122"/>
+                <a:ea typeface="PingFang SC Regular" panose="020B0400000000000000" charset="-122"/>
+                <a:cs typeface="PingFang SC Regular" panose="020B0400000000000000" charset="-122"/>
+              </a:rPr>
+              <a:t>中，处理器则不会声明</a:t>
+            </a:r>
+            <a:r>
+              <a:rPr lang="en-US" altLang="zh-CN">
+                <a:latin typeface="PingFang SC Regular" panose="020B0400000000000000" charset="-122"/>
+                <a:ea typeface="PingFang SC Regular" panose="020B0400000000000000" charset="-122"/>
+                <a:cs typeface="PingFang SC Regular" panose="020B0400000000000000" charset="-122"/>
+              </a:rPr>
+              <a:t>LOCK#</a:t>
+            </a:r>
+            <a:r>
+              <a:rPr lang="zh-CN" altLang="en-US">
+                <a:latin typeface="PingFang SC Regular" panose="020B0400000000000000" charset="-122"/>
+                <a:ea typeface="PingFang SC Regular" panose="020B0400000000000000" charset="-122"/>
+                <a:cs typeface="PingFang SC Regular" panose="020B0400000000000000" charset="-122"/>
+              </a:rPr>
+              <a:t>信号，它会对</a:t>
+            </a:r>
+            <a:r>
+              <a:rPr lang="en-US" altLang="zh-CN">
+                <a:latin typeface="PingFang SC Regular" panose="020B0400000000000000" charset="-122"/>
+                <a:ea typeface="PingFang SC Regular" panose="020B0400000000000000" charset="-122"/>
+                <a:cs typeface="PingFang SC Regular" panose="020B0400000000000000" charset="-122"/>
+              </a:rPr>
+              <a:t>CPU</a:t>
+            </a:r>
+            <a:r>
+              <a:rPr lang="zh-CN" altLang="en-US">
+                <a:latin typeface="PingFang SC Regular" panose="020B0400000000000000" charset="-122"/>
+                <a:ea typeface="PingFang SC Regular" panose="020B0400000000000000" charset="-122"/>
+                <a:cs typeface="PingFang SC Regular" panose="020B0400000000000000" charset="-122"/>
+              </a:rPr>
+              <a:t>缓存中的</a:t>
+            </a:r>
+            <a:r>
+              <a:rPr lang="en-US" altLang="zh-CN">
+                <a:latin typeface="PingFang SC Regular" panose="020B0400000000000000" charset="-122"/>
+                <a:ea typeface="PingFang SC Regular" panose="020B0400000000000000" charset="-122"/>
+                <a:cs typeface="PingFang SC Regular" panose="020B0400000000000000" charset="-122"/>
+              </a:rPr>
+              <a:t>CacheLine</a:t>
+            </a:r>
+            <a:r>
+              <a:rPr lang="zh-CN" altLang="en-US">
+                <a:latin typeface="PingFang SC Regular" panose="020B0400000000000000" charset="-122"/>
+                <a:ea typeface="PingFang SC Regular" panose="020B0400000000000000" charset="-122"/>
+                <a:cs typeface="PingFang SC Regular" panose="020B0400000000000000" charset="-122"/>
+              </a:rPr>
+              <a:t>进行锁定，在锁定期间，其他</a:t>
+            </a:r>
+            <a:r>
+              <a:rPr lang="en-US" altLang="zh-CN">
+                <a:latin typeface="PingFang SC Regular" panose="020B0400000000000000" charset="-122"/>
+                <a:ea typeface="PingFang SC Regular" panose="020B0400000000000000" charset="-122"/>
+                <a:cs typeface="PingFang SC Regular" panose="020B0400000000000000" charset="-122"/>
+              </a:rPr>
+              <a:t>CPU</a:t>
+            </a:r>
+            <a:r>
+              <a:rPr lang="zh-CN" altLang="en-US">
+                <a:latin typeface="PingFang SC Regular" panose="020B0400000000000000" charset="-122"/>
+                <a:ea typeface="PingFang SC Regular" panose="020B0400000000000000" charset="-122"/>
+                <a:cs typeface="PingFang SC Regular" panose="020B0400000000000000" charset="-122"/>
+              </a:rPr>
+              <a:t>不能同时缓存此数据，在修改之后，通过缓存一致性</a:t>
+            </a:r>
+            <a:r>
+              <a:rPr lang="en-US" altLang="zh-CN">
+                <a:latin typeface="PingFang SC Regular" panose="020B0400000000000000" charset="-122"/>
+                <a:ea typeface="PingFang SC Regular" panose="020B0400000000000000" charset="-122"/>
+                <a:cs typeface="PingFang SC Regular" panose="020B0400000000000000" charset="-122"/>
+              </a:rPr>
+              <a:t>(MESI)</a:t>
+            </a:r>
+            <a:r>
+              <a:rPr lang="zh-CN" altLang="en-US">
+                <a:latin typeface="PingFang SC Regular" panose="020B0400000000000000" charset="-122"/>
+                <a:ea typeface="PingFang SC Regular" panose="020B0400000000000000" charset="-122"/>
+                <a:cs typeface="PingFang SC Regular" panose="020B0400000000000000" charset="-122"/>
+              </a:rPr>
+              <a:t>协议来保证修改的原子性，这个操作被称为</a:t>
+            </a:r>
+            <a:r>
+              <a:rPr lang="en-US" altLang="zh-CN">
+                <a:latin typeface="PingFang SC Regular" panose="020B0400000000000000" charset="-122"/>
+                <a:ea typeface="PingFang SC Regular" panose="020B0400000000000000" charset="-122"/>
+                <a:cs typeface="PingFang SC Regular" panose="020B0400000000000000" charset="-122"/>
+              </a:rPr>
+              <a:t>“</a:t>
+            </a:r>
+            <a:r>
+              <a:rPr lang="zh-CN" altLang="en-US">
+                <a:latin typeface="PingFang SC Regular" panose="020B0400000000000000" charset="-122"/>
+                <a:ea typeface="PingFang SC Regular" panose="020B0400000000000000" charset="-122"/>
+                <a:cs typeface="PingFang SC Regular" panose="020B0400000000000000" charset="-122"/>
+              </a:rPr>
+              <a:t>缓存锁</a:t>
+            </a:r>
+            <a:r>
+              <a:rPr lang="en-US" altLang="zh-CN">
+                <a:latin typeface="PingFang SC Regular" panose="020B0400000000000000" charset="-122"/>
+                <a:ea typeface="PingFang SC Regular" panose="020B0400000000000000" charset="-122"/>
+                <a:cs typeface="PingFang SC Regular" panose="020B0400000000000000" charset="-122"/>
+              </a:rPr>
+              <a:t>”</a:t>
+            </a:r>
+            <a:r>
+              <a:rPr lang="zh-CN" altLang="en-US">
+                <a:latin typeface="PingFang SC Regular" panose="020B0400000000000000" charset="-122"/>
+                <a:ea typeface="PingFang SC Regular" panose="020B0400000000000000" charset="-122"/>
+                <a:cs typeface="PingFang SC Regular" panose="020B0400000000000000" charset="-122"/>
+              </a:rPr>
+              <a:t>。</a:t>
+            </a:r>
+            <a:endParaRPr lang="zh-CN" altLang="en-US">
+              <a:latin typeface="PingFang SC Regular" panose="020B0400000000000000" charset="-122"/>
+              <a:ea typeface="PingFang SC Regular" panose="020B0400000000000000" charset="-122"/>
+              <a:cs typeface="PingFang SC Regular" panose="020B0400000000000000" charset="-122"/>
+            </a:endParaRPr>
+          </a:p>
+          <a:p>
+            <a:pPr indent="0">
+              <a:buFont typeface="Arial" panose="020B0604020202090204" pitchFamily="34" charset="0"/>
+              <a:buNone/>
+            </a:pPr>
+            <a:endParaRPr lang="zh-CN" altLang="en-US">
+              <a:latin typeface="PingFang SC Regular" panose="020B0400000000000000" charset="-122"/>
+              <a:ea typeface="PingFang SC Regular" panose="020B0400000000000000" charset="-122"/>
+              <a:cs typeface="PingFang SC Regular" panose="020B0400000000000000" charset="-122"/>
+            </a:endParaRPr>
+          </a:p>
+        </p:txBody>
+      </p:sp>
+    </p:spTree>
+  </p:cSld>
+  <p:clrMapOvr>
+    <a:masterClrMapping/>
+  </p:clrMapOvr>
+</p:sld>
+</file>
+
+<file path=ppt/slides/slide6.xml><?xml version="1.0" encoding="utf-8"?>
+<p:sld xmlns:a="http://schemas.openxmlformats.org/drawingml/2006/main" xmlns:r="http://schemas.openxmlformats.org/officeDocument/2006/relationships" xmlns:p="http://schemas.openxmlformats.org/presentationml/2006/main">
+  <p:cSld>
+    <p:spTree>
+      <p:nvGrpSpPr>
+        <p:cNvPr id="1" name=""/>
+        <p:cNvGrpSpPr/>
+        <p:nvPr/>
+      </p:nvGrpSpPr>
+      <p:grpSpPr/>
+      <p:sp>
+        <p:nvSpPr>
+          <p:cNvPr id="2" name="文本框 1"/>
+          <p:cNvSpPr txBox="1"/>
+          <p:nvPr/>
+        </p:nvSpPr>
+        <p:spPr>
+          <a:xfrm>
+            <a:off x="356235" y="187325"/>
+            <a:ext cx="7103745" cy="460375"/>
+          </a:xfrm>
+          <a:prstGeom prst="rect">
+            <a:avLst/>
+          </a:prstGeom>
+          <a:noFill/>
+        </p:spPr>
+        <p:txBody>
+          <a:bodyPr wrap="square" rtlCol="0">
+            <a:spAutoFit/>
+          </a:bodyPr>
+          <a:p>
+            <a:r>
+              <a:rPr lang="zh-CN" altLang="en-US" sz="2400">
+                <a:latin typeface="PingFang SC Regular" panose="020B0400000000000000" charset="-122"/>
+                <a:ea typeface="PingFang SC Regular" panose="020B0400000000000000" charset="-122"/>
+              </a:rPr>
+              <a:t>谈谈</a:t>
+            </a:r>
+            <a:r>
+              <a:rPr lang="en-US" altLang="zh-CN" sz="2400">
+                <a:latin typeface="PingFang SC Regular" panose="020B0400000000000000" charset="-122"/>
+                <a:ea typeface="PingFang SC Regular" panose="020B0400000000000000" charset="-122"/>
+              </a:rPr>
+              <a:t>lock</a:t>
+            </a:r>
+            <a:r>
+              <a:rPr lang="zh-CN" altLang="en-US" sz="2400">
+                <a:latin typeface="PingFang SC Regular" panose="020B0400000000000000" charset="-122"/>
+                <a:ea typeface="PingFang SC Regular" panose="020B0400000000000000" charset="-122"/>
+              </a:rPr>
+              <a:t>指令：</a:t>
+            </a:r>
+            <a:endParaRPr lang="zh-CN" altLang="en-US" sz="2400">
+              <a:latin typeface="PingFang SC Regular" panose="020B0400000000000000" charset="-122"/>
+              <a:ea typeface="PingFang SC Regular" panose="020B0400000000000000" charset="-122"/>
+            </a:endParaRPr>
+          </a:p>
+        </p:txBody>
+      </p:sp>
+      <p:sp>
+        <p:nvSpPr>
+          <p:cNvPr id="7" name="文本框 6"/>
+          <p:cNvSpPr txBox="1"/>
+          <p:nvPr/>
+        </p:nvSpPr>
+        <p:spPr>
+          <a:xfrm>
+            <a:off x="475615" y="647700"/>
+            <a:ext cx="11240770" cy="2584450"/>
+          </a:xfrm>
+          <a:prstGeom prst="rect">
+            <a:avLst/>
+          </a:prstGeom>
+          <a:noFill/>
+        </p:spPr>
+        <p:txBody>
+          <a:bodyPr wrap="square" rtlCol="0">
+            <a:spAutoFit/>
+          </a:bodyPr>
+          <a:p>
+            <a:pPr indent="0">
+              <a:buFont typeface="Arial" panose="020B0604020202090204" pitchFamily="34" charset="0"/>
+              <a:buNone/>
+            </a:pPr>
+            <a:r>
+              <a:rPr lang="zh-CN" altLang="en-US" b="1">
+                <a:latin typeface="PingFang SC Semibold" panose="020B0400000000000000" charset="-122"/>
+                <a:ea typeface="PingFang SC Semibold" panose="020B0400000000000000" charset="-122"/>
+                <a:cs typeface="PingFang SC Regular" panose="020B0400000000000000" charset="-122"/>
+              </a:rPr>
+              <a:t>什么情况下会使用总线锁？</a:t>
+            </a:r>
+            <a:endParaRPr lang="zh-CN" altLang="en-US">
+              <a:latin typeface="PingFang SC Regular" panose="020B0400000000000000" charset="-122"/>
+              <a:ea typeface="PingFang SC Regular" panose="020B0400000000000000" charset="-122"/>
+              <a:cs typeface="PingFang SC Regular" panose="020B0400000000000000" charset="-122"/>
+            </a:endParaRPr>
+          </a:p>
+          <a:p>
+            <a:pPr indent="0">
+              <a:buFont typeface="Arial" panose="020B0604020202090204" pitchFamily="34" charset="0"/>
+              <a:buNone/>
+            </a:pPr>
+            <a:endParaRPr lang="zh-CN" altLang="en-US">
+              <a:latin typeface="PingFang SC Regular" panose="020B0400000000000000" charset="-122"/>
+              <a:ea typeface="PingFang SC Regular" panose="020B0400000000000000" charset="-122"/>
+              <a:cs typeface="PingFang SC Regular" panose="020B0400000000000000" charset="-122"/>
+            </a:endParaRPr>
+          </a:p>
+          <a:p>
+            <a:pPr indent="0">
+              <a:buFont typeface="Arial" panose="020B0604020202090204" pitchFamily="34" charset="0"/>
+              <a:buNone/>
+            </a:pPr>
+            <a:r>
+              <a:rPr lang="zh-CN" altLang="en-US">
+                <a:latin typeface="PingFang SC Regular" panose="020B0400000000000000" charset="-122"/>
+                <a:ea typeface="PingFang SC Regular" panose="020B0400000000000000" charset="-122"/>
+                <a:cs typeface="PingFang SC Regular" panose="020B0400000000000000" charset="-122"/>
+              </a:rPr>
+              <a:t>当操作的数据不能被缓存在处理器内部，或操作的数据跨多个</a:t>
+            </a:r>
+            <a:r>
+              <a:rPr lang="en-US" altLang="zh-CN">
+                <a:latin typeface="PingFang SC Regular" panose="020B0400000000000000" charset="-122"/>
+                <a:ea typeface="PingFang SC Regular" panose="020B0400000000000000" charset="-122"/>
+                <a:cs typeface="PingFang SC Regular" panose="020B0400000000000000" charset="-122"/>
+              </a:rPr>
+              <a:t>CacheLine</a:t>
+            </a:r>
+            <a:r>
+              <a:rPr lang="zh-CN" altLang="en-US">
+                <a:latin typeface="PingFang SC Regular" panose="020B0400000000000000" charset="-122"/>
+                <a:ea typeface="PingFang SC Regular" panose="020B0400000000000000" charset="-122"/>
+                <a:cs typeface="PingFang SC Regular" panose="020B0400000000000000" charset="-122"/>
+              </a:rPr>
+              <a:t>时，会使用总线锁。</a:t>
+            </a:r>
+            <a:endParaRPr lang="zh-CN" altLang="en-US">
+              <a:latin typeface="PingFang SC Regular" panose="020B0400000000000000" charset="-122"/>
+              <a:ea typeface="PingFang SC Regular" panose="020B0400000000000000" charset="-122"/>
+              <a:cs typeface="PingFang SC Regular" panose="020B0400000000000000" charset="-122"/>
+            </a:endParaRPr>
+          </a:p>
+          <a:p>
+            <a:pPr indent="0">
+              <a:buFont typeface="Arial" panose="020B0604020202090204" pitchFamily="34" charset="0"/>
+              <a:buNone/>
+            </a:pPr>
+            <a:endParaRPr lang="zh-CN" altLang="en-US">
+              <a:latin typeface="PingFang SC Regular" panose="020B0400000000000000" charset="-122"/>
+              <a:ea typeface="PingFang SC Regular" panose="020B0400000000000000" charset="-122"/>
+              <a:cs typeface="PingFang SC Regular" panose="020B0400000000000000" charset="-122"/>
+            </a:endParaRPr>
+          </a:p>
+          <a:p>
+            <a:pPr indent="0">
+              <a:buFont typeface="Arial" panose="020B0604020202090204" pitchFamily="34" charset="0"/>
+              <a:buNone/>
+            </a:pPr>
+            <a:r>
+              <a:rPr lang="zh-CN" altLang="en-US" b="1">
+                <a:latin typeface="PingFang SC Semibold" panose="020B0400000000000000" charset="-122"/>
+                <a:ea typeface="PingFang SC Semibold" panose="020B0400000000000000" charset="-122"/>
+                <a:cs typeface="PingFang SC Regular" panose="020B0400000000000000" charset="-122"/>
+              </a:rPr>
+              <a:t>有些指令自带总线锁</a:t>
+            </a:r>
+            <a:endParaRPr lang="zh-CN" altLang="en-US">
+              <a:latin typeface="PingFang SC Regular" panose="020B0400000000000000" charset="-122"/>
+              <a:ea typeface="PingFang SC Regular" panose="020B0400000000000000" charset="-122"/>
+              <a:cs typeface="PingFang SC Regular" panose="020B0400000000000000" charset="-122"/>
+            </a:endParaRPr>
+          </a:p>
+          <a:p>
+            <a:pPr indent="0">
+              <a:buFont typeface="Arial" panose="020B0604020202090204" pitchFamily="34" charset="0"/>
+              <a:buNone/>
+            </a:pPr>
+            <a:endParaRPr lang="zh-CN" altLang="en-US">
+              <a:latin typeface="PingFang SC Regular" panose="020B0400000000000000" charset="-122"/>
+              <a:ea typeface="PingFang SC Regular" panose="020B0400000000000000" charset="-122"/>
+              <a:cs typeface="PingFang SC Regular" panose="020B0400000000000000" charset="-122"/>
+            </a:endParaRPr>
+          </a:p>
+          <a:p>
+            <a:pPr indent="0">
+              <a:buFont typeface="Arial" panose="020B0604020202090204" pitchFamily="34" charset="0"/>
+              <a:buNone/>
+            </a:pPr>
+            <a:r>
+              <a:rPr lang="en-US" altLang="zh-CN">
+                <a:latin typeface="PingFang SC Regular" panose="020B0400000000000000" charset="-122"/>
+                <a:ea typeface="PingFang SC Regular" panose="020B0400000000000000" charset="-122"/>
+                <a:cs typeface="PingFang SC Regular" panose="020B0400000000000000" charset="-122"/>
+              </a:rPr>
+              <a:t>CAS</a:t>
+            </a:r>
+            <a:r>
+              <a:rPr lang="zh-CN" altLang="en-US">
+                <a:latin typeface="PingFang SC Regular" panose="020B0400000000000000" charset="-122"/>
+                <a:ea typeface="PingFang SC Regular" panose="020B0400000000000000" charset="-122"/>
+                <a:cs typeface="PingFang SC Regular" panose="020B0400000000000000" charset="-122"/>
+              </a:rPr>
+              <a:t>的底层指令</a:t>
+            </a:r>
+            <a:r>
+              <a:rPr lang="en-US" altLang="zh-CN">
+                <a:latin typeface="PingFang SC Regular" panose="020B0400000000000000" charset="-122"/>
+                <a:ea typeface="PingFang SC Regular" panose="020B0400000000000000" charset="-122"/>
+                <a:cs typeface="PingFang SC Regular" panose="020B0400000000000000" charset="-122"/>
+              </a:rPr>
+              <a:t>CMPXCHG</a:t>
+            </a:r>
+            <a:r>
+              <a:rPr lang="zh-CN" altLang="en-US">
+                <a:latin typeface="PingFang SC Regular" panose="020B0400000000000000" charset="-122"/>
+                <a:ea typeface="PingFang SC Regular" panose="020B0400000000000000" charset="-122"/>
+                <a:cs typeface="PingFang SC Regular" panose="020B0400000000000000" charset="-122"/>
+              </a:rPr>
+              <a:t>在执行的时候，会自动加总线锁，导致其他处理器不能同时访问，保证其原子性。</a:t>
+            </a:r>
+            <a:endParaRPr lang="zh-CN" altLang="en-US">
+              <a:latin typeface="PingFang SC Regular" panose="020B0400000000000000" charset="-122"/>
+              <a:ea typeface="PingFang SC Regular" panose="020B0400000000000000" charset="-122"/>
+              <a:cs typeface="PingFang SC Regular" panose="020B0400000000000000" charset="-122"/>
+            </a:endParaRPr>
+          </a:p>
+          <a:p>
+            <a:pPr indent="0">
+              <a:buFont typeface="Arial" panose="020B0604020202090204" pitchFamily="34" charset="0"/>
+              <a:buNone/>
+            </a:pPr>
+            <a:endParaRPr lang="zh-CN" altLang="en-US">
+              <a:latin typeface="PingFang SC Regular" panose="020B0400000000000000" charset="-122"/>
+              <a:ea typeface="PingFang SC Regular" panose="020B0400000000000000" charset="-122"/>
+              <a:cs typeface="PingFang SC Regular" panose="020B0400000000000000" charset="-122"/>
+            </a:endParaRPr>
+          </a:p>
+          <a:p>
+            <a:pPr indent="0">
+              <a:buFont typeface="Arial" panose="020B0604020202090204" pitchFamily="34" charset="0"/>
+              <a:buNone/>
+            </a:pPr>
+            <a:endParaRPr lang="zh-CN" altLang="en-US">
+              <a:latin typeface="PingFang SC Regular" panose="020B0400000000000000" charset="-122"/>
+              <a:ea typeface="PingFang SC Regular" panose="020B0400000000000000" charset="-122"/>
+              <a:cs typeface="PingFang SC Regular" panose="020B0400000000000000" charset="-122"/>
+            </a:endParaRPr>
+          </a:p>
+        </p:txBody>
+      </p:sp>
+    </p:spTree>
+  </p:cSld>
+  <p:clrMapOvr>
+    <a:masterClrMapping/>
+  </p:clrMapOvr>
+</p:sld>
+</file>
+
+<file path=ppt/slides/slide7.xml><?xml version="1.0" encoding="utf-8"?>
+<p:sld xmlns:a="http://schemas.openxmlformats.org/drawingml/2006/main" xmlns:r="http://schemas.openxmlformats.org/officeDocument/2006/relationships" xmlns:p="http://schemas.openxmlformats.org/presentationml/2006/main">
+  <p:cSld>
+    <p:spTree>
+      <p:nvGrpSpPr>
+        <p:cNvPr id="1" name=""/>
+        <p:cNvGrpSpPr/>
+        <p:nvPr/>
+      </p:nvGrpSpPr>
+      <p:grpSpPr/>
+      <p:sp>
+        <p:nvSpPr>
+          <p:cNvPr id="2" name="文本框 1"/>
+          <p:cNvSpPr txBox="1"/>
+          <p:nvPr/>
+        </p:nvSpPr>
+        <p:spPr>
+          <a:xfrm>
+            <a:off x="356235" y="187325"/>
+            <a:ext cx="7103745" cy="460375"/>
+          </a:xfrm>
+          <a:prstGeom prst="rect">
+            <a:avLst/>
+          </a:prstGeom>
+          <a:noFill/>
+        </p:spPr>
+        <p:txBody>
+          <a:bodyPr wrap="square" rtlCol="0">
+            <a:spAutoFit/>
+          </a:bodyPr>
+          <a:p>
+            <a:r>
               <a:rPr lang="en-US" altLang="zh-CN" sz="2400">
                 <a:latin typeface="PingFang SC Regular" panose="020B0400000000000000" charset="-122"/>
                 <a:ea typeface="PingFang SC Regular" panose="020B0400000000000000" charset="-122"/>
@@ -8769,7 +10799,7 @@
 </p:sld>
 </file>
 
-<file path=ppt/slides/slide6.xml><?xml version="1.0" encoding="utf-8"?>
+<file path=ppt/slides/slide8.xml><?xml version="1.0" encoding="utf-8"?>
 <p:sld xmlns:a="http://schemas.openxmlformats.org/drawingml/2006/main" xmlns:r="http://schemas.openxmlformats.org/officeDocument/2006/relationships" xmlns:p="http://schemas.openxmlformats.org/presentationml/2006/main">
   <p:cSld>
     <p:spTree>
@@ -9246,7 +11276,7 @@
 </p:sld>
 </file>
 
-<file path=ppt/slides/slide7.xml><?xml version="1.0" encoding="utf-8"?>
+<file path=ppt/slides/slide9.xml><?xml version="1.0" encoding="utf-8"?>
 <p:sld xmlns:a="http://schemas.openxmlformats.org/drawingml/2006/main" xmlns:r="http://schemas.openxmlformats.org/officeDocument/2006/relationships" xmlns:p="http://schemas.openxmlformats.org/presentationml/2006/main">
   <p:cSld>
     <p:spTree>
@@ -9961,1020 +11991,6 @@
 </p:sld>
 </file>
 
-<file path=ppt/slides/slide8.xml><?xml version="1.0" encoding="utf-8"?>
-<p:sld xmlns:a="http://schemas.openxmlformats.org/drawingml/2006/main" xmlns:r="http://schemas.openxmlformats.org/officeDocument/2006/relationships" xmlns:p="http://schemas.openxmlformats.org/presentationml/2006/main">
-  <p:cSld>
-    <p:spTree>
-      <p:nvGrpSpPr>
-        <p:cNvPr id="1" name=""/>
-        <p:cNvGrpSpPr/>
-        <p:nvPr/>
-      </p:nvGrpSpPr>
-      <p:grpSpPr/>
-      <p:sp>
-        <p:nvSpPr>
-          <p:cNvPr id="2" name="文本框 1"/>
-          <p:cNvSpPr txBox="1"/>
-          <p:nvPr/>
-        </p:nvSpPr>
-        <p:spPr>
-          <a:xfrm>
-            <a:off x="356235" y="195580"/>
-            <a:ext cx="7103745" cy="460375"/>
-          </a:xfrm>
-          <a:prstGeom prst="rect">
-            <a:avLst/>
-          </a:prstGeom>
-          <a:noFill/>
-        </p:spPr>
-        <p:txBody>
-          <a:bodyPr wrap="square" rtlCol="0">
-            <a:spAutoFit/>
-          </a:bodyPr>
-          <a:p>
-            <a:r>
-              <a:rPr lang="en-US" altLang="zh-CN" sz="2400">
-                <a:latin typeface="PingFang SC Regular" panose="020B0400000000000000" charset="-122"/>
-                <a:ea typeface="PingFang SC Regular" panose="020B0400000000000000" charset="-122"/>
-              </a:rPr>
-              <a:t>CacheLine</a:t>
-            </a:r>
-            <a:r>
-              <a:rPr lang="zh-CN" altLang="en-US" sz="2400">
-                <a:latin typeface="PingFang SC Regular" panose="020B0400000000000000" charset="-122"/>
-                <a:ea typeface="PingFang SC Regular" panose="020B0400000000000000" charset="-122"/>
-              </a:rPr>
-              <a:t>：</a:t>
-            </a:r>
-            <a:endParaRPr lang="zh-CN" altLang="en-US" sz="2400">
-              <a:latin typeface="PingFang SC Regular" panose="020B0400000000000000" charset="-122"/>
-              <a:ea typeface="PingFang SC Regular" panose="020B0400000000000000" charset="-122"/>
-            </a:endParaRPr>
-          </a:p>
-        </p:txBody>
-      </p:sp>
-      <p:pic>
-        <p:nvPicPr>
-          <p:cNvPr id="4" name="图片 3"/>
-          <p:cNvPicPr>
-            <a:picLocks noChangeAspect="1"/>
-          </p:cNvPicPr>
-          <p:nvPr/>
-        </p:nvPicPr>
-        <p:blipFill>
-          <a:blip r:embed="rId1"/>
-          <a:stretch>
-            <a:fillRect/>
-          </a:stretch>
-        </p:blipFill>
-        <p:spPr>
-          <a:xfrm>
-            <a:off x="571500" y="1544955"/>
-            <a:ext cx="4812030" cy="3364865"/>
-          </a:xfrm>
-          <a:prstGeom prst="rect">
-            <a:avLst/>
-          </a:prstGeom>
-        </p:spPr>
-      </p:pic>
-      <p:sp>
-        <p:nvSpPr>
-          <p:cNvPr id="7" name="文本框 6"/>
-          <p:cNvSpPr txBox="1"/>
-          <p:nvPr/>
-        </p:nvSpPr>
-        <p:spPr>
-          <a:xfrm>
-            <a:off x="6136005" y="1101725"/>
-            <a:ext cx="5621020" cy="4523105"/>
-          </a:xfrm>
-          <a:prstGeom prst="rect">
-            <a:avLst/>
-          </a:prstGeom>
-          <a:noFill/>
-        </p:spPr>
-        <p:txBody>
-          <a:bodyPr wrap="square" rtlCol="0">
-            <a:spAutoFit/>
-          </a:bodyPr>
-          <a:p>
-            <a:pPr marL="285750" indent="-285750">
-              <a:buFont typeface="Arial" panose="020B0604020202090204" pitchFamily="34" charset="0"/>
-              <a:buChar char="•"/>
-            </a:pPr>
-            <a:r>
-              <a:rPr lang="en-US" altLang="zh-CN">
-                <a:latin typeface="PingFang SC Regular" panose="020B0400000000000000" charset="-122"/>
-                <a:ea typeface="PingFang SC Regular" panose="020B0400000000000000" charset="-122"/>
-                <a:cs typeface="PingFang SC Regular" panose="020B0400000000000000" charset="-122"/>
-              </a:rPr>
-              <a:t>B</a:t>
-            </a:r>
-            <a:r>
-              <a:rPr lang="zh-CN" altLang="en-US">
-                <a:latin typeface="PingFang SC Regular" panose="020B0400000000000000" charset="-122"/>
-                <a:ea typeface="PingFang SC Regular" panose="020B0400000000000000" charset="-122"/>
-                <a:cs typeface="PingFang SC Regular" panose="020B0400000000000000" charset="-122"/>
-              </a:rPr>
-              <a:t>：一行</a:t>
-            </a:r>
-            <a:r>
-              <a:rPr lang="en-US" altLang="zh-CN">
-                <a:latin typeface="PingFang SC Regular" panose="020B0400000000000000" charset="-122"/>
-                <a:ea typeface="PingFang SC Regular" panose="020B0400000000000000" charset="-122"/>
-                <a:cs typeface="PingFang SC Regular" panose="020B0400000000000000" charset="-122"/>
-              </a:rPr>
-              <a:t>CacheLine</a:t>
-            </a:r>
-            <a:r>
-              <a:rPr lang="zh-CN" altLang="en-US">
-                <a:latin typeface="PingFang SC Regular" panose="020B0400000000000000" charset="-122"/>
-                <a:ea typeface="PingFang SC Regular" panose="020B0400000000000000" charset="-122"/>
-                <a:cs typeface="PingFang SC Regular" panose="020B0400000000000000" charset="-122"/>
-              </a:rPr>
-              <a:t>的数据块大小；</a:t>
-            </a:r>
-            <a:endParaRPr lang="zh-CN" altLang="en-US">
-              <a:latin typeface="PingFang SC Regular" panose="020B0400000000000000" charset="-122"/>
-              <a:ea typeface="PingFang SC Regular" panose="020B0400000000000000" charset="-122"/>
-              <a:cs typeface="PingFang SC Regular" panose="020B0400000000000000" charset="-122"/>
-            </a:endParaRPr>
-          </a:p>
-          <a:p>
-            <a:pPr marL="285750" indent="-285750">
-              <a:buFont typeface="Arial" panose="020B0604020202090204" pitchFamily="34" charset="0"/>
-              <a:buChar char="•"/>
-            </a:pPr>
-            <a:r>
-              <a:rPr lang="en-US" altLang="zh-CN">
-                <a:latin typeface="PingFang SC Regular" panose="020B0400000000000000" charset="-122"/>
-                <a:ea typeface="PingFang SC Regular" panose="020B0400000000000000" charset="-122"/>
-                <a:cs typeface="PingFang SC Regular" panose="020B0400000000000000" charset="-122"/>
-              </a:rPr>
-              <a:t>E</a:t>
-            </a:r>
-            <a:r>
-              <a:rPr lang="zh-CN" altLang="en-US">
-                <a:latin typeface="PingFang SC Regular" panose="020B0400000000000000" charset="-122"/>
-                <a:ea typeface="PingFang SC Regular" panose="020B0400000000000000" charset="-122"/>
-                <a:cs typeface="PingFang SC Regular" panose="020B0400000000000000" charset="-122"/>
-              </a:rPr>
-              <a:t>：每组有多少行</a:t>
-            </a:r>
-            <a:r>
-              <a:rPr lang="en-US" altLang="zh-CN">
-                <a:latin typeface="PingFang SC Regular" panose="020B0400000000000000" charset="-122"/>
-                <a:ea typeface="PingFang SC Regular" panose="020B0400000000000000" charset="-122"/>
-                <a:cs typeface="PingFang SC Regular" panose="020B0400000000000000" charset="-122"/>
-              </a:rPr>
-              <a:t>CacheLine</a:t>
-            </a:r>
-            <a:r>
-              <a:rPr lang="zh-CN" altLang="en-US">
-                <a:latin typeface="PingFang SC Regular" panose="020B0400000000000000" charset="-122"/>
-                <a:ea typeface="PingFang SC Regular" panose="020B0400000000000000" charset="-122"/>
-                <a:cs typeface="PingFang SC Regular" panose="020B0400000000000000" charset="-122"/>
-              </a:rPr>
-              <a:t>；</a:t>
-            </a:r>
-            <a:endParaRPr lang="zh-CN" altLang="en-US">
-              <a:latin typeface="PingFang SC Regular" panose="020B0400000000000000" charset="-122"/>
-              <a:ea typeface="PingFang SC Regular" panose="020B0400000000000000" charset="-122"/>
-              <a:cs typeface="PingFang SC Regular" panose="020B0400000000000000" charset="-122"/>
-            </a:endParaRPr>
-          </a:p>
-          <a:p>
-            <a:pPr marL="285750" indent="-285750">
-              <a:buFont typeface="Arial" panose="020B0604020202090204" pitchFamily="34" charset="0"/>
-              <a:buChar char="•"/>
-            </a:pPr>
-            <a:r>
-              <a:rPr lang="en-US" altLang="zh-CN">
-                <a:latin typeface="PingFang SC Regular" panose="020B0400000000000000" charset="-122"/>
-                <a:ea typeface="PingFang SC Regular" panose="020B0400000000000000" charset="-122"/>
-                <a:cs typeface="PingFang SC Regular" panose="020B0400000000000000" charset="-122"/>
-              </a:rPr>
-              <a:t>S</a:t>
-            </a:r>
-            <a:r>
-              <a:rPr lang="zh-CN" altLang="en-US">
-                <a:latin typeface="PingFang SC Regular" panose="020B0400000000000000" charset="-122"/>
-                <a:ea typeface="PingFang SC Regular" panose="020B0400000000000000" charset="-122"/>
-                <a:cs typeface="PingFang SC Regular" panose="020B0400000000000000" charset="-122"/>
-              </a:rPr>
-              <a:t>：整个</a:t>
-            </a:r>
-            <a:r>
-              <a:rPr lang="en-US" altLang="zh-CN">
-                <a:latin typeface="PingFang SC Regular" panose="020B0400000000000000" charset="-122"/>
-                <a:ea typeface="PingFang SC Regular" panose="020B0400000000000000" charset="-122"/>
-                <a:cs typeface="PingFang SC Regular" panose="020B0400000000000000" charset="-122"/>
-              </a:rPr>
-              <a:t>CPU Cache</a:t>
-            </a:r>
-            <a:r>
-              <a:rPr lang="zh-CN" altLang="en-US">
-                <a:latin typeface="PingFang SC Regular" panose="020B0400000000000000" charset="-122"/>
-                <a:ea typeface="PingFang SC Regular" panose="020B0400000000000000" charset="-122"/>
-                <a:cs typeface="PingFang SC Regular" panose="020B0400000000000000" charset="-122"/>
-              </a:rPr>
-              <a:t>有多少组</a:t>
-            </a:r>
-            <a:r>
-              <a:rPr lang="en-US" altLang="zh-CN">
-                <a:latin typeface="PingFang SC Regular" panose="020B0400000000000000" charset="-122"/>
-                <a:ea typeface="PingFang SC Regular" panose="020B0400000000000000" charset="-122"/>
-                <a:cs typeface="PingFang SC Regular" panose="020B0400000000000000" charset="-122"/>
-              </a:rPr>
-              <a:t>CacheSet</a:t>
-            </a:r>
-            <a:r>
-              <a:rPr lang="zh-CN" altLang="en-US">
-                <a:latin typeface="PingFang SC Regular" panose="020B0400000000000000" charset="-122"/>
-                <a:ea typeface="PingFang SC Regular" panose="020B0400000000000000" charset="-122"/>
-                <a:cs typeface="PingFang SC Regular" panose="020B0400000000000000" charset="-122"/>
-              </a:rPr>
-              <a:t>。</a:t>
-            </a:r>
-            <a:endParaRPr lang="en-US" altLang="zh-CN">
-              <a:latin typeface="PingFang SC Regular" panose="020B0400000000000000" charset="-122"/>
-              <a:ea typeface="PingFang SC Regular" panose="020B0400000000000000" charset="-122"/>
-              <a:cs typeface="PingFang SC Regular" panose="020B0400000000000000" charset="-122"/>
-            </a:endParaRPr>
-          </a:p>
-          <a:p>
-            <a:pPr marL="342900" indent="-342900">
-              <a:buFont typeface="Arial" panose="020B0604020202090204" pitchFamily="34" charset="0"/>
-              <a:buAutoNum type="arabicPeriod"/>
-            </a:pPr>
-            <a:endParaRPr lang="zh-CN" altLang="en-US">
-              <a:latin typeface="PingFang SC Regular" panose="020B0400000000000000" charset="-122"/>
-              <a:ea typeface="PingFang SC Regular" panose="020B0400000000000000" charset="-122"/>
-              <a:cs typeface="PingFang SC Regular" panose="020B0400000000000000" charset="-122"/>
-            </a:endParaRPr>
-          </a:p>
-          <a:p>
-            <a:pPr marL="342900" indent="-342900">
-              <a:buFont typeface="Arial" panose="020B0604020202090204" pitchFamily="34" charset="0"/>
-              <a:buAutoNum type="arabicPeriod"/>
-            </a:pPr>
-            <a:endParaRPr lang="en-US" altLang="zh-CN">
-              <a:latin typeface="PingFang SC Regular" panose="020B0400000000000000" charset="-122"/>
-              <a:ea typeface="PingFang SC Regular" panose="020B0400000000000000" charset="-122"/>
-              <a:cs typeface="PingFang SC Regular" panose="020B0400000000000000" charset="-122"/>
-            </a:endParaRPr>
-          </a:p>
-          <a:p>
-            <a:pPr indent="0">
-              <a:buFont typeface="Arial" panose="020B0604020202090204" pitchFamily="34" charset="0"/>
-              <a:buNone/>
-            </a:pPr>
-            <a:r>
-              <a:rPr lang="en-US" altLang="zh-CN">
-                <a:latin typeface="PingFang SC Regular" panose="020B0400000000000000" charset="-122"/>
-                <a:ea typeface="PingFang SC Regular" panose="020B0400000000000000" charset="-122"/>
-                <a:cs typeface="PingFang SC Regular" panose="020B0400000000000000" charset="-122"/>
-              </a:rPr>
-              <a:t>Cache Size = B * E * S</a:t>
-            </a:r>
-            <a:endParaRPr lang="en-US" altLang="zh-CN">
-              <a:latin typeface="PingFang SC Regular" panose="020B0400000000000000" charset="-122"/>
-              <a:ea typeface="PingFang SC Regular" panose="020B0400000000000000" charset="-122"/>
-              <a:cs typeface="PingFang SC Regular" panose="020B0400000000000000" charset="-122"/>
-            </a:endParaRPr>
-          </a:p>
-          <a:p>
-            <a:pPr indent="0">
-              <a:buFont typeface="Arial" panose="020B0604020202090204" pitchFamily="34" charset="0"/>
-              <a:buNone/>
-            </a:pPr>
-            <a:endParaRPr lang="en-US" altLang="zh-CN">
-              <a:latin typeface="PingFang SC Regular" panose="020B0400000000000000" charset="-122"/>
-              <a:ea typeface="PingFang SC Regular" panose="020B0400000000000000" charset="-122"/>
-              <a:cs typeface="PingFang SC Regular" panose="020B0400000000000000" charset="-122"/>
-            </a:endParaRPr>
-          </a:p>
-          <a:p>
-            <a:pPr indent="0">
-              <a:buFont typeface="Arial" panose="020B0604020202090204" pitchFamily="34" charset="0"/>
-              <a:buNone/>
-            </a:pPr>
-            <a:r>
-              <a:rPr lang="zh-CN" altLang="en-US">
-                <a:latin typeface="PingFang SC Regular" panose="020B0400000000000000" charset="-122"/>
-                <a:ea typeface="PingFang SC Regular" panose="020B0400000000000000" charset="-122"/>
-                <a:cs typeface="PingFang SC Regular" panose="020B0400000000000000" charset="-122"/>
-              </a:rPr>
-              <a:t>局部性原理：</a:t>
-            </a:r>
-            <a:endParaRPr lang="zh-CN" altLang="en-US">
-              <a:latin typeface="PingFang SC Regular" panose="020B0400000000000000" charset="-122"/>
-              <a:ea typeface="PingFang SC Regular" panose="020B0400000000000000" charset="-122"/>
-              <a:cs typeface="PingFang SC Regular" panose="020B0400000000000000" charset="-122"/>
-            </a:endParaRPr>
-          </a:p>
-          <a:p>
-            <a:pPr marL="285750" indent="-285750">
-              <a:buFont typeface="Arial" panose="020B0604020202090204" pitchFamily="34" charset="0"/>
-              <a:buChar char="•"/>
-            </a:pPr>
-            <a:r>
-              <a:rPr lang="zh-CN" altLang="en-US">
-                <a:latin typeface="PingFang SC Regular" panose="020B0400000000000000" charset="-122"/>
-                <a:ea typeface="PingFang SC Regular" panose="020B0400000000000000" charset="-122"/>
-                <a:cs typeface="PingFang SC Regular" panose="020B0400000000000000" charset="-122"/>
-              </a:rPr>
-              <a:t>时间局部性：对于同一个数据可能被多次使用，自第一次加载到</a:t>
-            </a:r>
-            <a:r>
-              <a:rPr lang="en-US" altLang="zh-CN">
-                <a:latin typeface="PingFang SC Regular" panose="020B0400000000000000" charset="-122"/>
-                <a:ea typeface="PingFang SC Regular" panose="020B0400000000000000" charset="-122"/>
-                <a:cs typeface="PingFang SC Regular" panose="020B0400000000000000" charset="-122"/>
-              </a:rPr>
-              <a:t>CacheLine</a:t>
-            </a:r>
-            <a:r>
-              <a:rPr lang="zh-CN" altLang="en-US">
-                <a:latin typeface="PingFang SC Regular" panose="020B0400000000000000" charset="-122"/>
-                <a:ea typeface="PingFang SC Regular" panose="020B0400000000000000" charset="-122"/>
-                <a:cs typeface="PingFang SC Regular" panose="020B0400000000000000" charset="-122"/>
-              </a:rPr>
-              <a:t>后，后面的访问就可以多次从</a:t>
-            </a:r>
-            <a:r>
-              <a:rPr lang="en-US" altLang="zh-CN">
-                <a:latin typeface="PingFang SC Regular" panose="020B0400000000000000" charset="-122"/>
-                <a:ea typeface="PingFang SC Regular" panose="020B0400000000000000" charset="-122"/>
-                <a:cs typeface="PingFang SC Regular" panose="020B0400000000000000" charset="-122"/>
-              </a:rPr>
-              <a:t>CacheLine</a:t>
-            </a:r>
-            <a:r>
-              <a:rPr lang="zh-CN" altLang="en-US">
-                <a:latin typeface="PingFang SC Regular" panose="020B0400000000000000" charset="-122"/>
-                <a:ea typeface="PingFang SC Regular" panose="020B0400000000000000" charset="-122"/>
-                <a:cs typeface="PingFang SC Regular" panose="020B0400000000000000" charset="-122"/>
-              </a:rPr>
-              <a:t>中命中，从而提高读取速度（而不是从下层缓存读取）。</a:t>
-            </a:r>
-            <a:endParaRPr lang="zh-CN" altLang="en-US">
-              <a:latin typeface="PingFang SC Regular" panose="020B0400000000000000" charset="-122"/>
-              <a:ea typeface="PingFang SC Regular" panose="020B0400000000000000" charset="-122"/>
-              <a:cs typeface="PingFang SC Regular" panose="020B0400000000000000" charset="-122"/>
-            </a:endParaRPr>
-          </a:p>
-          <a:p>
-            <a:pPr marL="285750" indent="-285750">
-              <a:buFont typeface="Arial" panose="020B0604020202090204" pitchFamily="34" charset="0"/>
-              <a:buChar char="•"/>
-            </a:pPr>
-            <a:r>
-              <a:rPr lang="zh-CN" altLang="en-US">
-                <a:latin typeface="PingFang SC Regular" panose="020B0400000000000000" charset="-122"/>
-                <a:ea typeface="PingFang SC Regular" panose="020B0400000000000000" charset="-122"/>
-                <a:cs typeface="PingFang SC Regular" panose="020B0400000000000000" charset="-122"/>
-              </a:rPr>
-              <a:t>空间局部性：一个</a:t>
-            </a:r>
-            <a:r>
-              <a:rPr lang="en-US" altLang="zh-CN">
-                <a:latin typeface="PingFang SC Regular" panose="020B0400000000000000" charset="-122"/>
-                <a:ea typeface="PingFang SC Regular" panose="020B0400000000000000" charset="-122"/>
-                <a:cs typeface="PingFang SC Regular" panose="020B0400000000000000" charset="-122"/>
-              </a:rPr>
-              <a:t>CacheLine</a:t>
-            </a:r>
-            <a:r>
-              <a:rPr lang="zh-CN" altLang="en-US">
-                <a:latin typeface="PingFang SC Regular" panose="020B0400000000000000" charset="-122"/>
-                <a:ea typeface="PingFang SC Regular" panose="020B0400000000000000" charset="-122"/>
-                <a:cs typeface="PingFang SC Regular" panose="020B0400000000000000" charset="-122"/>
-              </a:rPr>
-              <a:t>一般有</a:t>
-            </a:r>
-            <a:r>
-              <a:rPr lang="en-US" altLang="zh-CN">
-                <a:latin typeface="PingFang SC Regular" panose="020B0400000000000000" charset="-122"/>
-                <a:ea typeface="PingFang SC Regular" panose="020B0400000000000000" charset="-122"/>
-                <a:cs typeface="PingFang SC Regular" panose="020B0400000000000000" charset="-122"/>
-              </a:rPr>
-              <a:t>64Bytes</a:t>
-            </a:r>
-            <a:r>
-              <a:rPr lang="zh-CN" altLang="en-US">
-                <a:latin typeface="PingFang SC Regular" panose="020B0400000000000000" charset="-122"/>
-                <a:ea typeface="PingFang SC Regular" panose="020B0400000000000000" charset="-122"/>
-                <a:cs typeface="PingFang SC Regular" panose="020B0400000000000000" charset="-122"/>
-              </a:rPr>
-              <a:t>，我们可以充分利用一次加载64字节的空间，把程序后续会访问的数据，一次性全部加载进来，从而提高Cache Line命中率。</a:t>
-            </a:r>
-            <a:endParaRPr lang="zh-CN" altLang="en-US">
-              <a:latin typeface="PingFang SC Regular" panose="020B0400000000000000" charset="-122"/>
-              <a:ea typeface="PingFang SC Regular" panose="020B0400000000000000" charset="-122"/>
-              <a:cs typeface="PingFang SC Regular" panose="020B0400000000000000" charset="-122"/>
-            </a:endParaRPr>
-          </a:p>
-        </p:txBody>
-      </p:sp>
-    </p:spTree>
-  </p:cSld>
-  <p:clrMapOvr>
-    <a:masterClrMapping/>
-  </p:clrMapOvr>
-</p:sld>
-</file>
-
-<file path=ppt/slides/slide9.xml><?xml version="1.0" encoding="utf-8"?>
-<p:sld xmlns:a="http://schemas.openxmlformats.org/drawingml/2006/main" xmlns:r="http://schemas.openxmlformats.org/officeDocument/2006/relationships" xmlns:p="http://schemas.openxmlformats.org/presentationml/2006/main">
-  <p:cSld>
-    <p:spTree>
-      <p:nvGrpSpPr>
-        <p:cNvPr id="1" name=""/>
-        <p:cNvGrpSpPr/>
-        <p:nvPr/>
-      </p:nvGrpSpPr>
-      <p:grpSpPr/>
-      <p:sp>
-        <p:nvSpPr>
-          <p:cNvPr id="2" name="文本框 1"/>
-          <p:cNvSpPr txBox="1"/>
-          <p:nvPr/>
-        </p:nvSpPr>
-        <p:spPr>
-          <a:xfrm>
-            <a:off x="356235" y="195580"/>
-            <a:ext cx="7103745" cy="460375"/>
-          </a:xfrm>
-          <a:prstGeom prst="rect">
-            <a:avLst/>
-          </a:prstGeom>
-          <a:noFill/>
-        </p:spPr>
-        <p:txBody>
-          <a:bodyPr wrap="square" rtlCol="0">
-            <a:spAutoFit/>
-          </a:bodyPr>
-          <a:p>
-            <a:r>
-              <a:rPr lang="zh-CN" altLang="en-US" sz="2400">
-                <a:latin typeface="PingFang SC Regular" panose="020B0400000000000000" charset="-122"/>
-                <a:ea typeface="PingFang SC Regular" panose="020B0400000000000000" charset="-122"/>
-              </a:rPr>
-              <a:t>伪共享：</a:t>
-            </a:r>
-            <a:endParaRPr lang="zh-CN" altLang="en-US" sz="2400">
-              <a:latin typeface="PingFang SC Regular" panose="020B0400000000000000" charset="-122"/>
-              <a:ea typeface="PingFang SC Regular" panose="020B0400000000000000" charset="-122"/>
-            </a:endParaRPr>
-          </a:p>
-        </p:txBody>
-      </p:sp>
-      <p:sp>
-        <p:nvSpPr>
-          <p:cNvPr id="7" name="文本框 6"/>
-          <p:cNvSpPr txBox="1"/>
-          <p:nvPr/>
-        </p:nvSpPr>
-        <p:spPr>
-          <a:xfrm>
-            <a:off x="6301105" y="1085850"/>
-            <a:ext cx="5621020" cy="4246245"/>
-          </a:xfrm>
-          <a:prstGeom prst="rect">
-            <a:avLst/>
-          </a:prstGeom>
-          <a:noFill/>
-        </p:spPr>
-        <p:txBody>
-          <a:bodyPr wrap="square" rtlCol="0">
-            <a:spAutoFit/>
-          </a:bodyPr>
-          <a:p>
-            <a:pPr marL="342900" indent="-342900">
-              <a:buFont typeface="Arial" panose="020B0604020202090204" pitchFamily="34" charset="0"/>
-              <a:buAutoNum type="arabicPeriod"/>
-            </a:pPr>
-            <a:r>
-              <a:rPr lang="en-US" altLang="zh-CN">
-                <a:latin typeface="PingFang SC Regular" panose="020B0400000000000000" charset="-122"/>
-                <a:ea typeface="PingFang SC Regular" panose="020B0400000000000000" charset="-122"/>
-                <a:cs typeface="PingFang SC Regular" panose="020B0400000000000000" charset="-122"/>
-              </a:rPr>
-              <a:t>Core1</a:t>
-            </a:r>
-            <a:r>
-              <a:rPr lang="zh-CN" altLang="en-US">
-                <a:latin typeface="PingFang SC Regular" panose="020B0400000000000000" charset="-122"/>
-                <a:ea typeface="PingFang SC Regular" panose="020B0400000000000000" charset="-122"/>
-                <a:cs typeface="PingFang SC Regular" panose="020B0400000000000000" charset="-122"/>
-              </a:rPr>
-              <a:t>修改</a:t>
-            </a:r>
-            <a:r>
-              <a:rPr lang="en-US" altLang="zh-CN">
-                <a:latin typeface="PingFang SC Regular" panose="020B0400000000000000" charset="-122"/>
-                <a:ea typeface="PingFang SC Regular" panose="020B0400000000000000" charset="-122"/>
-                <a:cs typeface="PingFang SC Regular" panose="020B0400000000000000" charset="-122"/>
-              </a:rPr>
-              <a:t>X</a:t>
-            </a:r>
-            <a:r>
-              <a:rPr lang="zh-CN" altLang="en-US">
-                <a:latin typeface="PingFang SC Regular" panose="020B0400000000000000" charset="-122"/>
-                <a:ea typeface="PingFang SC Regular" panose="020B0400000000000000" charset="-122"/>
-                <a:cs typeface="PingFang SC Regular" panose="020B0400000000000000" charset="-122"/>
-              </a:rPr>
-              <a:t>，然后告知其他</a:t>
-            </a:r>
-            <a:r>
-              <a:rPr lang="en-US" altLang="zh-CN">
-                <a:latin typeface="PingFang SC Regular" panose="020B0400000000000000" charset="-122"/>
-                <a:ea typeface="PingFang SC Regular" panose="020B0400000000000000" charset="-122"/>
-                <a:cs typeface="PingFang SC Regular" panose="020B0400000000000000" charset="-122"/>
-              </a:rPr>
-              <a:t>Core</a:t>
-            </a:r>
-            <a:r>
-              <a:rPr lang="zh-CN" altLang="en-US">
-                <a:latin typeface="PingFang SC Regular" panose="020B0400000000000000" charset="-122"/>
-                <a:ea typeface="PingFang SC Regular" panose="020B0400000000000000" charset="-122"/>
-                <a:cs typeface="PingFang SC Regular" panose="020B0400000000000000" charset="-122"/>
-              </a:rPr>
-              <a:t>，</a:t>
-            </a:r>
-            <a:r>
-              <a:rPr lang="en-US" altLang="zh-CN">
-                <a:latin typeface="PingFang SC Regular" panose="020B0400000000000000" charset="-122"/>
-                <a:ea typeface="PingFang SC Regular" panose="020B0400000000000000" charset="-122"/>
-                <a:cs typeface="PingFang SC Regular" panose="020B0400000000000000" charset="-122"/>
-              </a:rPr>
-              <a:t>CacheLine</a:t>
-            </a:r>
-            <a:r>
-              <a:rPr lang="zh-CN" altLang="en-US">
-                <a:latin typeface="PingFang SC Regular" panose="020B0400000000000000" charset="-122"/>
-                <a:ea typeface="PingFang SC Regular" panose="020B0400000000000000" charset="-122"/>
-                <a:cs typeface="PingFang SC Regular" panose="020B0400000000000000" charset="-122"/>
-              </a:rPr>
-              <a:t>状态为</a:t>
-            </a:r>
-            <a:r>
-              <a:rPr lang="en-US" altLang="zh-CN">
-                <a:latin typeface="PingFang SC Regular" panose="020B0400000000000000" charset="-122"/>
-                <a:ea typeface="PingFang SC Regular" panose="020B0400000000000000" charset="-122"/>
-                <a:cs typeface="PingFang SC Regular" panose="020B0400000000000000" charset="-122"/>
-              </a:rPr>
-              <a:t>S(Shared) -&gt; M(Modified)</a:t>
-            </a:r>
-            <a:r>
-              <a:rPr lang="zh-CN" altLang="en-US">
-                <a:latin typeface="PingFang SC Regular" panose="020B0400000000000000" charset="-122"/>
-                <a:ea typeface="PingFang SC Regular" panose="020B0400000000000000" charset="-122"/>
-                <a:cs typeface="PingFang SC Regular" panose="020B0400000000000000" charset="-122"/>
-              </a:rPr>
-              <a:t>；</a:t>
-            </a:r>
-            <a:endParaRPr lang="zh-CN" altLang="en-US">
-              <a:latin typeface="PingFang SC Regular" panose="020B0400000000000000" charset="-122"/>
-              <a:ea typeface="PingFang SC Regular" panose="020B0400000000000000" charset="-122"/>
-              <a:cs typeface="PingFang SC Regular" panose="020B0400000000000000" charset="-122"/>
-            </a:endParaRPr>
-          </a:p>
-          <a:p>
-            <a:pPr marL="342900" indent="-342900">
-              <a:buFont typeface="Arial" panose="020B0604020202090204" pitchFamily="34" charset="0"/>
-              <a:buAutoNum type="arabicPeriod"/>
-            </a:pPr>
-            <a:r>
-              <a:rPr lang="zh-CN" altLang="en-US">
-                <a:latin typeface="PingFang SC Regular" panose="020B0400000000000000" charset="-122"/>
-                <a:ea typeface="PingFang SC Regular" panose="020B0400000000000000" charset="-122"/>
-                <a:cs typeface="PingFang SC Regular" panose="020B0400000000000000" charset="-122"/>
-              </a:rPr>
-              <a:t>随后</a:t>
-            </a:r>
-            <a:r>
-              <a:rPr lang="en-US" altLang="zh-CN">
-                <a:latin typeface="PingFang SC Regular" panose="020B0400000000000000" charset="-122"/>
-                <a:ea typeface="PingFang SC Regular" panose="020B0400000000000000" charset="-122"/>
-                <a:cs typeface="PingFang SC Regular" panose="020B0400000000000000" charset="-122"/>
-              </a:rPr>
-              <a:t>Core2</a:t>
-            </a:r>
-            <a:r>
-              <a:rPr lang="zh-CN" altLang="en-US">
-                <a:latin typeface="PingFang SC Regular" panose="020B0400000000000000" charset="-122"/>
-                <a:ea typeface="PingFang SC Regular" panose="020B0400000000000000" charset="-122"/>
-                <a:cs typeface="PingFang SC Regular" panose="020B0400000000000000" charset="-122"/>
-              </a:rPr>
-              <a:t>发起修改</a:t>
-            </a:r>
-            <a:r>
-              <a:rPr lang="en-US" altLang="zh-CN">
-                <a:latin typeface="PingFang SC Regular" panose="020B0400000000000000" charset="-122"/>
-                <a:ea typeface="PingFang SC Regular" panose="020B0400000000000000" charset="-122"/>
-                <a:cs typeface="PingFang SC Regular" panose="020B0400000000000000" charset="-122"/>
-              </a:rPr>
-              <a:t>Y</a:t>
-            </a:r>
-            <a:r>
-              <a:rPr lang="zh-CN" altLang="en-US">
-                <a:latin typeface="PingFang SC Regular" panose="020B0400000000000000" charset="-122"/>
-                <a:ea typeface="PingFang SC Regular" panose="020B0400000000000000" charset="-122"/>
-                <a:cs typeface="PingFang SC Regular" panose="020B0400000000000000" charset="-122"/>
-              </a:rPr>
-              <a:t>操作，发现</a:t>
-            </a:r>
-            <a:r>
-              <a:rPr lang="en-US" altLang="zh-CN">
-                <a:latin typeface="PingFang SC Regular" panose="020B0400000000000000" charset="-122"/>
-                <a:ea typeface="PingFang SC Regular" panose="020B0400000000000000" charset="-122"/>
-                <a:cs typeface="PingFang SC Regular" panose="020B0400000000000000" charset="-122"/>
-              </a:rPr>
-              <a:t>CacheLine</a:t>
-            </a:r>
-            <a:r>
-              <a:rPr lang="zh-CN" altLang="en-US">
-                <a:latin typeface="PingFang SC Regular" panose="020B0400000000000000" charset="-122"/>
-                <a:ea typeface="PingFang SC Regular" panose="020B0400000000000000" charset="-122"/>
-                <a:cs typeface="PingFang SC Regular" panose="020B0400000000000000" charset="-122"/>
-              </a:rPr>
-              <a:t>状态为</a:t>
-            </a:r>
-            <a:r>
-              <a:rPr lang="en-US" altLang="zh-CN">
-                <a:latin typeface="PingFang SC Regular" panose="020B0400000000000000" charset="-122"/>
-                <a:ea typeface="PingFang SC Regular" panose="020B0400000000000000" charset="-122"/>
-                <a:cs typeface="PingFang SC Regular" panose="020B0400000000000000" charset="-122"/>
-              </a:rPr>
-              <a:t>M</a:t>
-            </a:r>
-            <a:r>
-              <a:rPr lang="zh-CN" altLang="en-US">
-                <a:latin typeface="PingFang SC Regular" panose="020B0400000000000000" charset="-122"/>
-                <a:ea typeface="PingFang SC Regular" panose="020B0400000000000000" charset="-122"/>
-                <a:cs typeface="PingFang SC Regular" panose="020B0400000000000000" charset="-122"/>
-              </a:rPr>
-              <a:t>，先让</a:t>
-            </a:r>
-            <a:r>
-              <a:rPr lang="en-US" altLang="zh-CN">
-                <a:latin typeface="PingFang SC Regular" panose="020B0400000000000000" charset="-122"/>
-                <a:ea typeface="PingFang SC Regular" panose="020B0400000000000000" charset="-122"/>
-                <a:cs typeface="PingFang SC Regular" panose="020B0400000000000000" charset="-122"/>
-              </a:rPr>
-              <a:t>Core1</a:t>
-            </a:r>
-            <a:r>
-              <a:rPr lang="zh-CN" altLang="en-US">
-                <a:latin typeface="PingFang SC Regular" panose="020B0400000000000000" charset="-122"/>
-                <a:ea typeface="PingFang SC Regular" panose="020B0400000000000000" charset="-122"/>
-                <a:cs typeface="PingFang SC Regular" panose="020B0400000000000000" charset="-122"/>
-              </a:rPr>
-              <a:t>将</a:t>
-            </a:r>
-            <a:r>
-              <a:rPr lang="en-US" altLang="zh-CN">
-                <a:latin typeface="PingFang SC Regular" panose="020B0400000000000000" charset="-122"/>
-                <a:ea typeface="PingFang SC Regular" panose="020B0400000000000000" charset="-122"/>
-                <a:cs typeface="PingFang SC Regular" panose="020B0400000000000000" charset="-122"/>
-              </a:rPr>
-              <a:t>X</a:t>
-            </a:r>
-            <a:r>
-              <a:rPr lang="zh-CN" altLang="en-US">
-                <a:latin typeface="PingFang SC Regular" panose="020B0400000000000000" charset="-122"/>
-                <a:ea typeface="PingFang SC Regular" panose="020B0400000000000000" charset="-122"/>
-                <a:cs typeface="PingFang SC Regular" panose="020B0400000000000000" charset="-122"/>
-              </a:rPr>
-              <a:t>写回主存，</a:t>
-            </a:r>
-            <a:r>
-              <a:rPr lang="en-US" altLang="zh-CN">
-                <a:latin typeface="PingFang SC Regular" panose="020B0400000000000000" charset="-122"/>
-                <a:ea typeface="PingFang SC Regular" panose="020B0400000000000000" charset="-122"/>
-                <a:cs typeface="PingFang SC Regular" panose="020B0400000000000000" charset="-122"/>
-              </a:rPr>
-              <a:t>CacheLine</a:t>
-            </a:r>
-            <a:r>
-              <a:rPr lang="zh-CN" altLang="en-US">
-                <a:latin typeface="PingFang SC Regular" panose="020B0400000000000000" charset="-122"/>
-                <a:ea typeface="PingFang SC Regular" panose="020B0400000000000000" charset="-122"/>
-                <a:cs typeface="PingFang SC Regular" panose="020B0400000000000000" charset="-122"/>
-              </a:rPr>
-              <a:t>状态为</a:t>
-            </a:r>
-            <a:r>
-              <a:rPr lang="en-US" altLang="zh-CN">
-                <a:latin typeface="PingFang SC Regular" panose="020B0400000000000000" charset="-122"/>
-                <a:ea typeface="PingFang SC Regular" panose="020B0400000000000000" charset="-122"/>
-                <a:cs typeface="PingFang SC Regular" panose="020B0400000000000000" charset="-122"/>
-              </a:rPr>
-              <a:t>M(Modified) -&gt; I(Invalid)</a:t>
-            </a:r>
-            <a:r>
-              <a:rPr lang="zh-CN" altLang="en-US">
-                <a:latin typeface="PingFang SC Regular" panose="020B0400000000000000" charset="-122"/>
-                <a:ea typeface="PingFang SC Regular" panose="020B0400000000000000" charset="-122"/>
-                <a:cs typeface="PingFang SC Regular" panose="020B0400000000000000" charset="-122"/>
-              </a:rPr>
-              <a:t>；</a:t>
-            </a:r>
-            <a:endParaRPr lang="zh-CN" altLang="en-US">
-              <a:latin typeface="PingFang SC Regular" panose="020B0400000000000000" charset="-122"/>
-              <a:ea typeface="PingFang SC Regular" panose="020B0400000000000000" charset="-122"/>
-              <a:cs typeface="PingFang SC Regular" panose="020B0400000000000000" charset="-122"/>
-            </a:endParaRPr>
-          </a:p>
-          <a:p>
-            <a:pPr marL="342900" indent="-342900">
-              <a:buFont typeface="Arial" panose="020B0604020202090204" pitchFamily="34" charset="0"/>
-              <a:buAutoNum type="arabicPeriod"/>
-            </a:pPr>
-            <a:r>
-              <a:rPr lang="en-US" altLang="zh-CN">
-                <a:latin typeface="PingFang SC Regular" panose="020B0400000000000000" charset="-122"/>
-                <a:ea typeface="PingFang SC Regular" panose="020B0400000000000000" charset="-122"/>
-                <a:cs typeface="PingFang SC Regular" panose="020B0400000000000000" charset="-122"/>
-              </a:rPr>
-              <a:t>Core2</a:t>
-            </a:r>
-            <a:r>
-              <a:rPr lang="zh-CN" altLang="en-US">
-                <a:latin typeface="PingFang SC Regular" panose="020B0400000000000000" charset="-122"/>
-                <a:ea typeface="PingFang SC Regular" panose="020B0400000000000000" charset="-122"/>
-                <a:cs typeface="PingFang SC Regular" panose="020B0400000000000000" charset="-122"/>
-              </a:rPr>
-              <a:t>重新从主存读取该数据，</a:t>
-            </a:r>
-            <a:r>
-              <a:rPr lang="en-US" altLang="zh-CN">
-                <a:latin typeface="PingFang SC Regular" panose="020B0400000000000000" charset="-122"/>
-                <a:ea typeface="PingFang SC Regular" panose="020B0400000000000000" charset="-122"/>
-                <a:cs typeface="PingFang SC Regular" panose="020B0400000000000000" charset="-122"/>
-              </a:rPr>
-              <a:t>CacheLine</a:t>
-            </a:r>
-            <a:r>
-              <a:rPr lang="zh-CN" altLang="en-US">
-                <a:latin typeface="PingFang SC Regular" panose="020B0400000000000000" charset="-122"/>
-                <a:ea typeface="PingFang SC Regular" panose="020B0400000000000000" charset="-122"/>
-                <a:cs typeface="PingFang SC Regular" panose="020B0400000000000000" charset="-122"/>
-              </a:rPr>
-              <a:t>状态为</a:t>
-            </a:r>
-            <a:r>
-              <a:rPr lang="en-US" altLang="zh-CN">
-                <a:latin typeface="PingFang SC Regular" panose="020B0400000000000000" charset="-122"/>
-                <a:ea typeface="PingFang SC Regular" panose="020B0400000000000000" charset="-122"/>
-                <a:cs typeface="PingFang SC Regular" panose="020B0400000000000000" charset="-122"/>
-              </a:rPr>
-              <a:t>I(Invalid) -&gt; E(Exclusive)</a:t>
-            </a:r>
-            <a:r>
-              <a:rPr lang="zh-CN" altLang="en-US">
-                <a:latin typeface="PingFang SC Regular" panose="020B0400000000000000" charset="-122"/>
-                <a:ea typeface="PingFang SC Regular" panose="020B0400000000000000" charset="-122"/>
-                <a:cs typeface="PingFang SC Regular" panose="020B0400000000000000" charset="-122"/>
-              </a:rPr>
-              <a:t>；</a:t>
-            </a:r>
-            <a:endParaRPr lang="zh-CN" altLang="en-US">
-              <a:latin typeface="PingFang SC Regular" panose="020B0400000000000000" charset="-122"/>
-              <a:ea typeface="PingFang SC Regular" panose="020B0400000000000000" charset="-122"/>
-              <a:cs typeface="PingFang SC Regular" panose="020B0400000000000000" charset="-122"/>
-            </a:endParaRPr>
-          </a:p>
-          <a:p>
-            <a:pPr marL="342900" indent="-342900">
-              <a:buFont typeface="Arial" panose="020B0604020202090204" pitchFamily="34" charset="0"/>
-              <a:buAutoNum type="arabicPeriod"/>
-            </a:pPr>
-            <a:r>
-              <a:rPr lang="zh-CN" altLang="en-US">
-                <a:latin typeface="PingFang SC Regular" panose="020B0400000000000000" charset="-122"/>
-                <a:ea typeface="PingFang SC Regular" panose="020B0400000000000000" charset="-122"/>
-                <a:cs typeface="PingFang SC Regular" panose="020B0400000000000000" charset="-122"/>
-              </a:rPr>
-              <a:t>最后</a:t>
-            </a:r>
-            <a:r>
-              <a:rPr lang="en-US" altLang="zh-CN">
-                <a:latin typeface="PingFang SC Regular" panose="020B0400000000000000" charset="-122"/>
-                <a:ea typeface="PingFang SC Regular" panose="020B0400000000000000" charset="-122"/>
-                <a:cs typeface="PingFang SC Regular" panose="020B0400000000000000" charset="-122"/>
-              </a:rPr>
-              <a:t>Core2</a:t>
-            </a:r>
-            <a:r>
-              <a:rPr lang="zh-CN" altLang="en-US">
-                <a:latin typeface="PingFang SC Regular" panose="020B0400000000000000" charset="-122"/>
-                <a:ea typeface="PingFang SC Regular" panose="020B0400000000000000" charset="-122"/>
-                <a:cs typeface="PingFang SC Regular" panose="020B0400000000000000" charset="-122"/>
-              </a:rPr>
-              <a:t>进行修改</a:t>
-            </a:r>
-            <a:r>
-              <a:rPr lang="en-US" altLang="zh-CN">
-                <a:latin typeface="PingFang SC Regular" panose="020B0400000000000000" charset="-122"/>
-                <a:ea typeface="PingFang SC Regular" panose="020B0400000000000000" charset="-122"/>
-                <a:cs typeface="PingFang SC Regular" panose="020B0400000000000000" charset="-122"/>
-              </a:rPr>
-              <a:t>Y</a:t>
-            </a:r>
-            <a:r>
-              <a:rPr lang="zh-CN" altLang="en-US">
-                <a:latin typeface="PingFang SC Regular" panose="020B0400000000000000" charset="-122"/>
-                <a:ea typeface="PingFang SC Regular" panose="020B0400000000000000" charset="-122"/>
-                <a:cs typeface="PingFang SC Regular" panose="020B0400000000000000" charset="-122"/>
-              </a:rPr>
-              <a:t>的操作，</a:t>
-            </a:r>
-            <a:r>
-              <a:rPr lang="en-US" altLang="zh-CN">
-                <a:latin typeface="PingFang SC Regular" panose="020B0400000000000000" charset="-122"/>
-                <a:ea typeface="PingFang SC Regular" panose="020B0400000000000000" charset="-122"/>
-                <a:cs typeface="PingFang SC Regular" panose="020B0400000000000000" charset="-122"/>
-              </a:rPr>
-              <a:t>CacheLine</a:t>
-            </a:r>
-            <a:r>
-              <a:rPr lang="zh-CN" altLang="en-US">
-                <a:latin typeface="PingFang SC Regular" panose="020B0400000000000000" charset="-122"/>
-                <a:ea typeface="PingFang SC Regular" panose="020B0400000000000000" charset="-122"/>
-                <a:cs typeface="PingFang SC Regular" panose="020B0400000000000000" charset="-122"/>
-              </a:rPr>
-              <a:t>状态为</a:t>
-            </a:r>
-            <a:r>
-              <a:rPr lang="en-US" altLang="zh-CN">
-                <a:latin typeface="PingFang SC Regular" panose="020B0400000000000000" charset="-122"/>
-                <a:ea typeface="PingFang SC Regular" panose="020B0400000000000000" charset="-122"/>
-                <a:cs typeface="PingFang SC Regular" panose="020B0400000000000000" charset="-122"/>
-              </a:rPr>
-              <a:t>E(Exclusive) -&gt; M(Modified)</a:t>
-            </a:r>
-            <a:r>
-              <a:rPr lang="zh-CN" altLang="en-US">
-                <a:latin typeface="PingFang SC Regular" panose="020B0400000000000000" charset="-122"/>
-                <a:ea typeface="PingFang SC Regular" panose="020B0400000000000000" charset="-122"/>
-                <a:cs typeface="PingFang SC Regular" panose="020B0400000000000000" charset="-122"/>
-              </a:rPr>
-              <a:t>。</a:t>
-            </a:r>
-            <a:endParaRPr lang="zh-CN" altLang="en-US">
-              <a:latin typeface="PingFang SC Regular" panose="020B0400000000000000" charset="-122"/>
-              <a:ea typeface="PingFang SC Regular" panose="020B0400000000000000" charset="-122"/>
-              <a:cs typeface="PingFang SC Regular" panose="020B0400000000000000" charset="-122"/>
-            </a:endParaRPr>
-          </a:p>
-          <a:p>
-            <a:pPr marL="342900" indent="-342900">
-              <a:buFont typeface="Arial" panose="020B0604020202090204" pitchFamily="34" charset="0"/>
-              <a:buAutoNum type="arabicPeriod"/>
-            </a:pPr>
-            <a:endParaRPr lang="zh-CN" altLang="en-US">
-              <a:latin typeface="PingFang SC Regular" panose="020B0400000000000000" charset="-122"/>
-              <a:ea typeface="PingFang SC Regular" panose="020B0400000000000000" charset="-122"/>
-              <a:cs typeface="PingFang SC Regular" panose="020B0400000000000000" charset="-122"/>
-            </a:endParaRPr>
-          </a:p>
-          <a:p>
-            <a:pPr indent="0">
-              <a:buFont typeface="Arial" panose="020B0604020202090204" pitchFamily="34" charset="0"/>
-              <a:buNone/>
-            </a:pPr>
-            <a:endParaRPr lang="zh-CN" altLang="en-US">
-              <a:latin typeface="PingFang SC Regular" panose="020B0400000000000000" charset="-122"/>
-              <a:ea typeface="PingFang SC Regular" panose="020B0400000000000000" charset="-122"/>
-              <a:cs typeface="PingFang SC Regular" panose="020B0400000000000000" charset="-122"/>
-            </a:endParaRPr>
-          </a:p>
-          <a:p>
-            <a:pPr indent="0">
-              <a:buFont typeface="Arial" panose="020B0604020202090204" pitchFamily="34" charset="0"/>
-              <a:buNone/>
-            </a:pPr>
-            <a:r>
-              <a:rPr lang="zh-CN" altLang="en-US">
-                <a:latin typeface="PingFang SC Regular" panose="020B0400000000000000" charset="-122"/>
-                <a:ea typeface="PingFang SC Regular" panose="020B0400000000000000" charset="-122"/>
-                <a:cs typeface="PingFang SC Regular" panose="020B0400000000000000" charset="-122"/>
-              </a:rPr>
-              <a:t>解决方案：</a:t>
-            </a:r>
-            <a:endParaRPr lang="zh-CN" altLang="en-US">
-              <a:latin typeface="PingFang SC Regular" panose="020B0400000000000000" charset="-122"/>
-              <a:ea typeface="PingFang SC Regular" panose="020B0400000000000000" charset="-122"/>
-              <a:cs typeface="PingFang SC Regular" panose="020B0400000000000000" charset="-122"/>
-            </a:endParaRPr>
-          </a:p>
-          <a:p>
-            <a:pPr marL="342900" indent="-342900">
-              <a:buFont typeface="Arial" panose="020B0604020202090204" pitchFamily="34" charset="0"/>
-              <a:buAutoNum type="arabicPeriod"/>
-            </a:pPr>
-            <a:r>
-              <a:rPr lang="en-US" altLang="zh-CN">
-                <a:latin typeface="PingFang SC Regular" panose="020B0400000000000000" charset="-122"/>
-                <a:ea typeface="PingFang SC Regular" panose="020B0400000000000000" charset="-122"/>
-                <a:cs typeface="PingFang SC Regular" panose="020B0400000000000000" charset="-122"/>
-              </a:rPr>
-              <a:t>padding</a:t>
-            </a:r>
-            <a:r>
-              <a:rPr lang="zh-CN" altLang="en-US">
-                <a:latin typeface="PingFang SC Regular" panose="020B0400000000000000" charset="-122"/>
-                <a:ea typeface="PingFang SC Regular" panose="020B0400000000000000" charset="-122"/>
-                <a:cs typeface="PingFang SC Regular" panose="020B0400000000000000" charset="-122"/>
-              </a:rPr>
-              <a:t>；</a:t>
-            </a:r>
-            <a:endParaRPr lang="zh-CN" altLang="en-US">
-              <a:latin typeface="PingFang SC Regular" panose="020B0400000000000000" charset="-122"/>
-              <a:ea typeface="PingFang SC Regular" panose="020B0400000000000000" charset="-122"/>
-              <a:cs typeface="PingFang SC Regular" panose="020B0400000000000000" charset="-122"/>
-            </a:endParaRPr>
-          </a:p>
-          <a:p>
-            <a:pPr marL="342900" indent="-342900">
-              <a:buFont typeface="Arial" panose="020B0604020202090204" pitchFamily="34" charset="0"/>
-              <a:buAutoNum type="arabicPeriod"/>
-            </a:pPr>
-            <a:r>
-              <a:rPr lang="zh-CN" altLang="en-US">
-                <a:latin typeface="PingFang SC Regular" panose="020B0400000000000000" charset="-122"/>
-                <a:ea typeface="PingFang SC Regular" panose="020B0400000000000000" charset="-122"/>
-                <a:cs typeface="PingFang SC Regular" panose="020B0400000000000000" charset="-122"/>
-              </a:rPr>
-              <a:t>在每个线程中创建全局数组各个元素的本地拷贝，然后结束后再写回全局数组。</a:t>
-            </a:r>
-            <a:endParaRPr lang="zh-CN" altLang="en-US">
-              <a:latin typeface="PingFang SC Regular" panose="020B0400000000000000" charset="-122"/>
-              <a:ea typeface="PingFang SC Regular" panose="020B0400000000000000" charset="-122"/>
-              <a:cs typeface="PingFang SC Regular" panose="020B0400000000000000" charset="-122"/>
-            </a:endParaRPr>
-          </a:p>
-        </p:txBody>
-      </p:sp>
-      <p:pic>
-        <p:nvPicPr>
-          <p:cNvPr id="5" name="图片 4"/>
-          <p:cNvPicPr>
-            <a:picLocks noChangeAspect="1"/>
-          </p:cNvPicPr>
-          <p:nvPr/>
-        </p:nvPicPr>
-        <p:blipFill>
-          <a:blip r:embed="rId1"/>
-          <a:stretch>
-            <a:fillRect/>
-          </a:stretch>
-        </p:blipFill>
-        <p:spPr>
-          <a:xfrm>
-            <a:off x="458470" y="655955"/>
-            <a:ext cx="4291965" cy="3195955"/>
-          </a:xfrm>
-          <a:prstGeom prst="rect">
-            <a:avLst/>
-          </a:prstGeom>
-        </p:spPr>
-      </p:pic>
-      <p:pic>
-        <p:nvPicPr>
-          <p:cNvPr id="8" name="图片 7"/>
-          <p:cNvPicPr>
-            <a:picLocks noChangeAspect="1"/>
-          </p:cNvPicPr>
-          <p:nvPr/>
-        </p:nvPicPr>
-        <p:blipFill>
-          <a:blip r:embed="rId2"/>
-          <a:stretch>
-            <a:fillRect/>
-          </a:stretch>
-        </p:blipFill>
-        <p:spPr>
-          <a:xfrm>
-            <a:off x="458470" y="3908425"/>
-            <a:ext cx="5023485" cy="2740025"/>
-          </a:xfrm>
-          <a:prstGeom prst="rect">
-            <a:avLst/>
-          </a:prstGeom>
-        </p:spPr>
-      </p:pic>
-    </p:spTree>
-  </p:cSld>
-  <p:clrMapOvr>
-    <a:masterClrMapping/>
-  </p:clrMapOvr>
-</p:sld>
-</file>
-
 <file path=ppt/tags/tag1.xml><?xml version="1.0" encoding="utf-8"?>
 <p:tagLst xmlns:p="http://schemas.openxmlformats.org/presentationml/2006/main">
   <p:tag name="KSO_WM_UNIT_PLACING_PICTURE_USER_VIEWPORT" val="{&quot;height&quot;:4020,&quot;width&quot;:6045}"/>

</xml_diff>